<commit_message>
Block Diagram added to the presentation.
</commit_message>
<xml_diff>
--- a/Presentation.pptx
+++ b/Presentation.pptx
@@ -7,17 +7,19 @@
   <p:sldIdLst>
     <p:sldId id="256" r:id="rId2"/>
     <p:sldId id="268" r:id="rId3"/>
-    <p:sldId id="257" r:id="rId4"/>
-    <p:sldId id="262" r:id="rId5"/>
-    <p:sldId id="258" r:id="rId6"/>
-    <p:sldId id="259" r:id="rId7"/>
-    <p:sldId id="260" r:id="rId8"/>
-    <p:sldId id="261" r:id="rId9"/>
-    <p:sldId id="263" r:id="rId10"/>
-    <p:sldId id="264" r:id="rId11"/>
-    <p:sldId id="265" r:id="rId12"/>
-    <p:sldId id="266" r:id="rId13"/>
-    <p:sldId id="267" r:id="rId14"/>
+    <p:sldId id="269" r:id="rId4"/>
+    <p:sldId id="257" r:id="rId5"/>
+    <p:sldId id="270" r:id="rId6"/>
+    <p:sldId id="262" r:id="rId7"/>
+    <p:sldId id="258" r:id="rId8"/>
+    <p:sldId id="259" r:id="rId9"/>
+    <p:sldId id="260" r:id="rId10"/>
+    <p:sldId id="261" r:id="rId11"/>
+    <p:sldId id="263" r:id="rId12"/>
+    <p:sldId id="264" r:id="rId13"/>
+    <p:sldId id="265" r:id="rId14"/>
+    <p:sldId id="266" r:id="rId15"/>
+    <p:sldId id="267" r:id="rId16"/>
   </p:sldIdLst>
   <p:sldSz cx="12192000" cy="6858000"/>
   <p:notesSz cx="6858000" cy="9144000"/>
@@ -116,6 +118,11 @@
       </a:defRPr>
     </a:lvl9pPr>
   </p:defaultTextStyle>
+  <p:extLst>
+    <p:ext uri="{EFAFB233-063F-42B5-8137-9DF3F51BA10A}">
+      <p15:sldGuideLst xmlns:p15="http://schemas.microsoft.com/office/powerpoint/2012/main"/>
+    </p:ext>
+  </p:extLst>
 </p:presentation>
 </file>
 
@@ -3790,42 +3797,42 @@
   <p:extLst mod="1">
     <p:ext uri="{27BBF7A9-308A-43DC-89C8-2F10F3537804}">
       <p15:sldGuideLst xmlns:p15="http://schemas.microsoft.com/office/powerpoint/2012/main">
-        <p15:guide id="4294967295" orient="horz" pos="1368">
+        <p15:guide id="1" orient="horz" pos="1368">
           <p15:clr>
             <a:srgbClr val="F26B43"/>
           </p15:clr>
         </p15:guide>
-        <p15:guide id="4294967295" orient="horz" pos="1440">
+        <p15:guide id="2" orient="horz" pos="1440">
           <p15:clr>
             <a:srgbClr val="F26B43"/>
           </p15:clr>
         </p15:guide>
-        <p15:guide id="4294967295" orient="horz" pos="3696">
+        <p15:guide id="3" orient="horz" pos="3696">
           <p15:clr>
             <a:srgbClr val="F26B43"/>
           </p15:clr>
         </p15:guide>
-        <p15:guide id="4294967295" orient="horz" pos="432">
+        <p15:guide id="4" orient="horz" pos="432">
           <p15:clr>
             <a:srgbClr val="F26B43"/>
           </p15:clr>
         </p15:guide>
-        <p15:guide id="4294967295" orient="horz" pos="1512">
+        <p15:guide id="5" orient="horz" pos="1512">
           <p15:clr>
             <a:srgbClr val="F26B43"/>
           </p15:clr>
         </p15:guide>
-        <p15:guide id="4294967295" pos="6912">
+        <p15:guide id="6" pos="6912">
           <p15:clr>
             <a:srgbClr val="F26B43"/>
           </p15:clr>
         </p15:guide>
-        <p15:guide id="4294967295" pos="936">
+        <p15:guide id="7" pos="936">
           <p15:clr>
             <a:srgbClr val="F26B43"/>
           </p15:clr>
         </p15:guide>
-        <p15:guide id="4294967295" pos="864">
+        <p15:guide id="8" pos="864">
           <p15:clr>
             <a:srgbClr val="F26B43"/>
           </p15:clr>
@@ -4058,42 +4065,76 @@
           <a:p>
             <a:pPr algn="ctr"/>
             <a:r>
-              <a:rPr lang="en-US" b="1" u="sng" dirty="0"/>
-              <a:t>Audio Bluetooth module (WT32I-A-AI6)</a:t>
-            </a:r>
-            <a:endParaRPr lang="en-US" dirty="0"/>
-          </a:p>
-        </p:txBody>
-      </p:sp>
-      <p:sp>
-        <p:nvSpPr>
-          <p:cNvPr id="3" name="Content Placeholder 2"/>
-          <p:cNvSpPr>
-            <a:spLocks noGrp="1"/>
-          </p:cNvSpPr>
+              <a:rPr lang="en-US" b="1" u="sng" dirty="0" smtClean="0"/>
+              <a:t>PDM2PCM Conversion</a:t>
+            </a:r>
+            <a:endParaRPr lang="en-US" b="1" u="sng" dirty="0"/>
+          </a:p>
+        </p:txBody>
+      </p:sp>
+      <p:pic>
+        <p:nvPicPr>
+          <p:cNvPr id="4" name="Content Placeholder 3"/>
+          <p:cNvPicPr>
+            <a:picLocks noGrp="1"/>
+          </p:cNvPicPr>
           <p:nvPr>
             <p:ph idx="1"/>
           </p:nvPr>
-        </p:nvSpPr>
-        <p:spPr/>
-        <p:txBody>
-          <a:bodyPr/>
-          <a:lstStyle/>
-          <a:p>
-            <a:endParaRPr lang="en-US"/>
-          </a:p>
-        </p:txBody>
-      </p:sp>
+        </p:nvPicPr>
+        <p:blipFill rotWithShape="1">
+          <a:blip r:embed="rId2"/>
+          <a:srcRect t="9104"/>
+          <a:stretch/>
+        </p:blipFill>
+        <p:spPr>
+          <a:xfrm>
+            <a:off x="2405060" y="2165604"/>
+            <a:ext cx="7534275" cy="2008632"/>
+          </a:xfrm>
+          <a:prstGeom prst="rect">
+            <a:avLst/>
+          </a:prstGeom>
+        </p:spPr>
+      </p:pic>
+      <p:pic>
+        <p:nvPicPr>
+          <p:cNvPr id="5" name="Picture 4"/>
+          <p:cNvPicPr/>
+          <p:nvPr/>
+        </p:nvPicPr>
+        <p:blipFill rotWithShape="1">
+          <a:blip r:embed="rId3"/>
+          <a:srcRect t="9592"/>
+          <a:stretch/>
+        </p:blipFill>
+        <p:spPr>
+          <a:xfrm>
+            <a:off x="3031806" y="4991100"/>
+            <a:ext cx="6280785" cy="1350264"/>
+          </a:xfrm>
+          <a:prstGeom prst="rect">
+            <a:avLst/>
+          </a:prstGeom>
+        </p:spPr>
+      </p:pic>
     </p:spTree>
     <p:extLst>
       <p:ext uri="{BB962C8B-B14F-4D97-AF65-F5344CB8AC3E}">
-        <p14:creationId xmlns:p14="http://schemas.microsoft.com/office/powerpoint/2010/main" val="3316276132"/>
+        <p14:creationId xmlns:p14="http://schemas.microsoft.com/office/powerpoint/2010/main" val="752666886"/>
       </p:ext>
     </p:extLst>
   </p:cSld>
   <p:clrMapOvr>
     <a:masterClrMapping/>
   </p:clrMapOvr>
+  <p:timing>
+    <p:tnLst>
+      <p:par>
+        <p:cTn id="1" dur="indefinite" restart="never" nodeType="tmRoot"/>
+      </p:par>
+    </p:tnLst>
+  </p:timing>
 </p:sld>
 </file>
 
@@ -4126,15 +4167,16 @@
         </p:nvSpPr>
         <p:spPr/>
         <p:txBody>
-          <a:bodyPr/>
+          <a:bodyPr>
+            <a:normAutofit/>
+          </a:bodyPr>
           <a:lstStyle/>
           <a:p>
             <a:pPr algn="ctr"/>
             <a:r>
-              <a:rPr lang="en-US" b="1" u="sng" dirty="0" smtClean="0"/>
-              <a:t>Hardware Components</a:t>
-            </a:r>
-            <a:endParaRPr lang="en-US" b="1" u="sng" dirty="0"/>
+              <a:rPr lang="en-US" b="1" u="sng" dirty="0"/>
+              <a:t>Audio codec (CS43L22)</a:t>
+            </a:r>
           </a:p>
         </p:txBody>
       </p:sp>
@@ -4160,7 +4202,7 @@
     </p:spTree>
     <p:extLst>
       <p:ext uri="{BB962C8B-B14F-4D97-AF65-F5344CB8AC3E}">
-        <p14:creationId xmlns:p14="http://schemas.microsoft.com/office/powerpoint/2010/main" val="2454449544"/>
+        <p14:creationId xmlns:p14="http://schemas.microsoft.com/office/powerpoint/2010/main" val="1847720716"/>
       </p:ext>
     </p:extLst>
   </p:cSld>
@@ -4204,6 +4246,152 @@
           <a:p>
             <a:pPr algn="ctr"/>
             <a:r>
+              <a:rPr lang="en-US" b="1" u="sng" dirty="0"/>
+              <a:t>Audio Bluetooth module (WT32I-A-AI6)</a:t>
+            </a:r>
+            <a:endParaRPr lang="en-US" dirty="0"/>
+          </a:p>
+        </p:txBody>
+      </p:sp>
+      <p:sp>
+        <p:nvSpPr>
+          <p:cNvPr id="3" name="Content Placeholder 2"/>
+          <p:cNvSpPr>
+            <a:spLocks noGrp="1"/>
+          </p:cNvSpPr>
+          <p:nvPr>
+            <p:ph idx="1"/>
+          </p:nvPr>
+        </p:nvSpPr>
+        <p:spPr/>
+        <p:txBody>
+          <a:bodyPr/>
+          <a:lstStyle/>
+          <a:p>
+            <a:endParaRPr lang="en-US"/>
+          </a:p>
+        </p:txBody>
+      </p:sp>
+    </p:spTree>
+    <p:extLst>
+      <p:ext uri="{BB962C8B-B14F-4D97-AF65-F5344CB8AC3E}">
+        <p14:creationId xmlns:p14="http://schemas.microsoft.com/office/powerpoint/2010/main" val="3316276132"/>
+      </p:ext>
+    </p:extLst>
+  </p:cSld>
+  <p:clrMapOvr>
+    <a:masterClrMapping/>
+  </p:clrMapOvr>
+</p:sld>
+</file>
+
+<file path=ppt/slides/slide13.xml><?xml version="1.0" encoding="utf-8"?>
+<p:sld xmlns:a="http://schemas.openxmlformats.org/drawingml/2006/main" xmlns:r="http://schemas.openxmlformats.org/officeDocument/2006/relationships" xmlns:p="http://schemas.openxmlformats.org/presentationml/2006/main">
+  <p:cSld>
+    <p:spTree>
+      <p:nvGrpSpPr>
+        <p:cNvPr id="1" name=""/>
+        <p:cNvGrpSpPr/>
+        <p:nvPr/>
+      </p:nvGrpSpPr>
+      <p:grpSpPr>
+        <a:xfrm>
+          <a:off x="0" y="0"/>
+          <a:ext cx="0" cy="0"/>
+          <a:chOff x="0" y="0"/>
+          <a:chExt cx="0" cy="0"/>
+        </a:xfrm>
+      </p:grpSpPr>
+      <p:sp>
+        <p:nvSpPr>
+          <p:cNvPr id="2" name="Title 1"/>
+          <p:cNvSpPr>
+            <a:spLocks noGrp="1"/>
+          </p:cNvSpPr>
+          <p:nvPr>
+            <p:ph type="title"/>
+          </p:nvPr>
+        </p:nvSpPr>
+        <p:spPr/>
+        <p:txBody>
+          <a:bodyPr/>
+          <a:lstStyle/>
+          <a:p>
+            <a:pPr algn="ctr"/>
+            <a:r>
+              <a:rPr lang="en-US" b="1" u="sng" dirty="0" smtClean="0"/>
+              <a:t>Hardware Components</a:t>
+            </a:r>
+            <a:endParaRPr lang="en-US" b="1" u="sng" dirty="0"/>
+          </a:p>
+        </p:txBody>
+      </p:sp>
+      <p:sp>
+        <p:nvSpPr>
+          <p:cNvPr id="3" name="Content Placeholder 2"/>
+          <p:cNvSpPr>
+            <a:spLocks noGrp="1"/>
+          </p:cNvSpPr>
+          <p:nvPr>
+            <p:ph idx="1"/>
+          </p:nvPr>
+        </p:nvSpPr>
+        <p:spPr/>
+        <p:txBody>
+          <a:bodyPr/>
+          <a:lstStyle/>
+          <a:p>
+            <a:endParaRPr lang="en-US"/>
+          </a:p>
+        </p:txBody>
+      </p:sp>
+    </p:spTree>
+    <p:extLst>
+      <p:ext uri="{BB962C8B-B14F-4D97-AF65-F5344CB8AC3E}">
+        <p14:creationId xmlns:p14="http://schemas.microsoft.com/office/powerpoint/2010/main" val="2454449544"/>
+      </p:ext>
+    </p:extLst>
+  </p:cSld>
+  <p:clrMapOvr>
+    <a:masterClrMapping/>
+  </p:clrMapOvr>
+</p:sld>
+</file>
+
+<file path=ppt/slides/slide14.xml><?xml version="1.0" encoding="utf-8"?>
+<p:sld xmlns:a="http://schemas.openxmlformats.org/drawingml/2006/main" xmlns:r="http://schemas.openxmlformats.org/officeDocument/2006/relationships" xmlns:p="http://schemas.openxmlformats.org/presentationml/2006/main">
+  <p:cSld>
+    <p:spTree>
+      <p:nvGrpSpPr>
+        <p:cNvPr id="1" name=""/>
+        <p:cNvGrpSpPr/>
+        <p:nvPr/>
+      </p:nvGrpSpPr>
+      <p:grpSpPr>
+        <a:xfrm>
+          <a:off x="0" y="0"/>
+          <a:ext cx="0" cy="0"/>
+          <a:chOff x="0" y="0"/>
+          <a:chExt cx="0" cy="0"/>
+        </a:xfrm>
+      </p:grpSpPr>
+      <p:sp>
+        <p:nvSpPr>
+          <p:cNvPr id="2" name="Title 1"/>
+          <p:cNvSpPr>
+            <a:spLocks noGrp="1"/>
+          </p:cNvSpPr>
+          <p:nvPr>
+            <p:ph type="title"/>
+          </p:nvPr>
+        </p:nvSpPr>
+        <p:spPr/>
+        <p:txBody>
+          <a:bodyPr/>
+          <a:lstStyle/>
+          <a:p>
+            <a:pPr algn="ctr"/>
+            <a:r>
               <a:rPr lang="en-US" b="1" u="sng" dirty="0" smtClean="0"/>
               <a:t>PCB Designs</a:t>
             </a:r>
@@ -4243,7 +4431,7 @@
 </p:sld>
 </file>
 
-<file path=ppt/slides/slide13.xml><?xml version="1.0" encoding="utf-8"?>
+<file path=ppt/slides/slide15.xml><?xml version="1.0" encoding="utf-8"?>
 <p:sld xmlns:a="http://schemas.openxmlformats.org/drawingml/2006/main" xmlns:r="http://schemas.openxmlformats.org/officeDocument/2006/relationships" xmlns:p="http://schemas.openxmlformats.org/presentationml/2006/main">
   <p:cSld>
     <p:spTree>
@@ -4436,41 +4624,35 @@
             <a:pPr algn="ctr"/>
             <a:r>
               <a:rPr lang="en-US" b="1" u="sng" dirty="0" smtClean="0"/>
-              <a:t>Block Diagram</a:t>
+              <a:t>Early Prototype</a:t>
             </a:r>
             <a:endParaRPr lang="en-US" b="1" u="sng" dirty="0"/>
           </a:p>
         </p:txBody>
       </p:sp>
-      <p:pic>
-        <p:nvPicPr>
-          <p:cNvPr id="4" name="Content Placeholder 3"/>
-          <p:cNvPicPr>
-            <a:picLocks noGrp="1"/>
-          </p:cNvPicPr>
+      <p:sp>
+        <p:nvSpPr>
+          <p:cNvPr id="3" name="Content Placeholder 2"/>
+          <p:cNvSpPr>
+            <a:spLocks noGrp="1"/>
+          </p:cNvSpPr>
           <p:nvPr>
             <p:ph idx="1"/>
           </p:nvPr>
-        </p:nvPicPr>
-        <p:blipFill rotWithShape="1">
-          <a:blip r:embed="rId2"/>
-          <a:srcRect t="4851"/>
-          <a:stretch/>
-        </p:blipFill>
-        <p:spPr>
-          <a:xfrm>
-            <a:off x="3198652" y="2171700"/>
-            <a:ext cx="5947095" cy="3407664"/>
-          </a:xfrm>
-          <a:prstGeom prst="rect">
-            <a:avLst/>
-          </a:prstGeom>
-        </p:spPr>
-      </p:pic>
+        </p:nvSpPr>
+        <p:spPr/>
+        <p:txBody>
+          <a:bodyPr/>
+          <a:lstStyle/>
+          <a:p>
+            <a:endParaRPr lang="en-US"/>
+          </a:p>
+        </p:txBody>
+      </p:sp>
     </p:spTree>
     <p:extLst>
       <p:ext uri="{BB962C8B-B14F-4D97-AF65-F5344CB8AC3E}">
-        <p14:creationId xmlns:p14="http://schemas.microsoft.com/office/powerpoint/2010/main" val="4241332501"/>
+        <p14:creationId xmlns:p14="http://schemas.microsoft.com/office/powerpoint/2010/main" val="3908622420"/>
       </p:ext>
     </p:extLst>
   </p:cSld>
@@ -4515,7 +4697,7 @@
             <a:pPr algn="ctr"/>
             <a:r>
               <a:rPr lang="en-US" b="1" u="sng" dirty="0" smtClean="0"/>
-              <a:t>MEMS Microphones</a:t>
+              <a:t>Block Diagram</a:t>
             </a:r>
             <a:endParaRPr lang="en-US" b="1" u="sng" dirty="0"/>
           </a:p>
@@ -4533,13 +4715,13 @@
         </p:nvPicPr>
         <p:blipFill rotWithShape="1">
           <a:blip r:embed="rId2"/>
-          <a:srcRect t="7416"/>
+          <a:srcRect t="4851"/>
           <a:stretch/>
         </p:blipFill>
         <p:spPr>
           <a:xfrm>
-            <a:off x="2443162" y="2171700"/>
-            <a:ext cx="7458075" cy="3139440"/>
+            <a:off x="3198652" y="2171700"/>
+            <a:ext cx="5947095" cy="3407664"/>
           </a:xfrm>
           <a:prstGeom prst="rect">
             <a:avLst/>
@@ -4549,13 +4731,20 @@
     </p:spTree>
     <p:extLst>
       <p:ext uri="{BB962C8B-B14F-4D97-AF65-F5344CB8AC3E}">
-        <p14:creationId xmlns:p14="http://schemas.microsoft.com/office/powerpoint/2010/main" val="3694460086"/>
+        <p14:creationId xmlns:p14="http://schemas.microsoft.com/office/powerpoint/2010/main" val="4241332501"/>
       </p:ext>
     </p:extLst>
   </p:cSld>
   <p:clrMapOvr>
     <a:masterClrMapping/>
   </p:clrMapOvr>
+  <p:timing>
+    <p:tnLst>
+      <p:par>
+        <p:cTn id="1" dur="indefinite" restart="never" nodeType="tmRoot"/>
+      </p:par>
+    </p:tnLst>
+  </p:timing>
 </p:sld>
 </file>
 
@@ -4578,63 +4767,1406 @@
       </p:grpSpPr>
       <p:sp>
         <p:nvSpPr>
-          <p:cNvPr id="2" name="Title 1"/>
-          <p:cNvSpPr>
-            <a:spLocks noGrp="1"/>
-          </p:cNvSpPr>
-          <p:nvPr>
-            <p:ph type="title"/>
-          </p:nvPr>
-        </p:nvSpPr>
-        <p:spPr/>
-        <p:txBody>
-          <a:bodyPr/>
-          <a:lstStyle/>
-          <a:p>
-            <a:pPr algn="ctr"/>
-            <a:r>
-              <a:rPr lang="en-US" b="1" u="sng" dirty="0" smtClean="0"/>
-              <a:t>PDM Signal</a:t>
-            </a:r>
-            <a:endParaRPr lang="en-US" b="1" u="sng" dirty="0"/>
-          </a:p>
-        </p:txBody>
-      </p:sp>
-      <p:pic>
-        <p:nvPicPr>
-          <p:cNvPr id="4" name="Content Placeholder 3"/>
-          <p:cNvPicPr>
-            <a:picLocks noGrp="1"/>
-          </p:cNvPicPr>
-          <p:nvPr>
-            <p:ph idx="1"/>
-          </p:nvPr>
-        </p:nvPicPr>
-        <p:blipFill rotWithShape="1">
-          <a:blip r:embed="rId2"/>
-          <a:srcRect t="5617"/>
-          <a:stretch/>
-        </p:blipFill>
-        <p:spPr>
-          <a:xfrm>
-            <a:off x="2754374" y="2171700"/>
-            <a:ext cx="6835652" cy="3380232"/>
-          </a:xfrm>
-          <a:prstGeom prst="rect">
+          <p:cNvPr id="12" name="Rounded Rectangle 11"/>
+          <p:cNvSpPr/>
+          <p:nvPr/>
+        </p:nvSpPr>
+        <p:spPr>
+          <a:xfrm>
+            <a:off x="3008376" y="1458468"/>
+            <a:ext cx="4718304" cy="5312664"/>
+          </a:xfrm>
+          <a:prstGeom prst="roundRect">
             <a:avLst/>
           </a:prstGeom>
         </p:spPr>
-      </p:pic>
+        <p:style>
+          <a:lnRef idx="2">
+            <a:schemeClr val="accent1">
+              <a:shade val="50000"/>
+            </a:schemeClr>
+          </a:lnRef>
+          <a:fillRef idx="1">
+            <a:schemeClr val="accent1"/>
+          </a:fillRef>
+          <a:effectRef idx="0">
+            <a:schemeClr val="accent1"/>
+          </a:effectRef>
+          <a:fontRef idx="minor">
+            <a:schemeClr val="lt1"/>
+          </a:fontRef>
+        </p:style>
+        <p:txBody>
+          <a:bodyPr rtlCol="0" anchor="ctr"/>
+          <a:lstStyle/>
+          <a:p>
+            <a:pPr algn="ctr"/>
+            <a:endParaRPr lang="en-US"/>
+          </a:p>
+        </p:txBody>
+      </p:sp>
+      <p:sp>
+        <p:nvSpPr>
+          <p:cNvPr id="2" name="Title 1"/>
+          <p:cNvSpPr>
+            <a:spLocks noGrp="1"/>
+          </p:cNvSpPr>
+          <p:nvPr>
+            <p:ph type="title"/>
+          </p:nvPr>
+        </p:nvSpPr>
+        <p:spPr>
+          <a:xfrm>
+            <a:off x="1371600" y="685800"/>
+            <a:ext cx="9601200" cy="816102"/>
+          </a:xfrm>
+        </p:spPr>
+        <p:txBody>
+          <a:bodyPr/>
+          <a:lstStyle/>
+          <a:p>
+            <a:pPr algn="ctr"/>
+            <a:r>
+              <a:rPr lang="en-US" b="1" u="sng" dirty="0" smtClean="0"/>
+              <a:t>Block Diagram</a:t>
+            </a:r>
+            <a:endParaRPr lang="en-US" b="1" u="sng" dirty="0"/>
+          </a:p>
+        </p:txBody>
+      </p:sp>
+      <p:sp>
+        <p:nvSpPr>
+          <p:cNvPr id="5" name="Rounded Rectangle 4"/>
+          <p:cNvSpPr/>
+          <p:nvPr/>
+        </p:nvSpPr>
+        <p:spPr>
+          <a:xfrm>
+            <a:off x="749046" y="2293429"/>
+            <a:ext cx="1577340" cy="753237"/>
+          </a:xfrm>
+          <a:prstGeom prst="roundRect">
+            <a:avLst/>
+          </a:prstGeom>
+        </p:spPr>
+        <p:style>
+          <a:lnRef idx="0">
+            <a:schemeClr val="accent2"/>
+          </a:lnRef>
+          <a:fillRef idx="3">
+            <a:schemeClr val="accent2"/>
+          </a:fillRef>
+          <a:effectRef idx="3">
+            <a:schemeClr val="accent2"/>
+          </a:effectRef>
+          <a:fontRef idx="minor">
+            <a:schemeClr val="lt1"/>
+          </a:fontRef>
+        </p:style>
+        <p:txBody>
+          <a:bodyPr rtlCol="0" anchor="ctr"/>
+          <a:lstStyle/>
+          <a:p>
+            <a:pPr algn="ctr"/>
+            <a:r>
+              <a:rPr lang="en-US" dirty="0" smtClean="0"/>
+              <a:t>MEMS Microphone</a:t>
+            </a:r>
+            <a:endParaRPr lang="en-US" dirty="0"/>
+          </a:p>
+        </p:txBody>
+      </p:sp>
+      <p:sp>
+        <p:nvSpPr>
+          <p:cNvPr id="6" name="Rounded Rectangle 5"/>
+          <p:cNvSpPr/>
+          <p:nvPr/>
+        </p:nvSpPr>
+        <p:spPr>
+          <a:xfrm>
+            <a:off x="3185160" y="2367152"/>
+            <a:ext cx="1892808" cy="605790"/>
+          </a:xfrm>
+          <a:prstGeom prst="roundRect">
+            <a:avLst/>
+          </a:prstGeom>
+        </p:spPr>
+        <p:style>
+          <a:lnRef idx="0">
+            <a:schemeClr val="accent5"/>
+          </a:lnRef>
+          <a:fillRef idx="3">
+            <a:schemeClr val="accent5"/>
+          </a:fillRef>
+          <a:effectRef idx="3">
+            <a:schemeClr val="accent5"/>
+          </a:effectRef>
+          <a:fontRef idx="minor">
+            <a:schemeClr val="lt1"/>
+          </a:fontRef>
+        </p:style>
+        <p:txBody>
+          <a:bodyPr rtlCol="0" anchor="ctr"/>
+          <a:lstStyle/>
+          <a:p>
+            <a:pPr algn="ctr"/>
+            <a:r>
+              <a:rPr lang="en-US" dirty="0" smtClean="0"/>
+              <a:t>I2S Peripheral</a:t>
+            </a:r>
+            <a:endParaRPr lang="en-US" dirty="0"/>
+          </a:p>
+        </p:txBody>
+      </p:sp>
+      <p:sp>
+        <p:nvSpPr>
+          <p:cNvPr id="7" name="Rounded Rectangle 6"/>
+          <p:cNvSpPr/>
+          <p:nvPr/>
+        </p:nvSpPr>
+        <p:spPr>
+          <a:xfrm>
+            <a:off x="6310884" y="2366580"/>
+            <a:ext cx="807720" cy="585216"/>
+          </a:xfrm>
+          <a:prstGeom prst="roundRect">
+            <a:avLst/>
+          </a:prstGeom>
+        </p:spPr>
+        <p:style>
+          <a:lnRef idx="0">
+            <a:schemeClr val="accent5"/>
+          </a:lnRef>
+          <a:fillRef idx="3">
+            <a:schemeClr val="accent5"/>
+          </a:fillRef>
+          <a:effectRef idx="3">
+            <a:schemeClr val="accent5"/>
+          </a:effectRef>
+          <a:fontRef idx="minor">
+            <a:schemeClr val="lt1"/>
+          </a:fontRef>
+        </p:style>
+        <p:txBody>
+          <a:bodyPr rtlCol="0" anchor="ctr"/>
+          <a:lstStyle/>
+          <a:p>
+            <a:pPr algn="ctr"/>
+            <a:r>
+              <a:rPr lang="en-US" dirty="0" smtClean="0"/>
+              <a:t>DMA</a:t>
+            </a:r>
+            <a:endParaRPr lang="en-US" dirty="0"/>
+          </a:p>
+        </p:txBody>
+      </p:sp>
+      <p:sp>
+        <p:nvSpPr>
+          <p:cNvPr id="8" name="Rounded Rectangle 7"/>
+          <p:cNvSpPr/>
+          <p:nvPr/>
+        </p:nvSpPr>
+        <p:spPr>
+          <a:xfrm>
+            <a:off x="6310884" y="3502152"/>
+            <a:ext cx="807720" cy="612648"/>
+          </a:xfrm>
+          <a:prstGeom prst="roundRect">
+            <a:avLst/>
+          </a:prstGeom>
+        </p:spPr>
+        <p:style>
+          <a:lnRef idx="0">
+            <a:schemeClr val="accent5"/>
+          </a:lnRef>
+          <a:fillRef idx="3">
+            <a:schemeClr val="accent5"/>
+          </a:fillRef>
+          <a:effectRef idx="3">
+            <a:schemeClr val="accent5"/>
+          </a:effectRef>
+          <a:fontRef idx="minor">
+            <a:schemeClr val="lt1"/>
+          </a:fontRef>
+        </p:style>
+        <p:txBody>
+          <a:bodyPr rtlCol="0" anchor="ctr"/>
+          <a:lstStyle/>
+          <a:p>
+            <a:pPr algn="ctr"/>
+            <a:r>
+              <a:rPr lang="en-US" dirty="0" smtClean="0"/>
+              <a:t>RAM</a:t>
+            </a:r>
+            <a:endParaRPr lang="en-US" dirty="0"/>
+          </a:p>
+        </p:txBody>
+      </p:sp>
+      <p:sp>
+        <p:nvSpPr>
+          <p:cNvPr id="9" name="Rounded Rectangle 8"/>
+          <p:cNvSpPr/>
+          <p:nvPr/>
+        </p:nvSpPr>
+        <p:spPr>
+          <a:xfrm>
+            <a:off x="3710940" y="3502152"/>
+            <a:ext cx="751332" cy="612648"/>
+          </a:xfrm>
+          <a:prstGeom prst="roundRect">
+            <a:avLst/>
+          </a:prstGeom>
+        </p:spPr>
+        <p:style>
+          <a:lnRef idx="0">
+            <a:schemeClr val="accent5"/>
+          </a:lnRef>
+          <a:fillRef idx="3">
+            <a:schemeClr val="accent5"/>
+          </a:fillRef>
+          <a:effectRef idx="3">
+            <a:schemeClr val="accent5"/>
+          </a:effectRef>
+          <a:fontRef idx="minor">
+            <a:schemeClr val="lt1"/>
+          </a:fontRef>
+        </p:style>
+        <p:txBody>
+          <a:bodyPr rtlCol="0" anchor="ctr"/>
+          <a:lstStyle/>
+          <a:p>
+            <a:pPr algn="ctr"/>
+            <a:r>
+              <a:rPr lang="en-US" dirty="0" smtClean="0"/>
+              <a:t>CPU</a:t>
+            </a:r>
+            <a:endParaRPr lang="en-US" dirty="0"/>
+          </a:p>
+        </p:txBody>
+      </p:sp>
+      <p:sp>
+        <p:nvSpPr>
+          <p:cNvPr id="10" name="Rounded Rectangle 9"/>
+          <p:cNvSpPr/>
+          <p:nvPr/>
+        </p:nvSpPr>
+        <p:spPr>
+          <a:xfrm>
+            <a:off x="3206115" y="5637276"/>
+            <a:ext cx="751332" cy="557784"/>
+          </a:xfrm>
+          <a:prstGeom prst="roundRect">
+            <a:avLst/>
+          </a:prstGeom>
+        </p:spPr>
+        <p:style>
+          <a:lnRef idx="0">
+            <a:schemeClr val="accent5"/>
+          </a:lnRef>
+          <a:fillRef idx="3">
+            <a:schemeClr val="accent5"/>
+          </a:fillRef>
+          <a:effectRef idx="3">
+            <a:schemeClr val="accent5"/>
+          </a:effectRef>
+          <a:fontRef idx="minor">
+            <a:schemeClr val="lt1"/>
+          </a:fontRef>
+        </p:style>
+        <p:txBody>
+          <a:bodyPr rtlCol="0" anchor="ctr"/>
+          <a:lstStyle/>
+          <a:p>
+            <a:pPr algn="ctr"/>
+            <a:r>
+              <a:rPr lang="en-US" dirty="0" smtClean="0"/>
+              <a:t>DMA</a:t>
+            </a:r>
+            <a:endParaRPr lang="en-US" dirty="0"/>
+          </a:p>
+        </p:txBody>
+      </p:sp>
+      <p:sp>
+        <p:nvSpPr>
+          <p:cNvPr id="11" name="Rounded Rectangle 10"/>
+          <p:cNvSpPr/>
+          <p:nvPr/>
+        </p:nvSpPr>
+        <p:spPr>
+          <a:xfrm>
+            <a:off x="5364480" y="5642991"/>
+            <a:ext cx="1892808" cy="552069"/>
+          </a:xfrm>
+          <a:prstGeom prst="roundRect">
+            <a:avLst/>
+          </a:prstGeom>
+        </p:spPr>
+        <p:style>
+          <a:lnRef idx="0">
+            <a:schemeClr val="accent5"/>
+          </a:lnRef>
+          <a:fillRef idx="3">
+            <a:schemeClr val="accent5"/>
+          </a:fillRef>
+          <a:effectRef idx="3">
+            <a:schemeClr val="accent5"/>
+          </a:effectRef>
+          <a:fontRef idx="minor">
+            <a:schemeClr val="lt1"/>
+          </a:fontRef>
+        </p:style>
+        <p:txBody>
+          <a:bodyPr rtlCol="0" anchor="ctr"/>
+          <a:lstStyle/>
+          <a:p>
+            <a:pPr algn="ctr"/>
+            <a:r>
+              <a:rPr lang="en-US" dirty="0"/>
+              <a:t>I2S </a:t>
+            </a:r>
+            <a:r>
+              <a:rPr lang="en-US" dirty="0" smtClean="0"/>
+              <a:t>Peripheral</a:t>
+            </a:r>
+            <a:endParaRPr lang="en-US" dirty="0"/>
+          </a:p>
+        </p:txBody>
+      </p:sp>
+      <p:sp>
+        <p:nvSpPr>
+          <p:cNvPr id="18" name="Rounded Rectangle 17"/>
+          <p:cNvSpPr/>
+          <p:nvPr/>
+        </p:nvSpPr>
+        <p:spPr>
+          <a:xfrm>
+            <a:off x="8199120" y="1412177"/>
+            <a:ext cx="2670048" cy="2542032"/>
+          </a:xfrm>
+          <a:prstGeom prst="roundRect">
+            <a:avLst/>
+          </a:prstGeom>
+        </p:spPr>
+        <p:style>
+          <a:lnRef idx="2">
+            <a:schemeClr val="accent1">
+              <a:shade val="50000"/>
+            </a:schemeClr>
+          </a:lnRef>
+          <a:fillRef idx="1">
+            <a:schemeClr val="accent1"/>
+          </a:fillRef>
+          <a:effectRef idx="0">
+            <a:schemeClr val="accent1"/>
+          </a:effectRef>
+          <a:fontRef idx="minor">
+            <a:schemeClr val="lt1"/>
+          </a:fontRef>
+        </p:style>
+        <p:txBody>
+          <a:bodyPr rtlCol="0" anchor="ctr"/>
+          <a:lstStyle/>
+          <a:p>
+            <a:pPr algn="ctr"/>
+            <a:endParaRPr lang="en-US"/>
+          </a:p>
+        </p:txBody>
+      </p:sp>
+      <p:sp>
+        <p:nvSpPr>
+          <p:cNvPr id="19" name="Rounded Rectangle 18"/>
+          <p:cNvSpPr/>
+          <p:nvPr/>
+        </p:nvSpPr>
+        <p:spPr>
+          <a:xfrm>
+            <a:off x="8199120" y="4245102"/>
+            <a:ext cx="2682240" cy="2526030"/>
+          </a:xfrm>
+          <a:prstGeom prst="roundRect">
+            <a:avLst/>
+          </a:prstGeom>
+        </p:spPr>
+        <p:style>
+          <a:lnRef idx="2">
+            <a:schemeClr val="accent1">
+              <a:shade val="50000"/>
+            </a:schemeClr>
+          </a:lnRef>
+          <a:fillRef idx="1">
+            <a:schemeClr val="accent1"/>
+          </a:fillRef>
+          <a:effectRef idx="0">
+            <a:schemeClr val="accent1"/>
+          </a:effectRef>
+          <a:fontRef idx="minor">
+            <a:schemeClr val="lt1"/>
+          </a:fontRef>
+        </p:style>
+        <p:txBody>
+          <a:bodyPr rtlCol="0" anchor="ctr"/>
+          <a:lstStyle/>
+          <a:p>
+            <a:pPr algn="ctr"/>
+            <a:endParaRPr lang="en-US"/>
+          </a:p>
+        </p:txBody>
+      </p:sp>
+      <p:sp>
+        <p:nvSpPr>
+          <p:cNvPr id="20" name="Rounded Rectangle 19"/>
+          <p:cNvSpPr/>
+          <p:nvPr/>
+        </p:nvSpPr>
+        <p:spPr>
+          <a:xfrm>
+            <a:off x="8587740" y="2215991"/>
+            <a:ext cx="1892808" cy="637794"/>
+          </a:xfrm>
+          <a:prstGeom prst="roundRect">
+            <a:avLst/>
+          </a:prstGeom>
+        </p:spPr>
+        <p:style>
+          <a:lnRef idx="0">
+            <a:schemeClr val="accent5"/>
+          </a:lnRef>
+          <a:fillRef idx="3">
+            <a:schemeClr val="accent5"/>
+          </a:fillRef>
+          <a:effectRef idx="3">
+            <a:schemeClr val="accent5"/>
+          </a:effectRef>
+          <a:fontRef idx="minor">
+            <a:schemeClr val="lt1"/>
+          </a:fontRef>
+        </p:style>
+        <p:txBody>
+          <a:bodyPr rtlCol="0" anchor="ctr"/>
+          <a:lstStyle/>
+          <a:p>
+            <a:pPr algn="ctr"/>
+            <a:r>
+              <a:rPr lang="en-US" dirty="0" smtClean="0"/>
+              <a:t>I2S Peripheral</a:t>
+            </a:r>
+            <a:endParaRPr lang="en-US" dirty="0"/>
+          </a:p>
+        </p:txBody>
+      </p:sp>
+      <p:sp>
+        <p:nvSpPr>
+          <p:cNvPr id="21" name="Rounded Rectangle 20"/>
+          <p:cNvSpPr/>
+          <p:nvPr/>
+        </p:nvSpPr>
+        <p:spPr>
+          <a:xfrm>
+            <a:off x="8593836" y="5067491"/>
+            <a:ext cx="1892808" cy="573786"/>
+          </a:xfrm>
+          <a:prstGeom prst="roundRect">
+            <a:avLst/>
+          </a:prstGeom>
+        </p:spPr>
+        <p:style>
+          <a:lnRef idx="0">
+            <a:schemeClr val="accent5"/>
+          </a:lnRef>
+          <a:fillRef idx="3">
+            <a:schemeClr val="accent5"/>
+          </a:fillRef>
+          <a:effectRef idx="3">
+            <a:schemeClr val="accent5"/>
+          </a:effectRef>
+          <a:fontRef idx="minor">
+            <a:schemeClr val="lt1"/>
+          </a:fontRef>
+        </p:style>
+        <p:txBody>
+          <a:bodyPr rtlCol="0" anchor="ctr"/>
+          <a:lstStyle/>
+          <a:p>
+            <a:pPr algn="ctr"/>
+            <a:r>
+              <a:rPr lang="en-US" dirty="0" smtClean="0"/>
+              <a:t>I2S Peripheral</a:t>
+            </a:r>
+            <a:endParaRPr lang="en-US" dirty="0"/>
+          </a:p>
+        </p:txBody>
+      </p:sp>
+      <p:sp>
+        <p:nvSpPr>
+          <p:cNvPr id="22" name="Rounded Rectangle 21"/>
+          <p:cNvSpPr/>
+          <p:nvPr/>
+        </p:nvSpPr>
+        <p:spPr>
+          <a:xfrm>
+            <a:off x="8593836" y="6055043"/>
+            <a:ext cx="1892808" cy="603504"/>
+          </a:xfrm>
+          <a:prstGeom prst="roundRect">
+            <a:avLst/>
+          </a:prstGeom>
+        </p:spPr>
+        <p:style>
+          <a:lnRef idx="0">
+            <a:schemeClr val="accent5"/>
+          </a:lnRef>
+          <a:fillRef idx="3">
+            <a:schemeClr val="accent5"/>
+          </a:fillRef>
+          <a:effectRef idx="3">
+            <a:schemeClr val="accent5"/>
+          </a:effectRef>
+          <a:fontRef idx="minor">
+            <a:schemeClr val="lt1"/>
+          </a:fontRef>
+        </p:style>
+        <p:txBody>
+          <a:bodyPr rtlCol="0" anchor="ctr"/>
+          <a:lstStyle/>
+          <a:p>
+            <a:pPr algn="ctr"/>
+            <a:r>
+              <a:rPr lang="en-US" dirty="0" smtClean="0"/>
+              <a:t>A2DP Peripheral</a:t>
+            </a:r>
+            <a:endParaRPr lang="en-US" dirty="0"/>
+          </a:p>
+        </p:txBody>
+      </p:sp>
+      <p:sp>
+        <p:nvSpPr>
+          <p:cNvPr id="23" name="Rounded Rectangle 22"/>
+          <p:cNvSpPr/>
+          <p:nvPr/>
+        </p:nvSpPr>
+        <p:spPr>
+          <a:xfrm>
+            <a:off x="8587740" y="3163539"/>
+            <a:ext cx="1892808" cy="637794"/>
+          </a:xfrm>
+          <a:prstGeom prst="roundRect">
+            <a:avLst/>
+          </a:prstGeom>
+        </p:spPr>
+        <p:style>
+          <a:lnRef idx="0">
+            <a:schemeClr val="accent5"/>
+          </a:lnRef>
+          <a:fillRef idx="3">
+            <a:schemeClr val="accent5"/>
+          </a:fillRef>
+          <a:effectRef idx="3">
+            <a:schemeClr val="accent5"/>
+          </a:effectRef>
+          <a:fontRef idx="minor">
+            <a:schemeClr val="lt1"/>
+          </a:fontRef>
+        </p:style>
+        <p:txBody>
+          <a:bodyPr rtlCol="0" anchor="ctr"/>
+          <a:lstStyle/>
+          <a:p>
+            <a:pPr algn="ctr"/>
+            <a:r>
+              <a:rPr lang="en-US" dirty="0" smtClean="0"/>
+              <a:t>DAC</a:t>
+            </a:r>
+            <a:endParaRPr lang="en-US" dirty="0"/>
+          </a:p>
+        </p:txBody>
+      </p:sp>
+      <p:sp>
+        <p:nvSpPr>
+          <p:cNvPr id="24" name="Rounded Rectangle 23"/>
+          <p:cNvSpPr/>
+          <p:nvPr/>
+        </p:nvSpPr>
+        <p:spPr>
+          <a:xfrm rot="5400000">
+            <a:off x="10739628" y="2972513"/>
+            <a:ext cx="1892808" cy="637794"/>
+          </a:xfrm>
+          <a:prstGeom prst="roundRect">
+            <a:avLst/>
+          </a:prstGeom>
+        </p:spPr>
+        <p:style>
+          <a:lnRef idx="0">
+            <a:schemeClr val="accent2"/>
+          </a:lnRef>
+          <a:fillRef idx="3">
+            <a:schemeClr val="accent2"/>
+          </a:fillRef>
+          <a:effectRef idx="3">
+            <a:schemeClr val="accent2"/>
+          </a:effectRef>
+          <a:fontRef idx="minor">
+            <a:schemeClr val="lt1"/>
+          </a:fontRef>
+        </p:style>
+        <p:txBody>
+          <a:bodyPr rtlCol="0" anchor="ctr"/>
+          <a:lstStyle/>
+          <a:p>
+            <a:pPr algn="ctr"/>
+            <a:r>
+              <a:rPr lang="en-US" dirty="0" smtClean="0"/>
+              <a:t>Headphones</a:t>
+            </a:r>
+            <a:endParaRPr lang="en-US" dirty="0"/>
+          </a:p>
+        </p:txBody>
+      </p:sp>
+      <p:sp>
+        <p:nvSpPr>
+          <p:cNvPr id="25" name="Rounded Rectangle 24"/>
+          <p:cNvSpPr/>
+          <p:nvPr/>
+        </p:nvSpPr>
+        <p:spPr>
+          <a:xfrm rot="5400000">
+            <a:off x="10841734" y="5443822"/>
+            <a:ext cx="1892808" cy="637794"/>
+          </a:xfrm>
+          <a:prstGeom prst="roundRect">
+            <a:avLst/>
+          </a:prstGeom>
+        </p:spPr>
+        <p:style>
+          <a:lnRef idx="0">
+            <a:schemeClr val="accent2"/>
+          </a:lnRef>
+          <a:fillRef idx="3">
+            <a:schemeClr val="accent2"/>
+          </a:fillRef>
+          <a:effectRef idx="3">
+            <a:schemeClr val="accent2"/>
+          </a:effectRef>
+          <a:fontRef idx="minor">
+            <a:schemeClr val="lt1"/>
+          </a:fontRef>
+        </p:style>
+        <p:txBody>
+          <a:bodyPr rtlCol="0" anchor="ctr"/>
+          <a:lstStyle/>
+          <a:p>
+            <a:pPr algn="ctr"/>
+            <a:r>
+              <a:rPr lang="en-US" dirty="0" smtClean="0"/>
+              <a:t>Bluetooth Earphone</a:t>
+            </a:r>
+            <a:endParaRPr lang="en-US" dirty="0"/>
+          </a:p>
+        </p:txBody>
+      </p:sp>
+      <p:sp>
+        <p:nvSpPr>
+          <p:cNvPr id="26" name="Rounded Rectangle 25"/>
+          <p:cNvSpPr/>
+          <p:nvPr/>
+        </p:nvSpPr>
+        <p:spPr>
+          <a:xfrm>
+            <a:off x="3458718" y="1583055"/>
+            <a:ext cx="997458" cy="612648"/>
+          </a:xfrm>
+          <a:prstGeom prst="roundRect">
+            <a:avLst/>
+          </a:prstGeom>
+        </p:spPr>
+        <p:style>
+          <a:lnRef idx="0">
+            <a:schemeClr val="accent2"/>
+          </a:lnRef>
+          <a:fillRef idx="3">
+            <a:schemeClr val="accent2"/>
+          </a:fillRef>
+          <a:effectRef idx="3">
+            <a:schemeClr val="accent2"/>
+          </a:effectRef>
+          <a:fontRef idx="minor">
+            <a:schemeClr val="lt1"/>
+          </a:fontRef>
+        </p:style>
+        <p:txBody>
+          <a:bodyPr rtlCol="0" anchor="ctr"/>
+          <a:lstStyle/>
+          <a:p>
+            <a:pPr algn="ctr"/>
+            <a:r>
+              <a:rPr lang="en-US" dirty="0" smtClean="0"/>
+              <a:t>STM32</a:t>
+            </a:r>
+            <a:endParaRPr lang="en-US" dirty="0"/>
+          </a:p>
+        </p:txBody>
+      </p:sp>
+      <p:sp>
+        <p:nvSpPr>
+          <p:cNvPr id="27" name="Rounded Rectangle 26"/>
+          <p:cNvSpPr/>
+          <p:nvPr/>
+        </p:nvSpPr>
+        <p:spPr>
+          <a:xfrm>
+            <a:off x="8426673" y="4306253"/>
+            <a:ext cx="1813941" cy="612648"/>
+          </a:xfrm>
+          <a:prstGeom prst="roundRect">
+            <a:avLst/>
+          </a:prstGeom>
+        </p:spPr>
+        <p:style>
+          <a:lnRef idx="0">
+            <a:schemeClr val="accent2"/>
+          </a:lnRef>
+          <a:fillRef idx="3">
+            <a:schemeClr val="accent2"/>
+          </a:fillRef>
+          <a:effectRef idx="3">
+            <a:schemeClr val="accent2"/>
+          </a:effectRef>
+          <a:fontRef idx="minor">
+            <a:schemeClr val="lt1"/>
+          </a:fontRef>
+        </p:style>
+        <p:txBody>
+          <a:bodyPr rtlCol="0" anchor="ctr"/>
+          <a:lstStyle/>
+          <a:p>
+            <a:pPr algn="ctr"/>
+            <a:r>
+              <a:rPr lang="en-US" dirty="0" smtClean="0"/>
+              <a:t>Audio Bluetooth</a:t>
+            </a:r>
+            <a:endParaRPr lang="en-US" dirty="0"/>
+          </a:p>
+        </p:txBody>
+      </p:sp>
+      <p:sp>
+        <p:nvSpPr>
+          <p:cNvPr id="28" name="Rounded Rectangle 27"/>
+          <p:cNvSpPr/>
+          <p:nvPr/>
+        </p:nvSpPr>
+        <p:spPr>
+          <a:xfrm>
+            <a:off x="8396478" y="1479614"/>
+            <a:ext cx="1455420" cy="612648"/>
+          </a:xfrm>
+          <a:prstGeom prst="roundRect">
+            <a:avLst/>
+          </a:prstGeom>
+        </p:spPr>
+        <p:style>
+          <a:lnRef idx="0">
+            <a:schemeClr val="accent2"/>
+          </a:lnRef>
+          <a:fillRef idx="3">
+            <a:schemeClr val="accent2"/>
+          </a:fillRef>
+          <a:effectRef idx="3">
+            <a:schemeClr val="accent2"/>
+          </a:effectRef>
+          <a:fontRef idx="minor">
+            <a:schemeClr val="lt1"/>
+          </a:fontRef>
+        </p:style>
+        <p:txBody>
+          <a:bodyPr rtlCol="0" anchor="ctr"/>
+          <a:lstStyle/>
+          <a:p>
+            <a:pPr algn="ctr"/>
+            <a:r>
+              <a:rPr lang="en-US" dirty="0" smtClean="0"/>
+              <a:t>Audio Codec</a:t>
+            </a:r>
+            <a:endParaRPr lang="en-US" dirty="0"/>
+          </a:p>
+        </p:txBody>
+      </p:sp>
+      <p:sp>
+        <p:nvSpPr>
+          <p:cNvPr id="29" name="Rounded Rectangle 28"/>
+          <p:cNvSpPr/>
+          <p:nvPr/>
+        </p:nvSpPr>
+        <p:spPr>
+          <a:xfrm>
+            <a:off x="4664202" y="4437126"/>
+            <a:ext cx="1406652" cy="612648"/>
+          </a:xfrm>
+          <a:prstGeom prst="roundRect">
+            <a:avLst/>
+          </a:prstGeom>
+        </p:spPr>
+        <p:style>
+          <a:lnRef idx="0">
+            <a:schemeClr val="accent5"/>
+          </a:lnRef>
+          <a:fillRef idx="3">
+            <a:schemeClr val="accent5"/>
+          </a:fillRef>
+          <a:effectRef idx="3">
+            <a:schemeClr val="accent5"/>
+          </a:effectRef>
+          <a:fontRef idx="minor">
+            <a:schemeClr val="lt1"/>
+          </a:fontRef>
+        </p:style>
+        <p:txBody>
+          <a:bodyPr rtlCol="0" anchor="ctr"/>
+          <a:lstStyle/>
+          <a:p>
+            <a:pPr algn="ctr"/>
+            <a:r>
+              <a:rPr lang="en-US" dirty="0" smtClean="0"/>
+              <a:t>DSP Filters</a:t>
+            </a:r>
+            <a:endParaRPr lang="en-US" dirty="0"/>
+          </a:p>
+        </p:txBody>
+      </p:sp>
+      <p:sp>
+        <p:nvSpPr>
+          <p:cNvPr id="30" name="Right Arrow 29"/>
+          <p:cNvSpPr/>
+          <p:nvPr/>
+        </p:nvSpPr>
+        <p:spPr>
+          <a:xfrm>
+            <a:off x="2130552" y="2293429"/>
+            <a:ext cx="1162812" cy="400765"/>
+          </a:xfrm>
+          <a:prstGeom prst="rightArrow">
+            <a:avLst/>
+          </a:prstGeom>
+        </p:spPr>
+        <p:style>
+          <a:lnRef idx="0">
+            <a:schemeClr val="accent4"/>
+          </a:lnRef>
+          <a:fillRef idx="3">
+            <a:schemeClr val="accent4"/>
+          </a:fillRef>
+          <a:effectRef idx="3">
+            <a:schemeClr val="accent4"/>
+          </a:effectRef>
+          <a:fontRef idx="minor">
+            <a:schemeClr val="lt1"/>
+          </a:fontRef>
+        </p:style>
+        <p:txBody>
+          <a:bodyPr rtlCol="0" anchor="ctr"/>
+          <a:lstStyle/>
+          <a:p>
+            <a:pPr algn="ctr"/>
+            <a:r>
+              <a:rPr lang="en-US" sz="1200" dirty="0" smtClean="0"/>
+              <a:t>PDM Data</a:t>
+            </a:r>
+            <a:endParaRPr lang="en-US" sz="1200" dirty="0"/>
+          </a:p>
+        </p:txBody>
+      </p:sp>
+      <p:sp>
+        <p:nvSpPr>
+          <p:cNvPr id="31" name="Left Arrow 30"/>
+          <p:cNvSpPr/>
+          <p:nvPr/>
+        </p:nvSpPr>
+        <p:spPr>
+          <a:xfrm>
+            <a:off x="2132076" y="2694194"/>
+            <a:ext cx="1161288" cy="352472"/>
+          </a:xfrm>
+          <a:prstGeom prst="leftArrow">
+            <a:avLst/>
+          </a:prstGeom>
+        </p:spPr>
+        <p:style>
+          <a:lnRef idx="0">
+            <a:schemeClr val="accent4"/>
+          </a:lnRef>
+          <a:fillRef idx="3">
+            <a:schemeClr val="accent4"/>
+          </a:fillRef>
+          <a:effectRef idx="3">
+            <a:schemeClr val="accent4"/>
+          </a:effectRef>
+          <a:fontRef idx="minor">
+            <a:schemeClr val="lt1"/>
+          </a:fontRef>
+        </p:style>
+        <p:txBody>
+          <a:bodyPr rtlCol="0" anchor="ctr"/>
+          <a:lstStyle/>
+          <a:p>
+            <a:pPr algn="ctr"/>
+            <a:r>
+              <a:rPr lang="en-US" sz="1200" dirty="0" smtClean="0"/>
+              <a:t>Clock Signal</a:t>
+            </a:r>
+            <a:endParaRPr lang="en-US" sz="1200" dirty="0"/>
+          </a:p>
+        </p:txBody>
+      </p:sp>
+      <p:sp>
+        <p:nvSpPr>
+          <p:cNvPr id="32" name="Right Arrow 31"/>
+          <p:cNvSpPr/>
+          <p:nvPr/>
+        </p:nvSpPr>
+        <p:spPr>
+          <a:xfrm>
+            <a:off x="5000435" y="2518939"/>
+            <a:ext cx="1387983" cy="302216"/>
+          </a:xfrm>
+          <a:prstGeom prst="rightArrow">
+            <a:avLst/>
+          </a:prstGeom>
+        </p:spPr>
+        <p:style>
+          <a:lnRef idx="0">
+            <a:schemeClr val="accent4"/>
+          </a:lnRef>
+          <a:fillRef idx="3">
+            <a:schemeClr val="accent4"/>
+          </a:fillRef>
+          <a:effectRef idx="3">
+            <a:schemeClr val="accent4"/>
+          </a:effectRef>
+          <a:fontRef idx="minor">
+            <a:schemeClr val="lt1"/>
+          </a:fontRef>
+        </p:style>
+        <p:txBody>
+          <a:bodyPr rtlCol="0" anchor="ctr"/>
+          <a:lstStyle/>
+          <a:p>
+            <a:pPr algn="ctr"/>
+            <a:endParaRPr lang="en-US" sz="1200" dirty="0"/>
+          </a:p>
+        </p:txBody>
+      </p:sp>
+      <p:sp>
+        <p:nvSpPr>
+          <p:cNvPr id="33" name="Right Arrow 32"/>
+          <p:cNvSpPr/>
+          <p:nvPr/>
+        </p:nvSpPr>
+        <p:spPr>
+          <a:xfrm rot="5400000">
+            <a:off x="6321979" y="3088223"/>
+            <a:ext cx="785529" cy="270648"/>
+          </a:xfrm>
+          <a:prstGeom prst="rightArrow">
+            <a:avLst/>
+          </a:prstGeom>
+        </p:spPr>
+        <p:style>
+          <a:lnRef idx="0">
+            <a:schemeClr val="accent4"/>
+          </a:lnRef>
+          <a:fillRef idx="3">
+            <a:schemeClr val="accent4"/>
+          </a:fillRef>
+          <a:effectRef idx="3">
+            <a:schemeClr val="accent4"/>
+          </a:effectRef>
+          <a:fontRef idx="minor">
+            <a:schemeClr val="lt1"/>
+          </a:fontRef>
+        </p:style>
+        <p:txBody>
+          <a:bodyPr rtlCol="0" anchor="ctr"/>
+          <a:lstStyle/>
+          <a:p>
+            <a:pPr algn="ctr"/>
+            <a:endParaRPr lang="en-US" sz="1200" dirty="0"/>
+          </a:p>
+        </p:txBody>
+      </p:sp>
+      <p:sp>
+        <p:nvSpPr>
+          <p:cNvPr id="34" name="Left-Right-Up Arrow 33"/>
+          <p:cNvSpPr/>
+          <p:nvPr/>
+        </p:nvSpPr>
+        <p:spPr>
+          <a:xfrm rot="10800000">
+            <a:off x="4370832" y="3566158"/>
+            <a:ext cx="2017586" cy="913827"/>
+          </a:xfrm>
+          <a:prstGeom prst="leftRightUpArrow">
+            <a:avLst/>
+          </a:prstGeom>
+        </p:spPr>
+        <p:style>
+          <a:lnRef idx="0">
+            <a:schemeClr val="accent4"/>
+          </a:lnRef>
+          <a:fillRef idx="3">
+            <a:schemeClr val="accent4"/>
+          </a:fillRef>
+          <a:effectRef idx="3">
+            <a:schemeClr val="accent4"/>
+          </a:effectRef>
+          <a:fontRef idx="minor">
+            <a:schemeClr val="lt1"/>
+          </a:fontRef>
+        </p:style>
+        <p:txBody>
+          <a:bodyPr rtlCol="0" anchor="ctr"/>
+          <a:lstStyle/>
+          <a:p>
+            <a:pPr algn="ctr"/>
+            <a:endParaRPr lang="en-US" dirty="0"/>
+          </a:p>
+        </p:txBody>
+      </p:sp>
+      <p:sp>
+        <p:nvSpPr>
+          <p:cNvPr id="36" name="Bent-Up Arrow 35"/>
+          <p:cNvSpPr/>
+          <p:nvPr/>
+        </p:nvSpPr>
+        <p:spPr>
+          <a:xfrm rot="10800000">
+            <a:off x="3336132" y="4606345"/>
+            <a:ext cx="1387602" cy="1094706"/>
+          </a:xfrm>
+          <a:prstGeom prst="bentUpArrow">
+            <a:avLst>
+              <a:gd name="adj1" fmla="val 25000"/>
+              <a:gd name="adj2" fmla="val 25000"/>
+              <a:gd name="adj3" fmla="val 22494"/>
+            </a:avLst>
+          </a:prstGeom>
+        </p:spPr>
+        <p:style>
+          <a:lnRef idx="0">
+            <a:schemeClr val="accent4"/>
+          </a:lnRef>
+          <a:fillRef idx="3">
+            <a:schemeClr val="accent4"/>
+          </a:fillRef>
+          <a:effectRef idx="3">
+            <a:schemeClr val="accent4"/>
+          </a:effectRef>
+          <a:fontRef idx="minor">
+            <a:schemeClr val="lt1"/>
+          </a:fontRef>
+        </p:style>
+        <p:txBody>
+          <a:bodyPr rtlCol="0" anchor="ctr"/>
+          <a:lstStyle/>
+          <a:p>
+            <a:pPr algn="ctr"/>
+            <a:endParaRPr lang="en-US"/>
+          </a:p>
+        </p:txBody>
+      </p:sp>
+      <p:sp>
+        <p:nvSpPr>
+          <p:cNvPr id="37" name="Right Arrow 36"/>
+          <p:cNvSpPr/>
+          <p:nvPr/>
+        </p:nvSpPr>
+        <p:spPr>
+          <a:xfrm>
+            <a:off x="3904201" y="5762719"/>
+            <a:ext cx="1554767" cy="302216"/>
+          </a:xfrm>
+          <a:prstGeom prst="rightArrow">
+            <a:avLst/>
+          </a:prstGeom>
+        </p:spPr>
+        <p:style>
+          <a:lnRef idx="0">
+            <a:schemeClr val="accent4"/>
+          </a:lnRef>
+          <a:fillRef idx="3">
+            <a:schemeClr val="accent4"/>
+          </a:fillRef>
+          <a:effectRef idx="3">
+            <a:schemeClr val="accent4"/>
+          </a:effectRef>
+          <a:fontRef idx="minor">
+            <a:schemeClr val="lt1"/>
+          </a:fontRef>
+        </p:style>
+        <p:txBody>
+          <a:bodyPr rtlCol="0" anchor="ctr"/>
+          <a:lstStyle/>
+          <a:p>
+            <a:pPr algn="ctr"/>
+            <a:endParaRPr lang="en-US" sz="1200" dirty="0"/>
+          </a:p>
+        </p:txBody>
+      </p:sp>
+      <p:sp>
+        <p:nvSpPr>
+          <p:cNvPr id="38" name="Right Arrow 37"/>
+          <p:cNvSpPr/>
+          <p:nvPr/>
+        </p:nvSpPr>
+        <p:spPr>
+          <a:xfrm>
+            <a:off x="10404659" y="3324467"/>
+            <a:ext cx="1119447" cy="302216"/>
+          </a:xfrm>
+          <a:prstGeom prst="rightArrow">
+            <a:avLst/>
+          </a:prstGeom>
+        </p:spPr>
+        <p:style>
+          <a:lnRef idx="0">
+            <a:schemeClr val="accent4"/>
+          </a:lnRef>
+          <a:fillRef idx="3">
+            <a:schemeClr val="accent4"/>
+          </a:fillRef>
+          <a:effectRef idx="3">
+            <a:schemeClr val="accent4"/>
+          </a:effectRef>
+          <a:fontRef idx="minor">
+            <a:schemeClr val="lt1"/>
+          </a:fontRef>
+        </p:style>
+        <p:txBody>
+          <a:bodyPr rtlCol="0" anchor="ctr"/>
+          <a:lstStyle/>
+          <a:p>
+            <a:pPr algn="ctr"/>
+            <a:endParaRPr lang="en-US" sz="1200" dirty="0"/>
+          </a:p>
+        </p:txBody>
+      </p:sp>
+      <p:sp>
+        <p:nvSpPr>
+          <p:cNvPr id="39" name="Right Arrow 38"/>
+          <p:cNvSpPr/>
+          <p:nvPr/>
+        </p:nvSpPr>
+        <p:spPr>
+          <a:xfrm>
+            <a:off x="10404658" y="6205687"/>
+            <a:ext cx="1119447" cy="302216"/>
+          </a:xfrm>
+          <a:prstGeom prst="rightArrow">
+            <a:avLst/>
+          </a:prstGeom>
+        </p:spPr>
+        <p:style>
+          <a:lnRef idx="0">
+            <a:schemeClr val="accent4"/>
+          </a:lnRef>
+          <a:fillRef idx="3">
+            <a:schemeClr val="accent4"/>
+          </a:fillRef>
+          <a:effectRef idx="3">
+            <a:schemeClr val="accent4"/>
+          </a:effectRef>
+          <a:fontRef idx="minor">
+            <a:schemeClr val="lt1"/>
+          </a:fontRef>
+        </p:style>
+        <p:txBody>
+          <a:bodyPr rtlCol="0" anchor="ctr"/>
+          <a:lstStyle/>
+          <a:p>
+            <a:pPr algn="ctr"/>
+            <a:endParaRPr lang="en-US" sz="1200" dirty="0"/>
+          </a:p>
+        </p:txBody>
+      </p:sp>
+      <p:sp>
+        <p:nvSpPr>
+          <p:cNvPr id="41" name="Bent-Up Arrow 40"/>
+          <p:cNvSpPr/>
+          <p:nvPr/>
+        </p:nvSpPr>
+        <p:spPr>
+          <a:xfrm rot="5400000" flipH="1">
+            <a:off x="6570697" y="3540850"/>
+            <a:ext cx="3343847" cy="849003"/>
+          </a:xfrm>
+          <a:prstGeom prst="bentUpArrow">
+            <a:avLst>
+              <a:gd name="adj1" fmla="val 25000"/>
+              <a:gd name="adj2" fmla="val 25000"/>
+              <a:gd name="adj3" fmla="val 22494"/>
+            </a:avLst>
+          </a:prstGeom>
+        </p:spPr>
+        <p:style>
+          <a:lnRef idx="0">
+            <a:schemeClr val="accent4"/>
+          </a:lnRef>
+          <a:fillRef idx="3">
+            <a:schemeClr val="accent4"/>
+          </a:fillRef>
+          <a:effectRef idx="3">
+            <a:schemeClr val="accent4"/>
+          </a:effectRef>
+          <a:fontRef idx="minor">
+            <a:schemeClr val="lt1"/>
+          </a:fontRef>
+        </p:style>
+        <p:txBody>
+          <a:bodyPr rtlCol="0" anchor="ctr"/>
+          <a:lstStyle/>
+          <a:p>
+            <a:pPr algn="ctr"/>
+            <a:r>
+              <a:rPr lang="en-US" dirty="0" smtClean="0"/>
+              <a:t>PCM Data</a:t>
+            </a:r>
+            <a:endParaRPr lang="en-US" dirty="0"/>
+          </a:p>
+        </p:txBody>
+      </p:sp>
+      <p:sp>
+        <p:nvSpPr>
+          <p:cNvPr id="40" name="Right Arrow 39"/>
+          <p:cNvSpPr/>
+          <p:nvPr/>
+        </p:nvSpPr>
+        <p:spPr>
+          <a:xfrm rot="20135001">
+            <a:off x="7095749" y="5500867"/>
+            <a:ext cx="1579545" cy="302216"/>
+          </a:xfrm>
+          <a:prstGeom prst="rightArrow">
+            <a:avLst/>
+          </a:prstGeom>
+        </p:spPr>
+        <p:style>
+          <a:lnRef idx="0">
+            <a:schemeClr val="accent4"/>
+          </a:lnRef>
+          <a:fillRef idx="3">
+            <a:schemeClr val="accent4"/>
+          </a:fillRef>
+          <a:effectRef idx="3">
+            <a:schemeClr val="accent4"/>
+          </a:effectRef>
+          <a:fontRef idx="minor">
+            <a:schemeClr val="lt1"/>
+          </a:fontRef>
+        </p:style>
+        <p:txBody>
+          <a:bodyPr rtlCol="0" anchor="ctr"/>
+          <a:lstStyle/>
+          <a:p>
+            <a:pPr algn="ctr"/>
+            <a:r>
+              <a:rPr lang="en-US" sz="1600" dirty="0" smtClean="0"/>
+              <a:t>PCM Data</a:t>
+            </a:r>
+            <a:endParaRPr lang="en-US" sz="1600" dirty="0"/>
+          </a:p>
+        </p:txBody>
+      </p:sp>
+      <p:sp>
+        <p:nvSpPr>
+          <p:cNvPr id="42" name="Right Arrow 41"/>
+          <p:cNvSpPr/>
+          <p:nvPr/>
+        </p:nvSpPr>
+        <p:spPr>
+          <a:xfrm rot="5400000">
+            <a:off x="9239055" y="2889052"/>
+            <a:ext cx="584269" cy="286566"/>
+          </a:xfrm>
+          <a:prstGeom prst="rightArrow">
+            <a:avLst/>
+          </a:prstGeom>
+        </p:spPr>
+        <p:style>
+          <a:lnRef idx="0">
+            <a:schemeClr val="accent4"/>
+          </a:lnRef>
+          <a:fillRef idx="3">
+            <a:schemeClr val="accent4"/>
+          </a:fillRef>
+          <a:effectRef idx="3">
+            <a:schemeClr val="accent4"/>
+          </a:effectRef>
+          <a:fontRef idx="minor">
+            <a:schemeClr val="lt1"/>
+          </a:fontRef>
+        </p:style>
+        <p:txBody>
+          <a:bodyPr rtlCol="0" anchor="ctr"/>
+          <a:lstStyle/>
+          <a:p>
+            <a:pPr algn="ctr"/>
+            <a:endParaRPr lang="en-US" sz="1200" dirty="0"/>
+          </a:p>
+        </p:txBody>
+      </p:sp>
+      <p:sp>
+        <p:nvSpPr>
+          <p:cNvPr id="43" name="Right Arrow 42"/>
+          <p:cNvSpPr/>
+          <p:nvPr/>
+        </p:nvSpPr>
+        <p:spPr>
+          <a:xfrm rot="5400000">
+            <a:off x="9248105" y="5697448"/>
+            <a:ext cx="584269" cy="286566"/>
+          </a:xfrm>
+          <a:prstGeom prst="rightArrow">
+            <a:avLst/>
+          </a:prstGeom>
+        </p:spPr>
+        <p:style>
+          <a:lnRef idx="0">
+            <a:schemeClr val="accent4"/>
+          </a:lnRef>
+          <a:fillRef idx="3">
+            <a:schemeClr val="accent4"/>
+          </a:fillRef>
+          <a:effectRef idx="3">
+            <a:schemeClr val="accent4"/>
+          </a:effectRef>
+          <a:fontRef idx="minor">
+            <a:schemeClr val="lt1"/>
+          </a:fontRef>
+        </p:style>
+        <p:txBody>
+          <a:bodyPr rtlCol="0" anchor="ctr"/>
+          <a:lstStyle/>
+          <a:p>
+            <a:pPr algn="ctr"/>
+            <a:endParaRPr lang="en-US" sz="1200" dirty="0"/>
+          </a:p>
+        </p:txBody>
+      </p:sp>
     </p:spTree>
     <p:extLst>
       <p:ext uri="{BB962C8B-B14F-4D97-AF65-F5344CB8AC3E}">
-        <p14:creationId xmlns:p14="http://schemas.microsoft.com/office/powerpoint/2010/main" val="3261967598"/>
+        <p14:creationId xmlns:p14="http://schemas.microsoft.com/office/powerpoint/2010/main" val="3710677287"/>
       </p:ext>
     </p:extLst>
   </p:cSld>
   <p:clrMapOvr>
     <a:masterClrMapping/>
   </p:clrMapOvr>
+  <p:timing>
+    <p:tnLst>
+      <p:par>
+        <p:cTn id="1" dur="indefinite" restart="never" nodeType="tmRoot"/>
+      </p:par>
+    </p:tnLst>
+  </p:timing>
 </p:sld>
 </file>
 
@@ -4673,7 +6205,7 @@
             <a:pPr algn="ctr"/>
             <a:r>
               <a:rPr lang="en-US" b="1" u="sng" dirty="0" smtClean="0"/>
-              <a:t>PCM Signal</a:t>
+              <a:t>MEMS Microphones</a:t>
             </a:r>
             <a:endParaRPr lang="en-US" b="1" u="sng" dirty="0"/>
           </a:p>
@@ -4691,13 +6223,13 @@
         </p:nvPicPr>
         <p:blipFill rotWithShape="1">
           <a:blip r:embed="rId2"/>
-          <a:srcRect t="5362"/>
+          <a:srcRect t="7416"/>
           <a:stretch/>
         </p:blipFill>
         <p:spPr>
           <a:xfrm>
-            <a:off x="2839391" y="2171700"/>
-            <a:ext cx="6665617" cy="3389376"/>
+            <a:off x="2443162" y="2171700"/>
+            <a:ext cx="7458075" cy="3139440"/>
           </a:xfrm>
           <a:prstGeom prst="rect">
             <a:avLst/>
@@ -4707,7 +6239,7 @@
     </p:spTree>
     <p:extLst>
       <p:ext uri="{BB962C8B-B14F-4D97-AF65-F5344CB8AC3E}">
-        <p14:creationId xmlns:p14="http://schemas.microsoft.com/office/powerpoint/2010/main" val="1539137432"/>
+        <p14:creationId xmlns:p14="http://schemas.microsoft.com/office/powerpoint/2010/main" val="3694460086"/>
       </p:ext>
     </p:extLst>
   </p:cSld>
@@ -4759,7 +6291,7 @@
             <a:pPr algn="ctr"/>
             <a:r>
               <a:rPr lang="en-US" b="1" u="sng" dirty="0" smtClean="0"/>
-              <a:t>I2S Protocol</a:t>
+              <a:t>PDM Signal</a:t>
             </a:r>
             <a:endParaRPr lang="en-US" b="1" u="sng" dirty="0"/>
           </a:p>
@@ -4777,13 +6309,13 @@
         </p:nvPicPr>
         <p:blipFill rotWithShape="1">
           <a:blip r:embed="rId2"/>
-          <a:srcRect t="4596" b="46893"/>
+          <a:srcRect t="5617"/>
           <a:stretch/>
         </p:blipFill>
         <p:spPr>
           <a:xfrm>
-            <a:off x="3043701" y="2171700"/>
-            <a:ext cx="6256998" cy="1737360"/>
+            <a:off x="2754374" y="2171700"/>
+            <a:ext cx="6835652" cy="3380232"/>
           </a:xfrm>
           <a:prstGeom prst="rect">
             <a:avLst/>
@@ -4793,7 +6325,7 @@
     </p:spTree>
     <p:extLst>
       <p:ext uri="{BB962C8B-B14F-4D97-AF65-F5344CB8AC3E}">
-        <p14:creationId xmlns:p14="http://schemas.microsoft.com/office/powerpoint/2010/main" val="2247753315"/>
+        <p14:creationId xmlns:p14="http://schemas.microsoft.com/office/powerpoint/2010/main" val="3261967598"/>
       </p:ext>
     </p:extLst>
   </p:cSld>
@@ -4845,7 +6377,7 @@
             <a:pPr algn="ctr"/>
             <a:r>
               <a:rPr lang="en-US" b="1" u="sng" dirty="0" smtClean="0"/>
-              <a:t>PDM2PCM Conversion</a:t>
+              <a:t>PCM Signal</a:t>
             </a:r>
             <a:endParaRPr lang="en-US" b="1" u="sng" dirty="0"/>
           </a:p>
@@ -4863,34 +6395,13 @@
         </p:nvPicPr>
         <p:blipFill rotWithShape="1">
           <a:blip r:embed="rId2"/>
-          <a:srcRect t="9104"/>
+          <a:srcRect t="5362"/>
           <a:stretch/>
         </p:blipFill>
         <p:spPr>
           <a:xfrm>
-            <a:off x="2405060" y="2165604"/>
-            <a:ext cx="7534275" cy="2008632"/>
-          </a:xfrm>
-          <a:prstGeom prst="rect">
-            <a:avLst/>
-          </a:prstGeom>
-        </p:spPr>
-      </p:pic>
-      <p:pic>
-        <p:nvPicPr>
-          <p:cNvPr id="5" name="Picture 4"/>
-          <p:cNvPicPr/>
-          <p:nvPr/>
-        </p:nvPicPr>
-        <p:blipFill rotWithShape="1">
-          <a:blip r:embed="rId3"/>
-          <a:srcRect t="9592"/>
-          <a:stretch/>
-        </p:blipFill>
-        <p:spPr>
-          <a:xfrm>
-            <a:off x="3031806" y="4991100"/>
-            <a:ext cx="6280785" cy="1350264"/>
+            <a:off x="2839391" y="2171700"/>
+            <a:ext cx="6665617" cy="3389376"/>
           </a:xfrm>
           <a:prstGeom prst="rect">
             <a:avLst/>
@@ -4900,7 +6411,7 @@
     </p:spTree>
     <p:extLst>
       <p:ext uri="{BB962C8B-B14F-4D97-AF65-F5344CB8AC3E}">
-        <p14:creationId xmlns:p14="http://schemas.microsoft.com/office/powerpoint/2010/main" val="752666886"/>
+        <p14:creationId xmlns:p14="http://schemas.microsoft.com/office/powerpoint/2010/main" val="1539137432"/>
       </p:ext>
     </p:extLst>
   </p:cSld>
@@ -4946,48 +6457,60 @@
         </p:nvSpPr>
         <p:spPr/>
         <p:txBody>
-          <a:bodyPr>
-            <a:normAutofit/>
-          </a:bodyPr>
+          <a:bodyPr/>
           <a:lstStyle/>
           <a:p>
             <a:pPr algn="ctr"/>
             <a:r>
-              <a:rPr lang="en-US" b="1" u="sng" dirty="0"/>
-              <a:t>Audio codec (CS43L22)</a:t>
-            </a:r>
-          </a:p>
-        </p:txBody>
-      </p:sp>
-      <p:sp>
-        <p:nvSpPr>
-          <p:cNvPr id="3" name="Content Placeholder 2"/>
-          <p:cNvSpPr>
-            <a:spLocks noGrp="1"/>
-          </p:cNvSpPr>
+              <a:rPr lang="en-US" b="1" u="sng" dirty="0" smtClean="0"/>
+              <a:t>I2S Protocol</a:t>
+            </a:r>
+            <a:endParaRPr lang="en-US" b="1" u="sng" dirty="0"/>
+          </a:p>
+        </p:txBody>
+      </p:sp>
+      <p:pic>
+        <p:nvPicPr>
+          <p:cNvPr id="4" name="Content Placeholder 3"/>
+          <p:cNvPicPr>
+            <a:picLocks noGrp="1"/>
+          </p:cNvPicPr>
           <p:nvPr>
             <p:ph idx="1"/>
           </p:nvPr>
-        </p:nvSpPr>
-        <p:spPr/>
-        <p:txBody>
-          <a:bodyPr/>
-          <a:lstStyle/>
-          <a:p>
-            <a:endParaRPr lang="en-US"/>
-          </a:p>
-        </p:txBody>
-      </p:sp>
+        </p:nvPicPr>
+        <p:blipFill rotWithShape="1">
+          <a:blip r:embed="rId2"/>
+          <a:srcRect t="4596" b="46893"/>
+          <a:stretch/>
+        </p:blipFill>
+        <p:spPr>
+          <a:xfrm>
+            <a:off x="3043701" y="2171700"/>
+            <a:ext cx="6256998" cy="1737360"/>
+          </a:xfrm>
+          <a:prstGeom prst="rect">
+            <a:avLst/>
+          </a:prstGeom>
+        </p:spPr>
+      </p:pic>
     </p:spTree>
     <p:extLst>
       <p:ext uri="{BB962C8B-B14F-4D97-AF65-F5344CB8AC3E}">
-        <p14:creationId xmlns:p14="http://schemas.microsoft.com/office/powerpoint/2010/main" val="1847720716"/>
+        <p14:creationId xmlns:p14="http://schemas.microsoft.com/office/powerpoint/2010/main" val="2247753315"/>
       </p:ext>
     </p:extLst>
   </p:cSld>
   <p:clrMapOvr>
     <a:masterClrMapping/>
   </p:clrMapOvr>
+  <p:timing>
+    <p:tnLst>
+      <p:par>
+        <p:cTn id="1" dur="indefinite" restart="never" nodeType="tmRoot"/>
+      </p:par>
+    </p:tnLst>
+  </p:timing>
 </p:sld>
 </file>
 

</xml_diff>

<commit_message>
Add details to Documentation and Presentation.
</commit_message>
<xml_diff>
--- a/Presentation.pptx
+++ b/Presentation.pptx
@@ -19,7 +19,10 @@
     <p:sldId id="264" r:id="rId13"/>
     <p:sldId id="265" r:id="rId14"/>
     <p:sldId id="266" r:id="rId15"/>
-    <p:sldId id="267" r:id="rId16"/>
+    <p:sldId id="271" r:id="rId16"/>
+    <p:sldId id="273" r:id="rId17"/>
+    <p:sldId id="272" r:id="rId18"/>
+    <p:sldId id="267" r:id="rId19"/>
   </p:sldIdLst>
   <p:sldSz cx="12192000" cy="6858000"/>
   <p:notesSz cx="6858000" cy="9144000"/>
@@ -4180,22 +4183,143 @@
           </a:p>
         </p:txBody>
       </p:sp>
-      <p:sp>
-        <p:nvSpPr>
-          <p:cNvPr id="3" name="Content Placeholder 2"/>
-          <p:cNvSpPr>
-            <a:spLocks noGrp="1"/>
-          </p:cNvSpPr>
+      <p:pic>
+        <p:nvPicPr>
+          <p:cNvPr id="4" name="Content Placeholder 3"/>
+          <p:cNvPicPr>
+            <a:picLocks noGrp="1"/>
+          </p:cNvPicPr>
           <p:nvPr>
             <p:ph idx="1"/>
           </p:nvPr>
-        </p:nvSpPr>
-        <p:spPr/>
-        <p:txBody>
-          <a:bodyPr/>
-          <a:lstStyle/>
-          <a:p>
-            <a:endParaRPr lang="en-US"/>
+        </p:nvPicPr>
+        <p:blipFill>
+          <a:blip r:embed="rId2" cstate="print">
+            <a:extLst>
+              <a:ext uri="{28A0092B-C50C-407E-A947-70E740481C1C}">
+                <a14:useLocalDpi xmlns:a14="http://schemas.microsoft.com/office/drawing/2010/main" val="0"/>
+              </a:ext>
+            </a:extLst>
+          </a:blip>
+          <a:stretch>
+            <a:fillRect/>
+          </a:stretch>
+        </p:blipFill>
+        <p:spPr>
+          <a:xfrm>
+            <a:off x="4450886" y="1428750"/>
+            <a:ext cx="3442627" cy="3581400"/>
+          </a:xfrm>
+          <a:prstGeom prst="rect">
+            <a:avLst/>
+          </a:prstGeom>
+        </p:spPr>
+      </p:pic>
+      <p:sp>
+        <p:nvSpPr>
+          <p:cNvPr id="5" name="TextBox 4"/>
+          <p:cNvSpPr txBox="1"/>
+          <p:nvPr/>
+        </p:nvSpPr>
+        <p:spPr>
+          <a:xfrm>
+            <a:off x="941832" y="5120640"/>
+            <a:ext cx="11018520" cy="1661993"/>
+          </a:xfrm>
+          <a:prstGeom prst="rect">
+            <a:avLst/>
+          </a:prstGeom>
+          <a:noFill/>
+        </p:spPr>
+        <p:txBody>
+          <a:bodyPr wrap="square" rtlCol="0">
+            <a:spAutoFit/>
+          </a:bodyPr>
+          <a:lstStyle/>
+          <a:p>
+            <a:r>
+              <a:rPr lang="en-US" sz="2800" dirty="0"/>
+              <a:t>- The CS43L22 is a highly integrated, low power, 24-bit audio DAC comprised of a Digital Signal Processing Engine, headphone amplifiers, a digital PWM modulator and two full-bridge power back-ends.</a:t>
+            </a:r>
+          </a:p>
+          <a:p>
+            <a:endParaRPr lang="en-US" dirty="0"/>
+          </a:p>
+        </p:txBody>
+      </p:sp>
+      <p:sp>
+        <p:nvSpPr>
+          <p:cNvPr id="6" name="TextBox 5"/>
+          <p:cNvSpPr txBox="1"/>
+          <p:nvPr/>
+        </p:nvSpPr>
+        <p:spPr>
+          <a:xfrm>
+            <a:off x="1042416" y="1627632"/>
+            <a:ext cx="2944368" cy="1384995"/>
+          </a:xfrm>
+          <a:prstGeom prst="rect">
+            <a:avLst/>
+          </a:prstGeom>
+          <a:noFill/>
+        </p:spPr>
+        <p:txBody>
+          <a:bodyPr wrap="square" rtlCol="0">
+            <a:spAutoFit/>
+          </a:bodyPr>
+          <a:lstStyle/>
+          <a:p>
+            <a:r>
+              <a:rPr lang="en-US" sz="2800" dirty="0" smtClean="0"/>
+              <a:t>- The </a:t>
+            </a:r>
+            <a:r>
+              <a:rPr lang="en-US" sz="2800" dirty="0"/>
+              <a:t>control port operates using an I²C </a:t>
+            </a:r>
+            <a:r>
+              <a:rPr lang="en-US" sz="2800" dirty="0" smtClean="0"/>
+              <a:t>interface.</a:t>
+            </a:r>
+            <a:endParaRPr lang="en-US" sz="2800" dirty="0"/>
+          </a:p>
+        </p:txBody>
+      </p:sp>
+      <p:sp>
+        <p:nvSpPr>
+          <p:cNvPr id="7" name="TextBox 6"/>
+          <p:cNvSpPr txBox="1"/>
+          <p:nvPr/>
+        </p:nvSpPr>
+        <p:spPr>
+          <a:xfrm>
+            <a:off x="8492534" y="1627632"/>
+            <a:ext cx="2944368" cy="1384995"/>
+          </a:xfrm>
+          <a:prstGeom prst="rect">
+            <a:avLst/>
+          </a:prstGeom>
+          <a:noFill/>
+        </p:spPr>
+        <p:txBody>
+          <a:bodyPr wrap="square" rtlCol="0">
+            <a:spAutoFit/>
+          </a:bodyPr>
+          <a:lstStyle/>
+          <a:p>
+            <a:r>
+              <a:rPr lang="en-US" sz="2800" dirty="0" smtClean="0"/>
+              <a:t>- The audio port </a:t>
+            </a:r>
+            <a:r>
+              <a:rPr lang="en-US" sz="2800" dirty="0"/>
+              <a:t>operates using an </a:t>
+            </a:r>
+            <a:r>
+              <a:rPr lang="en-US" sz="2800" dirty="0" smtClean="0"/>
+              <a:t>I²S interface.</a:t>
+            </a:r>
+            <a:endParaRPr lang="en-US" sz="2800" dirty="0"/>
           </a:p>
         </p:txBody>
       </p:sp>
@@ -4355,6 +4479,13 @@
   <p:clrMapOvr>
     <a:masterClrMapping/>
   </p:clrMapOvr>
+  <p:timing>
+    <p:tnLst>
+      <p:par>
+        <p:cTn id="1" dur="indefinite" restart="never" nodeType="tmRoot"/>
+      </p:par>
+    </p:tnLst>
+  </p:timing>
 </p:sld>
 </file>
 
@@ -4409,15 +4540,59 @@
             <p:ph idx="1"/>
           </p:nvPr>
         </p:nvSpPr>
-        <p:spPr/>
+        <p:spPr>
+          <a:xfrm>
+            <a:off x="1371600" y="1682496"/>
+            <a:ext cx="9601200" cy="585216"/>
+          </a:xfrm>
+        </p:spPr>
         <p:txBody>
           <a:bodyPr/>
           <a:lstStyle/>
           <a:p>
-            <a:endParaRPr lang="en-US"/>
-          </a:p>
-        </p:txBody>
-      </p:sp>
+            <a:pPr marL="0" indent="0">
+              <a:buNone/>
+            </a:pPr>
+            <a:r>
+              <a:rPr lang="en-US" sz="2800" b="1" u="sng" dirty="0"/>
+              <a:t>- STM32F446RC (Version 1):-</a:t>
+            </a:r>
+          </a:p>
+          <a:p>
+            <a:endParaRPr lang="en-US" dirty="0"/>
+          </a:p>
+        </p:txBody>
+      </p:sp>
+      <p:pic>
+        <p:nvPicPr>
+          <p:cNvPr id="4" name="Picture 3"/>
+          <p:cNvPicPr>
+            <a:picLocks noChangeAspect="1"/>
+          </p:cNvPicPr>
+          <p:nvPr/>
+        </p:nvPicPr>
+        <p:blipFill>
+          <a:blip r:embed="rId2">
+            <a:extLst>
+              <a:ext uri="{28A0092B-C50C-407E-A947-70E740481C1C}">
+                <a14:useLocalDpi xmlns:a14="http://schemas.microsoft.com/office/drawing/2010/main" val="0"/>
+              </a:ext>
+            </a:extLst>
+          </a:blip>
+          <a:stretch>
+            <a:fillRect/>
+          </a:stretch>
+        </p:blipFill>
+        <p:spPr>
+          <a:xfrm>
+            <a:off x="1371600" y="2735008"/>
+            <a:ext cx="10058400" cy="3673148"/>
+          </a:xfrm>
+          <a:prstGeom prst="rect">
+            <a:avLst/>
+          </a:prstGeom>
+        </p:spPr>
+      </p:pic>
     </p:spTree>
     <p:extLst>
       <p:ext uri="{BB962C8B-B14F-4D97-AF65-F5344CB8AC3E}">
@@ -4428,6 +4603,13 @@
   <p:clrMapOvr>
     <a:masterClrMapping/>
   </p:clrMapOvr>
+  <p:timing>
+    <p:tnLst>
+      <p:par>
+        <p:cTn id="1" dur="indefinite" restart="never" nodeType="tmRoot"/>
+      </p:par>
+    </p:tnLst>
+  </p:timing>
 </p:sld>
 </file>
 
@@ -4466,31 +4648,415 @@
             <a:pPr algn="ctr"/>
             <a:r>
               <a:rPr lang="en-US" b="1" u="sng" dirty="0" smtClean="0"/>
+              <a:t>PCB Designs</a:t>
+            </a:r>
+            <a:endParaRPr lang="en-US" b="1" u="sng" dirty="0"/>
+          </a:p>
+        </p:txBody>
+      </p:sp>
+      <p:sp>
+        <p:nvSpPr>
+          <p:cNvPr id="3" name="Content Placeholder 2"/>
+          <p:cNvSpPr>
+            <a:spLocks noGrp="1"/>
+          </p:cNvSpPr>
+          <p:nvPr>
+            <p:ph idx="1"/>
+          </p:nvPr>
+        </p:nvSpPr>
+        <p:spPr>
+          <a:xfrm>
+            <a:off x="1143000" y="1508760"/>
+            <a:ext cx="9601200" cy="585216"/>
+          </a:xfrm>
+        </p:spPr>
+        <p:txBody>
+          <a:bodyPr/>
+          <a:lstStyle/>
+          <a:p>
+            <a:pPr marL="0" indent="0">
+              <a:buNone/>
+            </a:pPr>
+            <a:r>
+              <a:rPr lang="en-US" sz="2800" b="1" u="sng" dirty="0"/>
+              <a:t>- STM32F446RC (Version 2):-</a:t>
+            </a:r>
+          </a:p>
+          <a:p>
+            <a:endParaRPr lang="en-US" dirty="0"/>
+          </a:p>
+        </p:txBody>
+      </p:sp>
+      <p:pic>
+        <p:nvPicPr>
+          <p:cNvPr id="5" name="Picture 4"/>
+          <p:cNvPicPr>
+            <a:picLocks noChangeAspect="1"/>
+          </p:cNvPicPr>
+          <p:nvPr/>
+        </p:nvPicPr>
+        <p:blipFill>
+          <a:blip r:embed="rId2">
+            <a:extLst>
+              <a:ext uri="{28A0092B-C50C-407E-A947-70E740481C1C}">
+                <a14:useLocalDpi xmlns:a14="http://schemas.microsoft.com/office/drawing/2010/main" val="0"/>
+              </a:ext>
+            </a:extLst>
+          </a:blip>
+          <a:stretch>
+            <a:fillRect/>
+          </a:stretch>
+        </p:blipFill>
+        <p:spPr>
+          <a:xfrm>
+            <a:off x="1143000" y="2185416"/>
+            <a:ext cx="10058400" cy="4583930"/>
+          </a:xfrm>
+          <a:prstGeom prst="rect">
+            <a:avLst/>
+          </a:prstGeom>
+        </p:spPr>
+      </p:pic>
+    </p:spTree>
+    <p:extLst>
+      <p:ext uri="{BB962C8B-B14F-4D97-AF65-F5344CB8AC3E}">
+        <p14:creationId xmlns:p14="http://schemas.microsoft.com/office/powerpoint/2010/main" val="2421610375"/>
+      </p:ext>
+    </p:extLst>
+  </p:cSld>
+  <p:clrMapOvr>
+    <a:masterClrMapping/>
+  </p:clrMapOvr>
+  <p:timing>
+    <p:tnLst>
+      <p:par>
+        <p:cTn id="1" dur="indefinite" restart="never" nodeType="tmRoot"/>
+      </p:par>
+    </p:tnLst>
+  </p:timing>
+</p:sld>
+</file>
+
+<file path=ppt/slides/slide16.xml><?xml version="1.0" encoding="utf-8"?>
+<p:sld xmlns:a="http://schemas.openxmlformats.org/drawingml/2006/main" xmlns:r="http://schemas.openxmlformats.org/officeDocument/2006/relationships" xmlns:p="http://schemas.openxmlformats.org/presentationml/2006/main">
+  <p:cSld>
+    <p:spTree>
+      <p:nvGrpSpPr>
+        <p:cNvPr id="1" name=""/>
+        <p:cNvGrpSpPr/>
+        <p:nvPr/>
+      </p:nvGrpSpPr>
+      <p:grpSpPr>
+        <a:xfrm>
+          <a:off x="0" y="0"/>
+          <a:ext cx="0" cy="0"/>
+          <a:chOff x="0" y="0"/>
+          <a:chExt cx="0" cy="0"/>
+        </a:xfrm>
+      </p:grpSpPr>
+      <p:sp>
+        <p:nvSpPr>
+          <p:cNvPr id="2" name="Title 1"/>
+          <p:cNvSpPr>
+            <a:spLocks noGrp="1"/>
+          </p:cNvSpPr>
+          <p:nvPr>
+            <p:ph type="title"/>
+          </p:nvPr>
+        </p:nvSpPr>
+        <p:spPr/>
+        <p:txBody>
+          <a:bodyPr/>
+          <a:lstStyle/>
+          <a:p>
+            <a:pPr algn="ctr"/>
+            <a:r>
+              <a:rPr lang="en-US" b="1" u="sng" dirty="0" smtClean="0"/>
+              <a:t>PCB Designs</a:t>
+            </a:r>
+            <a:endParaRPr lang="en-US" b="1" u="sng" dirty="0"/>
+          </a:p>
+        </p:txBody>
+      </p:sp>
+      <p:sp>
+        <p:nvSpPr>
+          <p:cNvPr id="3" name="Content Placeholder 2"/>
+          <p:cNvSpPr>
+            <a:spLocks noGrp="1"/>
+          </p:cNvSpPr>
+          <p:nvPr>
+            <p:ph idx="1"/>
+          </p:nvPr>
+        </p:nvSpPr>
+        <p:spPr>
+          <a:xfrm>
+            <a:off x="841248" y="3122176"/>
+            <a:ext cx="9601200" cy="585216"/>
+          </a:xfrm>
+        </p:spPr>
+        <p:txBody>
+          <a:bodyPr/>
+          <a:lstStyle/>
+          <a:p>
+            <a:pPr marL="0" indent="0">
+              <a:buNone/>
+            </a:pPr>
+            <a:r>
+              <a:rPr lang="en-US" sz="2800" b="1" u="sng" dirty="0"/>
+              <a:t>- Audio Bluetooth Module (WT32I-A-AI6):-</a:t>
+            </a:r>
+          </a:p>
+          <a:p>
+            <a:pPr marL="0" indent="0">
+              <a:buNone/>
+            </a:pPr>
+            <a:endParaRPr lang="en-US" dirty="0"/>
+          </a:p>
+        </p:txBody>
+      </p:sp>
+      <p:pic>
+        <p:nvPicPr>
+          <p:cNvPr id="5" name="Picture 4"/>
+          <p:cNvPicPr>
+            <a:picLocks noChangeAspect="1"/>
+          </p:cNvPicPr>
+          <p:nvPr/>
+        </p:nvPicPr>
+        <p:blipFill>
+          <a:blip r:embed="rId2">
+            <a:extLst>
+              <a:ext uri="{28A0092B-C50C-407E-A947-70E740481C1C}">
+                <a14:useLocalDpi xmlns:a14="http://schemas.microsoft.com/office/drawing/2010/main" val="0"/>
+              </a:ext>
+            </a:extLst>
+          </a:blip>
+          <a:stretch>
+            <a:fillRect/>
+          </a:stretch>
+        </p:blipFill>
+        <p:spPr>
+          <a:xfrm>
+            <a:off x="7861381" y="685800"/>
+            <a:ext cx="3985605" cy="6043184"/>
+          </a:xfrm>
+          <a:prstGeom prst="rect">
+            <a:avLst/>
+          </a:prstGeom>
+        </p:spPr>
+      </p:pic>
+    </p:spTree>
+    <p:extLst>
+      <p:ext uri="{BB962C8B-B14F-4D97-AF65-F5344CB8AC3E}">
+        <p14:creationId xmlns:p14="http://schemas.microsoft.com/office/powerpoint/2010/main" val="884722551"/>
+      </p:ext>
+    </p:extLst>
+  </p:cSld>
+  <p:clrMapOvr>
+    <a:masterClrMapping/>
+  </p:clrMapOvr>
+  <p:timing>
+    <p:tnLst>
+      <p:par>
+        <p:cTn id="1" dur="indefinite" restart="never" nodeType="tmRoot"/>
+      </p:par>
+    </p:tnLst>
+  </p:timing>
+</p:sld>
+</file>
+
+<file path=ppt/slides/slide17.xml><?xml version="1.0" encoding="utf-8"?>
+<p:sld xmlns:a="http://schemas.openxmlformats.org/drawingml/2006/main" xmlns:r="http://schemas.openxmlformats.org/officeDocument/2006/relationships" xmlns:p="http://schemas.openxmlformats.org/presentationml/2006/main">
+  <p:cSld>
+    <p:spTree>
+      <p:nvGrpSpPr>
+        <p:cNvPr id="1" name=""/>
+        <p:cNvGrpSpPr/>
+        <p:nvPr/>
+      </p:nvGrpSpPr>
+      <p:grpSpPr>
+        <a:xfrm>
+          <a:off x="0" y="0"/>
+          <a:ext cx="0" cy="0"/>
+          <a:chOff x="0" y="0"/>
+          <a:chExt cx="0" cy="0"/>
+        </a:xfrm>
+      </p:grpSpPr>
+      <p:sp>
+        <p:nvSpPr>
+          <p:cNvPr id="2" name="Title 1"/>
+          <p:cNvSpPr>
+            <a:spLocks noGrp="1"/>
+          </p:cNvSpPr>
+          <p:nvPr>
+            <p:ph type="title"/>
+          </p:nvPr>
+        </p:nvSpPr>
+        <p:spPr/>
+        <p:txBody>
+          <a:bodyPr/>
+          <a:lstStyle/>
+          <a:p>
+            <a:pPr algn="ctr"/>
+            <a:r>
+              <a:rPr lang="en-US" b="1" u="sng" dirty="0" smtClean="0"/>
+              <a:t>PCB Designs</a:t>
+            </a:r>
+            <a:endParaRPr lang="en-US" b="1" u="sng" dirty="0"/>
+          </a:p>
+        </p:txBody>
+      </p:sp>
+      <p:sp>
+        <p:nvSpPr>
+          <p:cNvPr id="3" name="Content Placeholder 2"/>
+          <p:cNvSpPr>
+            <a:spLocks noGrp="1"/>
+          </p:cNvSpPr>
+          <p:nvPr>
+            <p:ph idx="1"/>
+          </p:nvPr>
+        </p:nvSpPr>
+        <p:spPr>
+          <a:xfrm>
+            <a:off x="1143000" y="1508760"/>
+            <a:ext cx="9601200" cy="585216"/>
+          </a:xfrm>
+        </p:spPr>
+        <p:txBody>
+          <a:bodyPr/>
+          <a:lstStyle/>
+          <a:p>
+            <a:pPr marL="0" indent="0">
+              <a:buNone/>
+            </a:pPr>
+            <a:r>
+              <a:rPr lang="en-US" sz="2800" b="1" u="sng" dirty="0"/>
+              <a:t>- STM32F413CG (Version 1) with Audio Codec:-</a:t>
+            </a:r>
+          </a:p>
+          <a:p>
+            <a:pPr marL="0" indent="0">
+              <a:buNone/>
+            </a:pPr>
+            <a:endParaRPr lang="en-US" dirty="0"/>
+          </a:p>
+        </p:txBody>
+      </p:sp>
+      <p:pic>
+        <p:nvPicPr>
+          <p:cNvPr id="4" name="Picture 3"/>
+          <p:cNvPicPr>
+            <a:picLocks noChangeAspect="1"/>
+          </p:cNvPicPr>
+          <p:nvPr/>
+        </p:nvPicPr>
+        <p:blipFill>
+          <a:blip r:embed="rId2">
+            <a:extLst>
+              <a:ext uri="{28A0092B-C50C-407E-A947-70E740481C1C}">
+                <a14:useLocalDpi xmlns:a14="http://schemas.microsoft.com/office/drawing/2010/main" val="0"/>
+              </a:ext>
+            </a:extLst>
+          </a:blip>
+          <a:stretch>
+            <a:fillRect/>
+          </a:stretch>
+        </p:blipFill>
+        <p:spPr>
+          <a:xfrm>
+            <a:off x="1323975" y="2289619"/>
+            <a:ext cx="9696450" cy="4162425"/>
+          </a:xfrm>
+          <a:prstGeom prst="rect">
+            <a:avLst/>
+          </a:prstGeom>
+        </p:spPr>
+      </p:pic>
+    </p:spTree>
+    <p:extLst>
+      <p:ext uri="{BB962C8B-B14F-4D97-AF65-F5344CB8AC3E}">
+        <p14:creationId xmlns:p14="http://schemas.microsoft.com/office/powerpoint/2010/main" val="1688375218"/>
+      </p:ext>
+    </p:extLst>
+  </p:cSld>
+  <p:clrMapOvr>
+    <a:masterClrMapping/>
+  </p:clrMapOvr>
+  <p:timing>
+    <p:tnLst>
+      <p:par>
+        <p:cTn id="1" dur="indefinite" restart="never" nodeType="tmRoot"/>
+      </p:par>
+    </p:tnLst>
+  </p:timing>
+</p:sld>
+</file>
+
+<file path=ppt/slides/slide18.xml><?xml version="1.0" encoding="utf-8"?>
+<p:sld xmlns:a="http://schemas.openxmlformats.org/drawingml/2006/main" xmlns:r="http://schemas.openxmlformats.org/officeDocument/2006/relationships" xmlns:p="http://schemas.openxmlformats.org/presentationml/2006/main">
+  <p:cSld>
+    <p:spTree>
+      <p:nvGrpSpPr>
+        <p:cNvPr id="1" name=""/>
+        <p:cNvGrpSpPr/>
+        <p:nvPr/>
+      </p:nvGrpSpPr>
+      <p:grpSpPr>
+        <a:xfrm>
+          <a:off x="0" y="0"/>
+          <a:ext cx="0" cy="0"/>
+          <a:chOff x="0" y="0"/>
+          <a:chExt cx="0" cy="0"/>
+        </a:xfrm>
+      </p:grpSpPr>
+      <p:sp>
+        <p:nvSpPr>
+          <p:cNvPr id="2" name="Title 1"/>
+          <p:cNvSpPr>
+            <a:spLocks noGrp="1"/>
+          </p:cNvSpPr>
+          <p:nvPr>
+            <p:ph type="title"/>
+          </p:nvPr>
+        </p:nvSpPr>
+        <p:spPr/>
+        <p:txBody>
+          <a:bodyPr/>
+          <a:lstStyle/>
+          <a:p>
+            <a:pPr algn="ctr"/>
+            <a:r>
+              <a:rPr lang="en-US" b="1" u="sng" dirty="0" smtClean="0"/>
               <a:t>Our Next Step</a:t>
             </a:r>
             <a:endParaRPr lang="en-US" b="1" u="sng" dirty="0"/>
           </a:p>
         </p:txBody>
       </p:sp>
-      <p:sp>
-        <p:nvSpPr>
-          <p:cNvPr id="3" name="Content Placeholder 2"/>
-          <p:cNvSpPr>
-            <a:spLocks noGrp="1"/>
-          </p:cNvSpPr>
+      <p:pic>
+        <p:nvPicPr>
+          <p:cNvPr id="4" name="Content Placeholder 3"/>
+          <p:cNvPicPr>
+            <a:picLocks noGrp="1"/>
+          </p:cNvPicPr>
           <p:nvPr>
             <p:ph idx="1"/>
           </p:nvPr>
-        </p:nvSpPr>
-        <p:spPr/>
-        <p:txBody>
-          <a:bodyPr/>
-          <a:lstStyle/>
-          <a:p>
-            <a:endParaRPr lang="en-US"/>
-          </a:p>
-        </p:txBody>
-      </p:sp>
+        </p:nvPicPr>
+        <p:blipFill rotWithShape="1">
+          <a:blip r:embed="rId2"/>
+          <a:srcRect t="5617"/>
+          <a:stretch/>
+        </p:blipFill>
+        <p:spPr>
+          <a:xfrm>
+            <a:off x="3215917" y="1728216"/>
+            <a:ext cx="5912565" cy="3380232"/>
+          </a:xfrm>
+          <a:prstGeom prst="rect">
+            <a:avLst/>
+          </a:prstGeom>
+        </p:spPr>
+      </p:pic>
     </p:spTree>
     <p:extLst>
       <p:ext uri="{BB962C8B-B14F-4D97-AF65-F5344CB8AC3E}">
@@ -4501,6 +5067,13 @@
   <p:clrMapOvr>
     <a:masterClrMapping/>
   </p:clrMapOvr>
+  <p:timing>
+    <p:tnLst>
+      <p:par>
+        <p:cTn id="1" dur="indefinite" restart="never" nodeType="tmRoot"/>
+      </p:par>
+    </p:tnLst>
+  </p:timing>
 </p:sld>
 </file>
 
@@ -6228,7 +6801,7 @@
         </p:blipFill>
         <p:spPr>
           <a:xfrm>
-            <a:off x="2443162" y="2171700"/>
+            <a:off x="2443161" y="1620774"/>
             <a:ext cx="7458075" cy="3139440"/>
           </a:xfrm>
           <a:prstGeom prst="rect">
@@ -6236,6 +6809,36 @@
           </a:prstGeom>
         </p:spPr>
       </p:pic>
+      <p:sp>
+        <p:nvSpPr>
+          <p:cNvPr id="3" name="TextBox 2"/>
+          <p:cNvSpPr txBox="1"/>
+          <p:nvPr/>
+        </p:nvSpPr>
+        <p:spPr>
+          <a:xfrm>
+            <a:off x="827531" y="5093208"/>
+            <a:ext cx="10689336" cy="954107"/>
+          </a:xfrm>
+          <a:prstGeom prst="rect">
+            <a:avLst/>
+          </a:prstGeom>
+          <a:noFill/>
+        </p:spPr>
+        <p:txBody>
+          <a:bodyPr wrap="square" rtlCol="0">
+            <a:spAutoFit/>
+          </a:bodyPr>
+          <a:lstStyle/>
+          <a:p>
+            <a:r>
+              <a:rPr lang="en-US" sz="2800" dirty="0"/>
+              <a:t>- The digital MEMS microphone is a sensor that convert acoustic pressure waves into a digital signal. </a:t>
+            </a:r>
+            <a:endParaRPr lang="en-US" sz="2800" dirty="0"/>
+          </a:p>
+        </p:txBody>
+      </p:sp>
     </p:spTree>
     <p:extLst>
       <p:ext uri="{BB962C8B-B14F-4D97-AF65-F5344CB8AC3E}">
@@ -6314,7 +6917,7 @@
         </p:blipFill>
         <p:spPr>
           <a:xfrm>
-            <a:off x="2754374" y="2171700"/>
+            <a:off x="2754374" y="1428750"/>
             <a:ext cx="6835652" cy="3380232"/>
           </a:xfrm>
           <a:prstGeom prst="rect">
@@ -6322,6 +6925,92 @@
           </a:prstGeom>
         </p:spPr>
       </p:pic>
+      <p:sp>
+        <p:nvSpPr>
+          <p:cNvPr id="3" name="TextBox 2"/>
+          <p:cNvSpPr txBox="1"/>
+          <p:nvPr/>
+        </p:nvSpPr>
+        <p:spPr>
+          <a:xfrm>
+            <a:off x="802636" y="5291328"/>
+            <a:ext cx="10919972" cy="1384995"/>
+          </a:xfrm>
+          <a:prstGeom prst="rect">
+            <a:avLst/>
+          </a:prstGeom>
+          <a:noFill/>
+        </p:spPr>
+        <p:txBody>
+          <a:bodyPr wrap="square" rtlCol="0">
+            <a:spAutoFit/>
+          </a:bodyPr>
+          <a:lstStyle/>
+          <a:p>
+            <a:r>
+              <a:rPr lang="en-US" sz="2800" dirty="0" smtClean="0"/>
+              <a:t>- A </a:t>
+            </a:r>
+            <a:r>
+              <a:rPr lang="en-US" sz="2800" dirty="0"/>
+              <a:t>large cluster of 1s correspond to a high (positive) amplitude </a:t>
+            </a:r>
+            <a:r>
+              <a:rPr lang="en-US" sz="2800" dirty="0" smtClean="0"/>
+              <a:t>value</a:t>
+            </a:r>
+            <a:r>
+              <a:rPr lang="en-US" sz="2800" dirty="0"/>
+              <a:t>.</a:t>
+            </a:r>
+            <a:r>
+              <a:rPr lang="en-US" sz="2800" dirty="0" smtClean="0"/>
+              <a:t> </a:t>
+            </a:r>
+          </a:p>
+          <a:p>
+            <a:r>
+              <a:rPr lang="en-US" sz="2800" dirty="0" smtClean="0"/>
+              <a:t>- A </a:t>
+            </a:r>
+            <a:r>
+              <a:rPr lang="en-US" sz="2800" dirty="0"/>
+              <a:t>large cluster of </a:t>
+            </a:r>
+            <a:r>
+              <a:rPr lang="en-US" sz="2800" dirty="0" smtClean="0"/>
+              <a:t>0s </a:t>
+            </a:r>
+            <a:r>
+              <a:rPr lang="en-US" sz="2800" dirty="0"/>
+              <a:t>correspond to a low (negative) amplitude </a:t>
+            </a:r>
+            <a:r>
+              <a:rPr lang="en-US" sz="2800" dirty="0" smtClean="0"/>
+              <a:t>value.</a:t>
+            </a:r>
+          </a:p>
+          <a:p>
+            <a:r>
+              <a:rPr lang="en-US" sz="2800" dirty="0" smtClean="0"/>
+              <a:t>- Alternating </a:t>
+            </a:r>
+            <a:r>
+              <a:rPr lang="en-US" sz="2800" dirty="0"/>
+              <a:t>1s and </a:t>
+            </a:r>
+            <a:r>
+              <a:rPr lang="en-US" sz="2800" dirty="0" smtClean="0"/>
+              <a:t>0s </a:t>
+            </a:r>
+            <a:r>
+              <a:rPr lang="en-US" sz="2800" dirty="0"/>
+              <a:t>correspond to a zero amplitude value.</a:t>
+            </a:r>
+            <a:endParaRPr lang="en-US" sz="2800" dirty="0"/>
+          </a:p>
+        </p:txBody>
+      </p:sp>
     </p:spTree>
     <p:extLst>
       <p:ext uri="{BB962C8B-B14F-4D97-AF65-F5344CB8AC3E}">
@@ -6369,7 +7058,12 @@
             <p:ph type="title"/>
           </p:nvPr>
         </p:nvSpPr>
-        <p:spPr/>
+        <p:spPr>
+          <a:xfrm>
+            <a:off x="1371599" y="274320"/>
+            <a:ext cx="9601200" cy="742950"/>
+          </a:xfrm>
+        </p:spPr>
         <p:txBody>
           <a:bodyPr/>
           <a:lstStyle/>
@@ -6400,7 +7094,7 @@
         </p:blipFill>
         <p:spPr>
           <a:xfrm>
-            <a:off x="2839391" y="2171700"/>
+            <a:off x="2839390" y="1017270"/>
             <a:ext cx="6665617" cy="3389376"/>
           </a:xfrm>
           <a:prstGeom prst="rect">
@@ -6408,6 +7102,71 @@
           </a:prstGeom>
         </p:spPr>
       </p:pic>
+      <p:sp>
+        <p:nvSpPr>
+          <p:cNvPr id="3" name="TextBox 2"/>
+          <p:cNvSpPr txBox="1"/>
+          <p:nvPr/>
+        </p:nvSpPr>
+        <p:spPr>
+          <a:xfrm>
+            <a:off x="752856" y="4498086"/>
+            <a:ext cx="11439144" cy="2523768"/>
+          </a:xfrm>
+          <a:prstGeom prst="rect">
+            <a:avLst/>
+          </a:prstGeom>
+          <a:noFill/>
+        </p:spPr>
+        <p:txBody>
+          <a:bodyPr wrap="square" rtlCol="0">
+            <a:spAutoFit/>
+          </a:bodyPr>
+          <a:lstStyle/>
+          <a:p>
+            <a:r>
+              <a:rPr lang="en-US" sz="2800" dirty="0" smtClean="0"/>
+              <a:t>- </a:t>
+            </a:r>
+            <a:r>
+              <a:rPr lang="en-US" sz="2800" dirty="0"/>
+              <a:t>S</a:t>
+            </a:r>
+            <a:r>
+              <a:rPr lang="en-US" sz="2800" dirty="0" smtClean="0"/>
+              <a:t>pecific </a:t>
+            </a:r>
+            <a:r>
+              <a:rPr lang="en-US" sz="2800" dirty="0"/>
+              <a:t>amplitude values are encoded into pulses</a:t>
+            </a:r>
+            <a:r>
+              <a:rPr lang="en-US" sz="2800" dirty="0" smtClean="0"/>
+              <a:t>.</a:t>
+            </a:r>
+          </a:p>
+          <a:p>
+            <a:r>
+              <a:rPr lang="en-US" sz="2800" dirty="0"/>
+              <a:t>- The sampling rate is the number of samples of a signal that are taken per second to represent it digitally.</a:t>
+            </a:r>
+          </a:p>
+          <a:p>
+            <a:r>
+              <a:rPr lang="en-US" sz="2800" dirty="0"/>
+              <a:t>- The bit depth determines the number of bits of information in each sample</a:t>
+            </a:r>
+            <a:r>
+              <a:rPr lang="en-US" sz="2800" dirty="0" smtClean="0"/>
+              <a:t>. </a:t>
+            </a:r>
+            <a:endParaRPr lang="en-US" sz="2800" dirty="0"/>
+          </a:p>
+          <a:p>
+            <a:endParaRPr lang="en-US" dirty="0"/>
+          </a:p>
+        </p:txBody>
+      </p:sp>
     </p:spTree>
     <p:extLst>
       <p:ext uri="{BB962C8B-B14F-4D97-AF65-F5344CB8AC3E}">
@@ -6486,7 +7245,7 @@
         </p:blipFill>
         <p:spPr>
           <a:xfrm>
-            <a:off x="3043701" y="2171700"/>
+            <a:off x="3043701" y="1428750"/>
             <a:ext cx="6256998" cy="1737360"/>
           </a:xfrm>
           <a:prstGeom prst="rect">
@@ -6494,6 +7253,56 @@
           </a:prstGeom>
         </p:spPr>
       </p:pic>
+      <p:sp>
+        <p:nvSpPr>
+          <p:cNvPr id="3" name="TextBox 2"/>
+          <p:cNvSpPr txBox="1"/>
+          <p:nvPr/>
+        </p:nvSpPr>
+        <p:spPr>
+          <a:xfrm>
+            <a:off x="877824" y="3739896"/>
+            <a:ext cx="11201400" cy="1661993"/>
+          </a:xfrm>
+          <a:prstGeom prst="rect">
+            <a:avLst/>
+          </a:prstGeom>
+          <a:noFill/>
+        </p:spPr>
+        <p:txBody>
+          <a:bodyPr wrap="square" rtlCol="0">
+            <a:spAutoFit/>
+          </a:bodyPr>
+          <a:lstStyle/>
+          <a:p>
+            <a:r>
+              <a:rPr lang="en-US" sz="2800" dirty="0" smtClean="0"/>
+              <a:t>- The </a:t>
+            </a:r>
+            <a:r>
+              <a:rPr lang="en-US" sz="2800" dirty="0"/>
+              <a:t>I2S protocol is widely used to transfer audio data from a microcontroller/DSP (Digital Signal Processor) to an audio </a:t>
+            </a:r>
+            <a:r>
+              <a:rPr lang="en-US" sz="2800" dirty="0" smtClean="0"/>
+              <a:t>codec.</a:t>
+            </a:r>
+          </a:p>
+          <a:p>
+            <a:r>
+              <a:rPr lang="en-US" sz="2800" dirty="0" smtClean="0"/>
+              <a:t>- In </a:t>
+            </a:r>
+            <a:r>
+              <a:rPr lang="en-US" sz="2800" dirty="0"/>
+              <a:t>order to play melodies or to capture sound from a microphone.</a:t>
+            </a:r>
+          </a:p>
+          <a:p>
+            <a:endParaRPr lang="en-US" dirty="0"/>
+          </a:p>
+        </p:txBody>
+      </p:sp>
     </p:spTree>
     <p:extLst>
       <p:ext uri="{BB962C8B-B14F-4D97-AF65-F5344CB8AC3E}">

</xml_diff>

<commit_message>
Add more details in Documentation and Presentation.
</commit_message>
<xml_diff>
--- a/Presentation.pptx
+++ b/Presentation.pptx
@@ -20,9 +20,11 @@
     <p:sldId id="265" r:id="rId14"/>
     <p:sldId id="266" r:id="rId15"/>
     <p:sldId id="271" r:id="rId16"/>
-    <p:sldId id="273" r:id="rId17"/>
-    <p:sldId id="272" r:id="rId18"/>
-    <p:sldId id="267" r:id="rId19"/>
+    <p:sldId id="274" r:id="rId17"/>
+    <p:sldId id="275" r:id="rId18"/>
+    <p:sldId id="273" r:id="rId19"/>
+    <p:sldId id="272" r:id="rId20"/>
+    <p:sldId id="267" r:id="rId21"/>
   </p:sldIdLst>
   <p:sldSz cx="12192000" cy="6858000"/>
   <p:notesSz cx="6858000" cy="9144000"/>
@@ -4790,7 +4792,7 @@
         </p:nvSpPr>
         <p:spPr>
           <a:xfrm>
-            <a:off x="841248" y="3122176"/>
+            <a:off x="1143000" y="1508760"/>
             <a:ext cx="9601200" cy="585216"/>
           </a:xfrm>
         </p:spPr>
@@ -4803,7 +4805,7 @@
             </a:pPr>
             <a:r>
               <a:rPr lang="en-US" sz="2800" b="1" u="sng" dirty="0"/>
-              <a:t>- Audio Bluetooth Module (WT32I-A-AI6):-</a:t>
+              <a:t>- CS43L22-CNZ with Analog Pins:-</a:t>
             </a:r>
           </a:p>
           <a:p>
@@ -4816,7 +4818,7 @@
       </p:sp>
       <p:pic>
         <p:nvPicPr>
-          <p:cNvPr id="5" name="Picture 4"/>
+          <p:cNvPr id="4" name="Picture 3"/>
           <p:cNvPicPr>
             <a:picLocks noChangeAspect="1"/>
           </p:cNvPicPr>
@@ -4836,8 +4838,8 @@
         </p:blipFill>
         <p:spPr>
           <a:xfrm>
-            <a:off x="7861381" y="685800"/>
-            <a:ext cx="3985605" cy="6043184"/>
+            <a:off x="1862137" y="2093976"/>
+            <a:ext cx="8620125" cy="4705350"/>
           </a:xfrm>
           <a:prstGeom prst="rect">
             <a:avLst/>
@@ -4847,7 +4849,7 @@
     </p:spTree>
     <p:extLst>
       <p:ext uri="{BB962C8B-B14F-4D97-AF65-F5344CB8AC3E}">
-        <p14:creationId xmlns:p14="http://schemas.microsoft.com/office/powerpoint/2010/main" val="884722551"/>
+        <p14:creationId xmlns:p14="http://schemas.microsoft.com/office/powerpoint/2010/main" val="3003191017"/>
       </p:ext>
     </p:extLst>
   </p:cSld>
@@ -4930,7 +4932,15 @@
             </a:pPr>
             <a:r>
               <a:rPr lang="en-US" sz="2800" b="1" u="sng" dirty="0"/>
-              <a:t>- STM32F413CG (Version 1) with Audio Codec:-</a:t>
+              <a:t>- CS43L22-CNZ </a:t>
+            </a:r>
+            <a:r>
+              <a:rPr lang="en-US" sz="2800" b="1" u="sng" dirty="0" smtClean="0"/>
+              <a:t>without </a:t>
+            </a:r>
+            <a:r>
+              <a:rPr lang="en-US" sz="2800" b="1" u="sng" dirty="0"/>
+              <a:t>Analog Pins:-</a:t>
             </a:r>
           </a:p>
           <a:p>
@@ -4943,7 +4953,7 @@
       </p:sp>
       <p:pic>
         <p:nvPicPr>
-          <p:cNvPr id="4" name="Picture 3"/>
+          <p:cNvPr id="5" name="Picture 4"/>
           <p:cNvPicPr>
             <a:picLocks noChangeAspect="1"/>
           </p:cNvPicPr>
@@ -4963,8 +4973,8 @@
         </p:blipFill>
         <p:spPr>
           <a:xfrm>
-            <a:off x="1323975" y="2289619"/>
-            <a:ext cx="9696450" cy="4162425"/>
+            <a:off x="2309812" y="2171700"/>
+            <a:ext cx="7267575" cy="4724400"/>
           </a:xfrm>
           <a:prstGeom prst="rect">
             <a:avLst/>
@@ -4974,7 +4984,7 @@
     </p:spTree>
     <p:extLst>
       <p:ext uri="{BB962C8B-B14F-4D97-AF65-F5344CB8AC3E}">
-        <p14:creationId xmlns:p14="http://schemas.microsoft.com/office/powerpoint/2010/main" val="1688375218"/>
+        <p14:creationId xmlns:p14="http://schemas.microsoft.com/office/powerpoint/2010/main" val="2161629779"/>
       </p:ext>
     </p:extLst>
   </p:cSld>
@@ -5026,31 +5036,72 @@
             <a:pPr algn="ctr"/>
             <a:r>
               <a:rPr lang="en-US" b="1" u="sng" dirty="0" smtClean="0"/>
-              <a:t>Our Next Step</a:t>
+              <a:t>PCB Designs</a:t>
             </a:r>
             <a:endParaRPr lang="en-US" b="1" u="sng" dirty="0"/>
+          </a:p>
+        </p:txBody>
+      </p:sp>
+      <p:sp>
+        <p:nvSpPr>
+          <p:cNvPr id="3" name="Content Placeholder 2"/>
+          <p:cNvSpPr>
+            <a:spLocks noGrp="1"/>
+          </p:cNvSpPr>
+          <p:nvPr>
+            <p:ph idx="1"/>
+          </p:nvPr>
+        </p:nvSpPr>
+        <p:spPr>
+          <a:xfrm>
+            <a:off x="841248" y="3122176"/>
+            <a:ext cx="9601200" cy="585216"/>
+          </a:xfrm>
+        </p:spPr>
+        <p:txBody>
+          <a:bodyPr/>
+          <a:lstStyle/>
+          <a:p>
+            <a:pPr marL="0" indent="0">
+              <a:buNone/>
+            </a:pPr>
+            <a:r>
+              <a:rPr lang="en-US" sz="2800" b="1" u="sng" dirty="0"/>
+              <a:t>- Audio Bluetooth Module (WT32I-A-AI6):-</a:t>
+            </a:r>
+          </a:p>
+          <a:p>
+            <a:pPr marL="0" indent="0">
+              <a:buNone/>
+            </a:pPr>
+            <a:endParaRPr lang="en-US" dirty="0"/>
           </a:p>
         </p:txBody>
       </p:sp>
       <p:pic>
         <p:nvPicPr>
-          <p:cNvPr id="4" name="Content Placeholder 3"/>
+          <p:cNvPr id="5" name="Picture 4"/>
           <p:cNvPicPr>
-            <a:picLocks noGrp="1"/>
+            <a:picLocks noChangeAspect="1"/>
           </p:cNvPicPr>
-          <p:nvPr>
-            <p:ph idx="1"/>
-          </p:nvPr>
+          <p:nvPr/>
         </p:nvPicPr>
-        <p:blipFill rotWithShape="1">
-          <a:blip r:embed="rId2"/>
-          <a:srcRect t="5617"/>
-          <a:stretch/>
+        <p:blipFill>
+          <a:blip r:embed="rId2">
+            <a:extLst>
+              <a:ext uri="{28A0092B-C50C-407E-A947-70E740481C1C}">
+                <a14:useLocalDpi xmlns:a14="http://schemas.microsoft.com/office/drawing/2010/main" val="0"/>
+              </a:ext>
+            </a:extLst>
+          </a:blip>
+          <a:stretch>
+            <a:fillRect/>
+          </a:stretch>
         </p:blipFill>
         <p:spPr>
           <a:xfrm>
-            <a:off x="3215917" y="1728216"/>
-            <a:ext cx="5912565" cy="3380232"/>
+            <a:off x="7861381" y="685800"/>
+            <a:ext cx="3985605" cy="6043184"/>
           </a:xfrm>
           <a:prstGeom prst="rect">
             <a:avLst/>
@@ -5060,7 +5111,134 @@
     </p:spTree>
     <p:extLst>
       <p:ext uri="{BB962C8B-B14F-4D97-AF65-F5344CB8AC3E}">
-        <p14:creationId xmlns:p14="http://schemas.microsoft.com/office/powerpoint/2010/main" val="226698127"/>
+        <p14:creationId xmlns:p14="http://schemas.microsoft.com/office/powerpoint/2010/main" val="884722551"/>
+      </p:ext>
+    </p:extLst>
+  </p:cSld>
+  <p:clrMapOvr>
+    <a:masterClrMapping/>
+  </p:clrMapOvr>
+  <p:timing>
+    <p:tnLst>
+      <p:par>
+        <p:cTn id="1" dur="indefinite" restart="never" nodeType="tmRoot"/>
+      </p:par>
+    </p:tnLst>
+  </p:timing>
+</p:sld>
+</file>
+
+<file path=ppt/slides/slide19.xml><?xml version="1.0" encoding="utf-8"?>
+<p:sld xmlns:a="http://schemas.openxmlformats.org/drawingml/2006/main" xmlns:r="http://schemas.openxmlformats.org/officeDocument/2006/relationships" xmlns:p="http://schemas.openxmlformats.org/presentationml/2006/main">
+  <p:cSld>
+    <p:spTree>
+      <p:nvGrpSpPr>
+        <p:cNvPr id="1" name=""/>
+        <p:cNvGrpSpPr/>
+        <p:nvPr/>
+      </p:nvGrpSpPr>
+      <p:grpSpPr>
+        <a:xfrm>
+          <a:off x="0" y="0"/>
+          <a:ext cx="0" cy="0"/>
+          <a:chOff x="0" y="0"/>
+          <a:chExt cx="0" cy="0"/>
+        </a:xfrm>
+      </p:grpSpPr>
+      <p:sp>
+        <p:nvSpPr>
+          <p:cNvPr id="2" name="Title 1"/>
+          <p:cNvSpPr>
+            <a:spLocks noGrp="1"/>
+          </p:cNvSpPr>
+          <p:nvPr>
+            <p:ph type="title"/>
+          </p:nvPr>
+        </p:nvSpPr>
+        <p:spPr/>
+        <p:txBody>
+          <a:bodyPr/>
+          <a:lstStyle/>
+          <a:p>
+            <a:pPr algn="ctr"/>
+            <a:r>
+              <a:rPr lang="en-US" b="1" u="sng" dirty="0" smtClean="0"/>
+              <a:t>PCB Designs</a:t>
+            </a:r>
+            <a:endParaRPr lang="en-US" b="1" u="sng" dirty="0"/>
+          </a:p>
+        </p:txBody>
+      </p:sp>
+      <p:sp>
+        <p:nvSpPr>
+          <p:cNvPr id="3" name="Content Placeholder 2"/>
+          <p:cNvSpPr>
+            <a:spLocks noGrp="1"/>
+          </p:cNvSpPr>
+          <p:nvPr>
+            <p:ph idx="1"/>
+          </p:nvPr>
+        </p:nvSpPr>
+        <p:spPr>
+          <a:xfrm>
+            <a:off x="1143000" y="1508760"/>
+            <a:ext cx="9601200" cy="585216"/>
+          </a:xfrm>
+        </p:spPr>
+        <p:txBody>
+          <a:bodyPr/>
+          <a:lstStyle/>
+          <a:p>
+            <a:pPr marL="0" indent="0">
+              <a:buNone/>
+            </a:pPr>
+            <a:r>
+              <a:rPr lang="en-US" sz="2800" b="1" u="sng" dirty="0"/>
+              <a:t>- STM32F413CG (Version 1) with Audio Codec:-</a:t>
+            </a:r>
+          </a:p>
+          <a:p>
+            <a:pPr marL="0" indent="0">
+              <a:buNone/>
+            </a:pPr>
+            <a:endParaRPr lang="en-US" dirty="0"/>
+          </a:p>
+        </p:txBody>
+      </p:sp>
+      <p:pic>
+        <p:nvPicPr>
+          <p:cNvPr id="4" name="Picture 3"/>
+          <p:cNvPicPr>
+            <a:picLocks noChangeAspect="1"/>
+          </p:cNvPicPr>
+          <p:nvPr/>
+        </p:nvPicPr>
+        <p:blipFill>
+          <a:blip r:embed="rId2">
+            <a:extLst>
+              <a:ext uri="{28A0092B-C50C-407E-A947-70E740481C1C}">
+                <a14:useLocalDpi xmlns:a14="http://schemas.microsoft.com/office/drawing/2010/main" val="0"/>
+              </a:ext>
+            </a:extLst>
+          </a:blip>
+          <a:stretch>
+            <a:fillRect/>
+          </a:stretch>
+        </p:blipFill>
+        <p:spPr>
+          <a:xfrm>
+            <a:off x="1323975" y="2289619"/>
+            <a:ext cx="9696450" cy="4162425"/>
+          </a:xfrm>
+          <a:prstGeom prst="rect">
+            <a:avLst/>
+          </a:prstGeom>
+        </p:spPr>
+      </p:pic>
+    </p:spTree>
+    <p:extLst>
+      <p:ext uri="{BB962C8B-B14F-4D97-AF65-F5344CB8AC3E}">
+        <p14:creationId xmlns:p14="http://schemas.microsoft.com/office/powerpoint/2010/main" val="1688375218"/>
       </p:ext>
     </p:extLst>
   </p:cSld>
@@ -5159,6 +5337,92 @@
   <p:clrMapOvr>
     <a:masterClrMapping/>
   </p:clrMapOvr>
+</p:sld>
+</file>
+
+<file path=ppt/slides/slide20.xml><?xml version="1.0" encoding="utf-8"?>
+<p:sld xmlns:a="http://schemas.openxmlformats.org/drawingml/2006/main" xmlns:r="http://schemas.openxmlformats.org/officeDocument/2006/relationships" xmlns:p="http://schemas.openxmlformats.org/presentationml/2006/main">
+  <p:cSld>
+    <p:spTree>
+      <p:nvGrpSpPr>
+        <p:cNvPr id="1" name=""/>
+        <p:cNvGrpSpPr/>
+        <p:nvPr/>
+      </p:nvGrpSpPr>
+      <p:grpSpPr>
+        <a:xfrm>
+          <a:off x="0" y="0"/>
+          <a:ext cx="0" cy="0"/>
+          <a:chOff x="0" y="0"/>
+          <a:chExt cx="0" cy="0"/>
+        </a:xfrm>
+      </p:grpSpPr>
+      <p:sp>
+        <p:nvSpPr>
+          <p:cNvPr id="2" name="Title 1"/>
+          <p:cNvSpPr>
+            <a:spLocks noGrp="1"/>
+          </p:cNvSpPr>
+          <p:nvPr>
+            <p:ph type="title"/>
+          </p:nvPr>
+        </p:nvSpPr>
+        <p:spPr/>
+        <p:txBody>
+          <a:bodyPr/>
+          <a:lstStyle/>
+          <a:p>
+            <a:pPr algn="ctr"/>
+            <a:r>
+              <a:rPr lang="en-US" b="1" u="sng" dirty="0" smtClean="0"/>
+              <a:t>Our Next Step</a:t>
+            </a:r>
+            <a:endParaRPr lang="en-US" b="1" u="sng" dirty="0"/>
+          </a:p>
+        </p:txBody>
+      </p:sp>
+      <p:pic>
+        <p:nvPicPr>
+          <p:cNvPr id="4" name="Content Placeholder 3"/>
+          <p:cNvPicPr>
+            <a:picLocks noGrp="1"/>
+          </p:cNvPicPr>
+          <p:nvPr>
+            <p:ph idx="1"/>
+          </p:nvPr>
+        </p:nvPicPr>
+        <p:blipFill rotWithShape="1">
+          <a:blip r:embed="rId2"/>
+          <a:srcRect t="5617"/>
+          <a:stretch/>
+        </p:blipFill>
+        <p:spPr>
+          <a:xfrm>
+            <a:off x="3215917" y="1728216"/>
+            <a:ext cx="5912565" cy="3380232"/>
+          </a:xfrm>
+          <a:prstGeom prst="rect">
+            <a:avLst/>
+          </a:prstGeom>
+        </p:spPr>
+      </p:pic>
+    </p:spTree>
+    <p:extLst>
+      <p:ext uri="{BB962C8B-B14F-4D97-AF65-F5344CB8AC3E}">
+        <p14:creationId xmlns:p14="http://schemas.microsoft.com/office/powerpoint/2010/main" val="226698127"/>
+      </p:ext>
+    </p:extLst>
+  </p:cSld>
+  <p:clrMapOvr>
+    <a:masterClrMapping/>
+  </p:clrMapOvr>
+  <p:timing>
+    <p:tnLst>
+      <p:par>
+        <p:cTn id="1" dur="indefinite" restart="never" nodeType="tmRoot"/>
+      </p:par>
+    </p:tnLst>
+  </p:timing>
 </p:sld>
 </file>
 
@@ -6835,7 +7099,6 @@
               <a:rPr lang="en-US" sz="2800" dirty="0"/>
               <a:t>- The digital MEMS microphone is a sensor that convert acoustic pressure waves into a digital signal. </a:t>
             </a:r>
-            <a:endParaRPr lang="en-US" sz="2800" dirty="0"/>
           </a:p>
         </p:txBody>
       </p:sp>
@@ -7007,7 +7270,6 @@
               <a:rPr lang="en-US" sz="2800" dirty="0"/>
               <a:t>correspond to a zero amplitude value.</a:t>
             </a:r>
-            <a:endParaRPr lang="en-US" sz="2800" dirty="0"/>
           </a:p>
         </p:txBody>
       </p:sp>

</xml_diff>

<commit_message>
Added details in the Documentation.
</commit_message>
<xml_diff>
--- a/Presentation.pptx
+++ b/Presentation.pptx
@@ -6,25 +6,27 @@
   </p:sldMasterIdLst>
   <p:sldIdLst>
     <p:sldId id="256" r:id="rId2"/>
-    <p:sldId id="268" r:id="rId3"/>
-    <p:sldId id="269" r:id="rId4"/>
-    <p:sldId id="257" r:id="rId5"/>
-    <p:sldId id="270" r:id="rId6"/>
-    <p:sldId id="262" r:id="rId7"/>
-    <p:sldId id="258" r:id="rId8"/>
-    <p:sldId id="259" r:id="rId9"/>
-    <p:sldId id="260" r:id="rId10"/>
-    <p:sldId id="261" r:id="rId11"/>
-    <p:sldId id="263" r:id="rId12"/>
-    <p:sldId id="264" r:id="rId13"/>
-    <p:sldId id="265" r:id="rId14"/>
-    <p:sldId id="266" r:id="rId15"/>
-    <p:sldId id="271" r:id="rId16"/>
-    <p:sldId id="274" r:id="rId17"/>
-    <p:sldId id="275" r:id="rId18"/>
-    <p:sldId id="273" r:id="rId19"/>
-    <p:sldId id="272" r:id="rId20"/>
-    <p:sldId id="267" r:id="rId21"/>
+    <p:sldId id="276" r:id="rId3"/>
+    <p:sldId id="277" r:id="rId4"/>
+    <p:sldId id="268" r:id="rId5"/>
+    <p:sldId id="269" r:id="rId6"/>
+    <p:sldId id="257" r:id="rId7"/>
+    <p:sldId id="270" r:id="rId8"/>
+    <p:sldId id="262" r:id="rId9"/>
+    <p:sldId id="258" r:id="rId10"/>
+    <p:sldId id="259" r:id="rId11"/>
+    <p:sldId id="260" r:id="rId12"/>
+    <p:sldId id="261" r:id="rId13"/>
+    <p:sldId id="263" r:id="rId14"/>
+    <p:sldId id="264" r:id="rId15"/>
+    <p:sldId id="265" r:id="rId16"/>
+    <p:sldId id="266" r:id="rId17"/>
+    <p:sldId id="271" r:id="rId18"/>
+    <p:sldId id="274" r:id="rId19"/>
+    <p:sldId id="275" r:id="rId20"/>
+    <p:sldId id="273" r:id="rId21"/>
+    <p:sldId id="272" r:id="rId22"/>
+    <p:sldId id="267" r:id="rId23"/>
   </p:sldIdLst>
   <p:sldSz cx="12192000" cy="6858000"/>
   <p:notesSz cx="6858000" cy="9144000"/>
@@ -300,7 +302,7 @@
           <a:p>
             <a:fld id="{CC06D8EC-6E2E-4E4A-8543-542A723F19F4}" type="datetimeFigureOut">
               <a:rPr lang="en-US" smtClean="0"/>
-              <a:t>23/6/2019</a:t>
+              <a:t>25/6/2019</a:t>
             </a:fld>
             <a:endParaRPr lang="en-US"/>
           </a:p>
@@ -630,7 +632,7 @@
           <a:p>
             <a:fld id="{CC06D8EC-6E2E-4E4A-8543-542A723F19F4}" type="datetimeFigureOut">
               <a:rPr lang="en-US" smtClean="0"/>
-              <a:t>23/6/2019</a:t>
+              <a:t>25/6/2019</a:t>
             </a:fld>
             <a:endParaRPr lang="en-US"/>
           </a:p>
@@ -810,7 +812,7 @@
           <a:p>
             <a:fld id="{CC06D8EC-6E2E-4E4A-8543-542A723F19F4}" type="datetimeFigureOut">
               <a:rPr lang="en-US" smtClean="0"/>
-              <a:t>23/6/2019</a:t>
+              <a:t>25/6/2019</a:t>
             </a:fld>
             <a:endParaRPr lang="en-US"/>
           </a:p>
@@ -980,7 +982,7 @@
           <a:p>
             <a:fld id="{CC06D8EC-6E2E-4E4A-8543-542A723F19F4}" type="datetimeFigureOut">
               <a:rPr lang="en-US" smtClean="0"/>
-              <a:t>23/6/2019</a:t>
+              <a:t>25/6/2019</a:t>
             </a:fld>
             <a:endParaRPr lang="en-US"/>
           </a:p>
@@ -1257,7 +1259,7 @@
           <a:p>
             <a:fld id="{CC06D8EC-6E2E-4E4A-8543-542A723F19F4}" type="datetimeFigureOut">
               <a:rPr lang="en-US" smtClean="0"/>
-              <a:t>23/6/2019</a:t>
+              <a:t>25/6/2019</a:t>
             </a:fld>
             <a:endParaRPr lang="en-US"/>
           </a:p>
@@ -1651,7 +1653,7 @@
           <a:p>
             <a:fld id="{CC06D8EC-6E2E-4E4A-8543-542A723F19F4}" type="datetimeFigureOut">
               <a:rPr lang="en-US" smtClean="0"/>
-              <a:t>23/6/2019</a:t>
+              <a:t>25/6/2019</a:t>
             </a:fld>
             <a:endParaRPr lang="en-US"/>
           </a:p>
@@ -2128,7 +2130,7 @@
           <a:p>
             <a:fld id="{CC06D8EC-6E2E-4E4A-8543-542A723F19F4}" type="datetimeFigureOut">
               <a:rPr lang="en-US" smtClean="0"/>
-              <a:t>23/6/2019</a:t>
+              <a:t>25/6/2019</a:t>
             </a:fld>
             <a:endParaRPr lang="en-US"/>
           </a:p>
@@ -2246,7 +2248,7 @@
           <a:p>
             <a:fld id="{CC06D8EC-6E2E-4E4A-8543-542A723F19F4}" type="datetimeFigureOut">
               <a:rPr lang="en-US" smtClean="0"/>
-              <a:t>23/6/2019</a:t>
+              <a:t>25/6/2019</a:t>
             </a:fld>
             <a:endParaRPr lang="en-US"/>
           </a:p>
@@ -2341,7 +2343,7 @@
           <a:p>
             <a:fld id="{CC06D8EC-6E2E-4E4A-8543-542A723F19F4}" type="datetimeFigureOut">
               <a:rPr lang="en-US" smtClean="0"/>
-              <a:t>23/6/2019</a:t>
+              <a:t>25/6/2019</a:t>
             </a:fld>
             <a:endParaRPr lang="en-US"/>
           </a:p>
@@ -2687,7 +2689,7 @@
           <a:p>
             <a:fld id="{CC06D8EC-6E2E-4E4A-8543-542A723F19F4}" type="datetimeFigureOut">
               <a:rPr lang="en-US" smtClean="0"/>
-              <a:t>23/6/2019</a:t>
+              <a:t>25/6/2019</a:t>
             </a:fld>
             <a:endParaRPr lang="en-US"/>
           </a:p>
@@ -3075,7 +3077,7 @@
           <a:p>
             <a:fld id="{CC06D8EC-6E2E-4E4A-8543-542A723F19F4}" type="datetimeFigureOut">
               <a:rPr lang="en-US" smtClean="0"/>
-              <a:t>23/6/2019</a:t>
+              <a:t>25/6/2019</a:t>
             </a:fld>
             <a:endParaRPr lang="en-US"/>
           </a:p>
@@ -3353,7 +3355,7 @@
           <a:p>
             <a:fld id="{CC06D8EC-6E2E-4E4A-8543-542A723F19F4}" type="datetimeFigureOut">
               <a:rPr lang="en-US" smtClean="0"/>
-              <a:t>23/6/2019</a:t>
+              <a:t>25/6/2019</a:t>
             </a:fld>
             <a:endParaRPr lang="en-US"/>
           </a:p>
@@ -4063,7 +4065,12 @@
             <p:ph type="title"/>
           </p:nvPr>
         </p:nvSpPr>
-        <p:spPr/>
+        <p:spPr>
+          <a:xfrm>
+            <a:off x="1371599" y="274320"/>
+            <a:ext cx="9601200" cy="742950"/>
+          </a:xfrm>
+        </p:spPr>
         <p:txBody>
           <a:bodyPr/>
           <a:lstStyle/>
@@ -4071,7 +4078,7 @@
             <a:pPr algn="ctr"/>
             <a:r>
               <a:rPr lang="en-US" b="1" u="sng" dirty="0" smtClean="0"/>
-              <a:t>PDM2PCM Conversion</a:t>
+              <a:t>PCM Signal</a:t>
             </a:r>
             <a:endParaRPr lang="en-US" b="1" u="sng" dirty="0"/>
           </a:p>
@@ -4089,44 +4096,88 @@
         </p:nvPicPr>
         <p:blipFill rotWithShape="1">
           <a:blip r:embed="rId2"/>
-          <a:srcRect t="9104"/>
+          <a:srcRect t="5362"/>
           <a:stretch/>
         </p:blipFill>
         <p:spPr>
           <a:xfrm>
-            <a:off x="2405060" y="2165604"/>
-            <a:ext cx="7534275" cy="2008632"/>
+            <a:off x="2839390" y="1017270"/>
+            <a:ext cx="6665617" cy="3389376"/>
           </a:xfrm>
           <a:prstGeom prst="rect">
             <a:avLst/>
           </a:prstGeom>
         </p:spPr>
       </p:pic>
-      <p:pic>
-        <p:nvPicPr>
-          <p:cNvPr id="5" name="Picture 4"/>
-          <p:cNvPicPr/>
+      <p:sp>
+        <p:nvSpPr>
+          <p:cNvPr id="3" name="TextBox 2"/>
+          <p:cNvSpPr txBox="1"/>
           <p:nvPr/>
-        </p:nvPicPr>
-        <p:blipFill rotWithShape="1">
-          <a:blip r:embed="rId3"/>
-          <a:srcRect t="9592"/>
-          <a:stretch/>
-        </p:blipFill>
-        <p:spPr>
-          <a:xfrm>
-            <a:off x="3031806" y="4991100"/>
-            <a:ext cx="6280785" cy="1350264"/>
+        </p:nvSpPr>
+        <p:spPr>
+          <a:xfrm>
+            <a:off x="752856" y="4498086"/>
+            <a:ext cx="11439144" cy="2523768"/>
           </a:xfrm>
           <a:prstGeom prst="rect">
             <a:avLst/>
           </a:prstGeom>
-        </p:spPr>
-      </p:pic>
+          <a:noFill/>
+        </p:spPr>
+        <p:txBody>
+          <a:bodyPr wrap="square" rtlCol="0">
+            <a:spAutoFit/>
+          </a:bodyPr>
+          <a:lstStyle/>
+          <a:p>
+            <a:r>
+              <a:rPr lang="en-US" sz="2800" dirty="0" smtClean="0"/>
+              <a:t>- </a:t>
+            </a:r>
+            <a:r>
+              <a:rPr lang="en-US" sz="2800" dirty="0"/>
+              <a:t>S</a:t>
+            </a:r>
+            <a:r>
+              <a:rPr lang="en-US" sz="2800" dirty="0" smtClean="0"/>
+              <a:t>pecific </a:t>
+            </a:r>
+            <a:r>
+              <a:rPr lang="en-US" sz="2800" dirty="0"/>
+              <a:t>amplitude values are encoded into pulses</a:t>
+            </a:r>
+            <a:r>
+              <a:rPr lang="en-US" sz="2800" dirty="0" smtClean="0"/>
+              <a:t>.</a:t>
+            </a:r>
+          </a:p>
+          <a:p>
+            <a:r>
+              <a:rPr lang="en-US" sz="2800" dirty="0"/>
+              <a:t>- The sampling rate is the number of samples of a signal that are taken per second to represent it digitally.</a:t>
+            </a:r>
+          </a:p>
+          <a:p>
+            <a:r>
+              <a:rPr lang="en-US" sz="2800" dirty="0"/>
+              <a:t>- The bit depth determines the number of bits of information in each sample</a:t>
+            </a:r>
+            <a:r>
+              <a:rPr lang="en-US" sz="2800" dirty="0" smtClean="0"/>
+              <a:t>. </a:t>
+            </a:r>
+            <a:endParaRPr lang="en-US" sz="2800" dirty="0"/>
+          </a:p>
+          <a:p>
+            <a:endParaRPr lang="en-US" dirty="0"/>
+          </a:p>
+        </p:txBody>
+      </p:sp>
     </p:spTree>
     <p:extLst>
       <p:ext uri="{BB962C8B-B14F-4D97-AF65-F5344CB8AC3E}">
-        <p14:creationId xmlns:p14="http://schemas.microsoft.com/office/powerpoint/2010/main" val="752666886"/>
+        <p14:creationId xmlns:p14="http://schemas.microsoft.com/office/powerpoint/2010/main" val="1539137432"/>
       </p:ext>
     </p:extLst>
   </p:cSld>
@@ -4172,16 +4223,15 @@
         </p:nvSpPr>
         <p:spPr/>
         <p:txBody>
-          <a:bodyPr>
-            <a:normAutofit/>
-          </a:bodyPr>
+          <a:bodyPr/>
           <a:lstStyle/>
           <a:p>
             <a:pPr algn="ctr"/>
             <a:r>
-              <a:rPr lang="en-US" b="1" u="sng" dirty="0"/>
-              <a:t>Audio codec (CS43L22)</a:t>
-            </a:r>
+              <a:rPr lang="en-US" b="1" u="sng" dirty="0" smtClean="0"/>
+              <a:t>I2S Protocol</a:t>
+            </a:r>
+            <a:endParaRPr lang="en-US" b="1" u="sng" dirty="0"/>
           </a:p>
         </p:txBody>
       </p:sp>
@@ -4195,22 +4245,15 @@
             <p:ph idx="1"/>
           </p:nvPr>
         </p:nvPicPr>
-        <p:blipFill>
-          <a:blip r:embed="rId2" cstate="print">
-            <a:extLst>
-              <a:ext uri="{28A0092B-C50C-407E-A947-70E740481C1C}">
-                <a14:useLocalDpi xmlns:a14="http://schemas.microsoft.com/office/drawing/2010/main" val="0"/>
-              </a:ext>
-            </a:extLst>
-          </a:blip>
-          <a:stretch>
-            <a:fillRect/>
-          </a:stretch>
+        <p:blipFill rotWithShape="1">
+          <a:blip r:embed="rId2"/>
+          <a:srcRect t="4596" b="46893"/>
+          <a:stretch/>
         </p:blipFill>
         <p:spPr>
           <a:xfrm>
-            <a:off x="4450886" y="1428750"/>
-            <a:ext cx="3442627" cy="3581400"/>
+            <a:off x="3043701" y="1428750"/>
+            <a:ext cx="6256998" cy="1737360"/>
           </a:xfrm>
           <a:prstGeom prst="rect">
             <a:avLst/>
@@ -4219,14 +4262,14 @@
       </p:pic>
       <p:sp>
         <p:nvSpPr>
-          <p:cNvPr id="5" name="TextBox 4"/>
+          <p:cNvPr id="3" name="TextBox 2"/>
           <p:cNvSpPr txBox="1"/>
           <p:nvPr/>
         </p:nvSpPr>
         <p:spPr>
           <a:xfrm>
-            <a:off x="941832" y="5120640"/>
-            <a:ext cx="11018520" cy="1661993"/>
+            <a:off x="877824" y="3739896"/>
+            <a:ext cx="11201400" cy="1661993"/>
           </a:xfrm>
           <a:prstGeom prst="rect">
             <a:avLst/>
@@ -4240,101 +4283,50 @@
           <a:lstStyle/>
           <a:p>
             <a:r>
-              <a:rPr lang="en-US" sz="2800" dirty="0"/>
-              <a:t>- The CS43L22 is a highly integrated, low power, 24-bit audio DAC comprised of a Digital Signal Processing Engine, headphone amplifiers, a digital PWM modulator and two full-bridge power back-ends.</a:t>
-            </a:r>
-          </a:p>
-          <a:p>
-            <a:endParaRPr lang="en-US" dirty="0"/>
-          </a:p>
-        </p:txBody>
-      </p:sp>
-      <p:sp>
-        <p:nvSpPr>
-          <p:cNvPr id="6" name="TextBox 5"/>
-          <p:cNvSpPr txBox="1"/>
-          <p:nvPr/>
-        </p:nvSpPr>
-        <p:spPr>
-          <a:xfrm>
-            <a:off x="1042416" y="1627632"/>
-            <a:ext cx="2944368" cy="1384995"/>
-          </a:xfrm>
-          <a:prstGeom prst="rect">
-            <a:avLst/>
-          </a:prstGeom>
-          <a:noFill/>
-        </p:spPr>
-        <p:txBody>
-          <a:bodyPr wrap="square" rtlCol="0">
-            <a:spAutoFit/>
-          </a:bodyPr>
-          <a:lstStyle/>
-          <a:p>
-            <a:r>
               <a:rPr lang="en-US" sz="2800" dirty="0" smtClean="0"/>
               <a:t>- The </a:t>
             </a:r>
             <a:r>
               <a:rPr lang="en-US" sz="2800" dirty="0"/>
-              <a:t>control port operates using an I²C </a:t>
+              <a:t>I2S protocol is widely used to transfer audio data from a microcontroller/DSP (Digital Signal Processor) to an audio </a:t>
             </a:r>
             <a:r>
               <a:rPr lang="en-US" sz="2800" dirty="0" smtClean="0"/>
-              <a:t>interface.</a:t>
-            </a:r>
-            <a:endParaRPr lang="en-US" sz="2800" dirty="0"/>
-          </a:p>
-        </p:txBody>
-      </p:sp>
-      <p:sp>
-        <p:nvSpPr>
-          <p:cNvPr id="7" name="TextBox 6"/>
-          <p:cNvSpPr txBox="1"/>
-          <p:nvPr/>
-        </p:nvSpPr>
-        <p:spPr>
-          <a:xfrm>
-            <a:off x="8492534" y="1627632"/>
-            <a:ext cx="2944368" cy="1384995"/>
-          </a:xfrm>
-          <a:prstGeom prst="rect">
-            <a:avLst/>
-          </a:prstGeom>
-          <a:noFill/>
-        </p:spPr>
-        <p:txBody>
-          <a:bodyPr wrap="square" rtlCol="0">
-            <a:spAutoFit/>
-          </a:bodyPr>
-          <a:lstStyle/>
+              <a:t>codec.</a:t>
+            </a:r>
+          </a:p>
           <a:p>
             <a:r>
               <a:rPr lang="en-US" sz="2800" dirty="0" smtClean="0"/>
-              <a:t>- The audio port </a:t>
+              <a:t>- In </a:t>
             </a:r>
             <a:r>
               <a:rPr lang="en-US" sz="2800" dirty="0"/>
-              <a:t>operates using an </a:t>
-            </a:r>
-            <a:r>
-              <a:rPr lang="en-US" sz="2800" dirty="0" smtClean="0"/>
-              <a:t>I²S interface.</a:t>
-            </a:r>
-            <a:endParaRPr lang="en-US" sz="2800" dirty="0"/>
+              <a:t>order to play melodies or to capture sound from a microphone.</a:t>
+            </a:r>
+          </a:p>
+          <a:p>
+            <a:endParaRPr lang="en-US" dirty="0"/>
           </a:p>
         </p:txBody>
       </p:sp>
     </p:spTree>
     <p:extLst>
       <p:ext uri="{BB962C8B-B14F-4D97-AF65-F5344CB8AC3E}">
-        <p14:creationId xmlns:p14="http://schemas.microsoft.com/office/powerpoint/2010/main" val="1847720716"/>
+        <p14:creationId xmlns:p14="http://schemas.microsoft.com/office/powerpoint/2010/main" val="2247753315"/>
       </p:ext>
     </p:extLst>
   </p:cSld>
   <p:clrMapOvr>
     <a:masterClrMapping/>
   </p:clrMapOvr>
+  <p:timing>
+    <p:tnLst>
+      <p:par>
+        <p:cTn id="1" dur="indefinite" restart="never" nodeType="tmRoot"/>
+      </p:par>
+    </p:tnLst>
+  </p:timing>
 </p:sld>
 </file>
 
@@ -4372,42 +4364,76 @@
           <a:p>
             <a:pPr algn="ctr"/>
             <a:r>
-              <a:rPr lang="en-US" b="1" u="sng" dirty="0"/>
-              <a:t>Audio Bluetooth module (WT32I-A-AI6)</a:t>
-            </a:r>
-            <a:endParaRPr lang="en-US" dirty="0"/>
-          </a:p>
-        </p:txBody>
-      </p:sp>
-      <p:sp>
-        <p:nvSpPr>
-          <p:cNvPr id="3" name="Content Placeholder 2"/>
-          <p:cNvSpPr>
-            <a:spLocks noGrp="1"/>
-          </p:cNvSpPr>
+              <a:rPr lang="en-US" b="1" u="sng" dirty="0" smtClean="0"/>
+              <a:t>PDM2PCM Conversion</a:t>
+            </a:r>
+            <a:endParaRPr lang="en-US" b="1" u="sng" dirty="0"/>
+          </a:p>
+        </p:txBody>
+      </p:sp>
+      <p:pic>
+        <p:nvPicPr>
+          <p:cNvPr id="4" name="Content Placeholder 3"/>
+          <p:cNvPicPr>
+            <a:picLocks noGrp="1"/>
+          </p:cNvPicPr>
           <p:nvPr>
             <p:ph idx="1"/>
           </p:nvPr>
-        </p:nvSpPr>
-        <p:spPr/>
-        <p:txBody>
-          <a:bodyPr/>
-          <a:lstStyle/>
-          <a:p>
-            <a:endParaRPr lang="en-US"/>
-          </a:p>
-        </p:txBody>
-      </p:sp>
+        </p:nvPicPr>
+        <p:blipFill rotWithShape="1">
+          <a:blip r:embed="rId2"/>
+          <a:srcRect t="9104"/>
+          <a:stretch/>
+        </p:blipFill>
+        <p:spPr>
+          <a:xfrm>
+            <a:off x="2405060" y="2165604"/>
+            <a:ext cx="7534275" cy="2008632"/>
+          </a:xfrm>
+          <a:prstGeom prst="rect">
+            <a:avLst/>
+          </a:prstGeom>
+        </p:spPr>
+      </p:pic>
+      <p:pic>
+        <p:nvPicPr>
+          <p:cNvPr id="5" name="Picture 4"/>
+          <p:cNvPicPr/>
+          <p:nvPr/>
+        </p:nvPicPr>
+        <p:blipFill rotWithShape="1">
+          <a:blip r:embed="rId3"/>
+          <a:srcRect t="9592"/>
+          <a:stretch/>
+        </p:blipFill>
+        <p:spPr>
+          <a:xfrm>
+            <a:off x="3031806" y="4991100"/>
+            <a:ext cx="6280785" cy="1350264"/>
+          </a:xfrm>
+          <a:prstGeom prst="rect">
+            <a:avLst/>
+          </a:prstGeom>
+        </p:spPr>
+      </p:pic>
     </p:spTree>
     <p:extLst>
       <p:ext uri="{BB962C8B-B14F-4D97-AF65-F5344CB8AC3E}">
-        <p14:creationId xmlns:p14="http://schemas.microsoft.com/office/powerpoint/2010/main" val="3316276132"/>
+        <p14:creationId xmlns:p14="http://schemas.microsoft.com/office/powerpoint/2010/main" val="752666886"/>
       </p:ext>
     </p:extLst>
   </p:cSld>
   <p:clrMapOvr>
     <a:masterClrMapping/>
   </p:clrMapOvr>
+  <p:timing>
+    <p:tnLst>
+      <p:par>
+        <p:cTn id="1" dur="indefinite" restart="never" nodeType="tmRoot"/>
+      </p:par>
+    </p:tnLst>
+  </p:timing>
 </p:sld>
 </file>
 
@@ -4440,54 +4466,169 @@
         </p:nvSpPr>
         <p:spPr/>
         <p:txBody>
-          <a:bodyPr/>
+          <a:bodyPr>
+            <a:normAutofit/>
+          </a:bodyPr>
           <a:lstStyle/>
           <a:p>
             <a:pPr algn="ctr"/>
             <a:r>
-              <a:rPr lang="en-US" b="1" u="sng" dirty="0" smtClean="0"/>
-              <a:t>Hardware Components</a:t>
-            </a:r>
-            <a:endParaRPr lang="en-US" b="1" u="sng" dirty="0"/>
-          </a:p>
-        </p:txBody>
-      </p:sp>
-      <p:sp>
-        <p:nvSpPr>
-          <p:cNvPr id="3" name="Content Placeholder 2"/>
-          <p:cNvSpPr>
-            <a:spLocks noGrp="1"/>
-          </p:cNvSpPr>
+              <a:rPr lang="en-US" b="1" u="sng" dirty="0"/>
+              <a:t>Audio codec (CS43L22)</a:t>
+            </a:r>
+          </a:p>
+        </p:txBody>
+      </p:sp>
+      <p:pic>
+        <p:nvPicPr>
+          <p:cNvPr id="4" name="Content Placeholder 3"/>
+          <p:cNvPicPr>
+            <a:picLocks noGrp="1"/>
+          </p:cNvPicPr>
           <p:nvPr>
             <p:ph idx="1"/>
           </p:nvPr>
-        </p:nvSpPr>
-        <p:spPr/>
-        <p:txBody>
-          <a:bodyPr/>
-          <a:lstStyle/>
-          <a:p>
-            <a:endParaRPr lang="en-US"/>
+        </p:nvPicPr>
+        <p:blipFill>
+          <a:blip r:embed="rId2" cstate="print">
+            <a:extLst>
+              <a:ext uri="{28A0092B-C50C-407E-A947-70E740481C1C}">
+                <a14:useLocalDpi xmlns:a14="http://schemas.microsoft.com/office/drawing/2010/main" val="0"/>
+              </a:ext>
+            </a:extLst>
+          </a:blip>
+          <a:stretch>
+            <a:fillRect/>
+          </a:stretch>
+        </p:blipFill>
+        <p:spPr>
+          <a:xfrm>
+            <a:off x="4450886" y="1428750"/>
+            <a:ext cx="3442627" cy="3581400"/>
+          </a:xfrm>
+          <a:prstGeom prst="rect">
+            <a:avLst/>
+          </a:prstGeom>
+        </p:spPr>
+      </p:pic>
+      <p:sp>
+        <p:nvSpPr>
+          <p:cNvPr id="5" name="TextBox 4"/>
+          <p:cNvSpPr txBox="1"/>
+          <p:nvPr/>
+        </p:nvSpPr>
+        <p:spPr>
+          <a:xfrm>
+            <a:off x="941832" y="5120640"/>
+            <a:ext cx="11018520" cy="1661993"/>
+          </a:xfrm>
+          <a:prstGeom prst="rect">
+            <a:avLst/>
+          </a:prstGeom>
+          <a:noFill/>
+        </p:spPr>
+        <p:txBody>
+          <a:bodyPr wrap="square" rtlCol="0">
+            <a:spAutoFit/>
+          </a:bodyPr>
+          <a:lstStyle/>
+          <a:p>
+            <a:r>
+              <a:rPr lang="en-US" sz="2800" dirty="0"/>
+              <a:t>- The CS43L22 is a highly integrated, low power, 24-bit audio DAC comprised of a Digital Signal Processing Engine, headphone amplifiers, a digital PWM modulator and two full-bridge power back-ends.</a:t>
+            </a:r>
+          </a:p>
+          <a:p>
+            <a:endParaRPr lang="en-US" dirty="0"/>
+          </a:p>
+        </p:txBody>
+      </p:sp>
+      <p:sp>
+        <p:nvSpPr>
+          <p:cNvPr id="6" name="TextBox 5"/>
+          <p:cNvSpPr txBox="1"/>
+          <p:nvPr/>
+        </p:nvSpPr>
+        <p:spPr>
+          <a:xfrm>
+            <a:off x="1042416" y="1627632"/>
+            <a:ext cx="2944368" cy="1384995"/>
+          </a:xfrm>
+          <a:prstGeom prst="rect">
+            <a:avLst/>
+          </a:prstGeom>
+          <a:noFill/>
+        </p:spPr>
+        <p:txBody>
+          <a:bodyPr wrap="square" rtlCol="0">
+            <a:spAutoFit/>
+          </a:bodyPr>
+          <a:lstStyle/>
+          <a:p>
+            <a:r>
+              <a:rPr lang="en-US" sz="2800" dirty="0" smtClean="0"/>
+              <a:t>- The </a:t>
+            </a:r>
+            <a:r>
+              <a:rPr lang="en-US" sz="2800" dirty="0"/>
+              <a:t>control port operates using an I²C </a:t>
+            </a:r>
+            <a:r>
+              <a:rPr lang="en-US" sz="2800" dirty="0" smtClean="0"/>
+              <a:t>interface.</a:t>
+            </a:r>
+            <a:endParaRPr lang="en-US" sz="2800" dirty="0"/>
+          </a:p>
+        </p:txBody>
+      </p:sp>
+      <p:sp>
+        <p:nvSpPr>
+          <p:cNvPr id="7" name="TextBox 6"/>
+          <p:cNvSpPr txBox="1"/>
+          <p:nvPr/>
+        </p:nvSpPr>
+        <p:spPr>
+          <a:xfrm>
+            <a:off x="8492534" y="1627632"/>
+            <a:ext cx="2944368" cy="1384995"/>
+          </a:xfrm>
+          <a:prstGeom prst="rect">
+            <a:avLst/>
+          </a:prstGeom>
+          <a:noFill/>
+        </p:spPr>
+        <p:txBody>
+          <a:bodyPr wrap="square" rtlCol="0">
+            <a:spAutoFit/>
+          </a:bodyPr>
+          <a:lstStyle/>
+          <a:p>
+            <a:r>
+              <a:rPr lang="en-US" sz="2800" dirty="0" smtClean="0"/>
+              <a:t>- The audio port </a:t>
+            </a:r>
+            <a:r>
+              <a:rPr lang="en-US" sz="2800" dirty="0"/>
+              <a:t>operates using an </a:t>
+            </a:r>
+            <a:r>
+              <a:rPr lang="en-US" sz="2800" dirty="0" smtClean="0"/>
+              <a:t>I²S interface.</a:t>
+            </a:r>
+            <a:endParaRPr lang="en-US" sz="2800" dirty="0"/>
           </a:p>
         </p:txBody>
       </p:sp>
     </p:spTree>
     <p:extLst>
       <p:ext uri="{BB962C8B-B14F-4D97-AF65-F5344CB8AC3E}">
-        <p14:creationId xmlns:p14="http://schemas.microsoft.com/office/powerpoint/2010/main" val="2454449544"/>
+        <p14:creationId xmlns:p14="http://schemas.microsoft.com/office/powerpoint/2010/main" val="1847720716"/>
       </p:ext>
     </p:extLst>
   </p:cSld>
   <p:clrMapOvr>
     <a:masterClrMapping/>
   </p:clrMapOvr>
-  <p:timing>
-    <p:tnLst>
-      <p:par>
-        <p:cTn id="1" dur="indefinite" restart="never" nodeType="tmRoot"/>
-      </p:par>
-    </p:tnLst>
-  </p:timing>
 </p:sld>
 </file>
 
@@ -4525,10 +4666,10 @@
           <a:p>
             <a:pPr algn="ctr"/>
             <a:r>
-              <a:rPr lang="en-US" b="1" u="sng" dirty="0" smtClean="0"/>
-              <a:t>PCB Designs</a:t>
-            </a:r>
-            <a:endParaRPr lang="en-US" b="1" u="sng" dirty="0"/>
+              <a:rPr lang="en-US" b="1" u="sng" dirty="0"/>
+              <a:t>Audio Bluetooth module (WT32I-A-AI6)</a:t>
+            </a:r>
+            <a:endParaRPr lang="en-US" dirty="0"/>
           </a:p>
         </p:txBody>
       </p:sp>
@@ -4542,76 +4683,25 @@
             <p:ph idx="1"/>
           </p:nvPr>
         </p:nvSpPr>
-        <p:spPr>
-          <a:xfrm>
-            <a:off x="1371600" y="1682496"/>
-            <a:ext cx="9601200" cy="585216"/>
-          </a:xfrm>
-        </p:spPr>
+        <p:spPr/>
         <p:txBody>
           <a:bodyPr/>
           <a:lstStyle/>
           <a:p>
-            <a:pPr marL="0" indent="0">
-              <a:buNone/>
-            </a:pPr>
-            <a:r>
-              <a:rPr lang="en-US" sz="2800" b="1" u="sng" dirty="0"/>
-              <a:t>- STM32F446RC (Version 1):-</a:t>
-            </a:r>
-          </a:p>
-          <a:p>
-            <a:endParaRPr lang="en-US" dirty="0"/>
-          </a:p>
-        </p:txBody>
-      </p:sp>
-      <p:pic>
-        <p:nvPicPr>
-          <p:cNvPr id="4" name="Picture 3"/>
-          <p:cNvPicPr>
-            <a:picLocks noChangeAspect="1"/>
-          </p:cNvPicPr>
-          <p:nvPr/>
-        </p:nvPicPr>
-        <p:blipFill>
-          <a:blip r:embed="rId2">
-            <a:extLst>
-              <a:ext uri="{28A0092B-C50C-407E-A947-70E740481C1C}">
-                <a14:useLocalDpi xmlns:a14="http://schemas.microsoft.com/office/drawing/2010/main" val="0"/>
-              </a:ext>
-            </a:extLst>
-          </a:blip>
-          <a:stretch>
-            <a:fillRect/>
-          </a:stretch>
-        </p:blipFill>
-        <p:spPr>
-          <a:xfrm>
-            <a:off x="1371600" y="2735008"/>
-            <a:ext cx="10058400" cy="3673148"/>
-          </a:xfrm>
-          <a:prstGeom prst="rect">
-            <a:avLst/>
-          </a:prstGeom>
-        </p:spPr>
-      </p:pic>
+            <a:endParaRPr lang="en-US"/>
+          </a:p>
+        </p:txBody>
+      </p:sp>
     </p:spTree>
     <p:extLst>
       <p:ext uri="{BB962C8B-B14F-4D97-AF65-F5344CB8AC3E}">
-        <p14:creationId xmlns:p14="http://schemas.microsoft.com/office/powerpoint/2010/main" val="4243707609"/>
+        <p14:creationId xmlns:p14="http://schemas.microsoft.com/office/powerpoint/2010/main" val="3316276132"/>
       </p:ext>
     </p:extLst>
   </p:cSld>
   <p:clrMapOvr>
     <a:masterClrMapping/>
   </p:clrMapOvr>
-  <p:timing>
-    <p:tnLst>
-      <p:par>
-        <p:cTn id="1" dur="indefinite" restart="never" nodeType="tmRoot"/>
-      </p:par>
-    </p:tnLst>
-  </p:timing>
 </p:sld>
 </file>
 
@@ -4650,7 +4740,7 @@
             <a:pPr algn="ctr"/>
             <a:r>
               <a:rPr lang="en-US" b="1" u="sng" dirty="0" smtClean="0"/>
-              <a:t>PCB Designs</a:t>
+              <a:t>Hardware Components</a:t>
             </a:r>
             <a:endParaRPr lang="en-US" b="1" u="sng" dirty="0"/>
           </a:p>
@@ -4666,63 +4756,19 @@
             <p:ph idx="1"/>
           </p:nvPr>
         </p:nvSpPr>
-        <p:spPr>
-          <a:xfrm>
-            <a:off x="1143000" y="1508760"/>
-            <a:ext cx="9601200" cy="585216"/>
-          </a:xfrm>
-        </p:spPr>
+        <p:spPr/>
         <p:txBody>
           <a:bodyPr/>
           <a:lstStyle/>
           <a:p>
-            <a:pPr marL="0" indent="0">
-              <a:buNone/>
-            </a:pPr>
-            <a:r>
-              <a:rPr lang="en-US" sz="2800" b="1" u="sng" dirty="0"/>
-              <a:t>- STM32F446RC (Version 2):-</a:t>
-            </a:r>
-          </a:p>
-          <a:p>
-            <a:endParaRPr lang="en-US" dirty="0"/>
-          </a:p>
-        </p:txBody>
-      </p:sp>
-      <p:pic>
-        <p:nvPicPr>
-          <p:cNvPr id="5" name="Picture 4"/>
-          <p:cNvPicPr>
-            <a:picLocks noChangeAspect="1"/>
-          </p:cNvPicPr>
-          <p:nvPr/>
-        </p:nvPicPr>
-        <p:blipFill>
-          <a:blip r:embed="rId2">
-            <a:extLst>
-              <a:ext uri="{28A0092B-C50C-407E-A947-70E740481C1C}">
-                <a14:useLocalDpi xmlns:a14="http://schemas.microsoft.com/office/drawing/2010/main" val="0"/>
-              </a:ext>
-            </a:extLst>
-          </a:blip>
-          <a:stretch>
-            <a:fillRect/>
-          </a:stretch>
-        </p:blipFill>
-        <p:spPr>
-          <a:xfrm>
-            <a:off x="1143000" y="2185416"/>
-            <a:ext cx="10058400" cy="4583930"/>
-          </a:xfrm>
-          <a:prstGeom prst="rect">
-            <a:avLst/>
-          </a:prstGeom>
-        </p:spPr>
-      </p:pic>
+            <a:endParaRPr lang="en-US"/>
+          </a:p>
+        </p:txBody>
+      </p:sp>
     </p:spTree>
     <p:extLst>
       <p:ext uri="{BB962C8B-B14F-4D97-AF65-F5344CB8AC3E}">
-        <p14:creationId xmlns:p14="http://schemas.microsoft.com/office/powerpoint/2010/main" val="2421610375"/>
+        <p14:creationId xmlns:p14="http://schemas.microsoft.com/office/powerpoint/2010/main" val="2454449544"/>
       </p:ext>
     </p:extLst>
   </p:cSld>
@@ -4792,7 +4838,7 @@
         </p:nvSpPr>
         <p:spPr>
           <a:xfrm>
-            <a:off x="1143000" y="1508760"/>
+            <a:off x="1371600" y="1682496"/>
             <a:ext cx="9601200" cy="585216"/>
           </a:xfrm>
         </p:spPr>
@@ -4805,13 +4851,10 @@
             </a:pPr>
             <a:r>
               <a:rPr lang="en-US" sz="2800" b="1" u="sng" dirty="0"/>
-              <a:t>- CS43L22-CNZ with Analog Pins:-</a:t>
-            </a:r>
-          </a:p>
-          <a:p>
-            <a:pPr marL="0" indent="0">
-              <a:buNone/>
-            </a:pPr>
+              <a:t>- STM32F446RC (Version 1):-</a:t>
+            </a:r>
+          </a:p>
+          <a:p>
             <a:endParaRPr lang="en-US" dirty="0"/>
           </a:p>
         </p:txBody>
@@ -4838,8 +4881,8 @@
         </p:blipFill>
         <p:spPr>
           <a:xfrm>
-            <a:off x="1862137" y="2093976"/>
-            <a:ext cx="8620125" cy="4705350"/>
+            <a:off x="1371600" y="2735008"/>
+            <a:ext cx="10058400" cy="3673148"/>
           </a:xfrm>
           <a:prstGeom prst="rect">
             <a:avLst/>
@@ -4849,7 +4892,7 @@
     </p:spTree>
     <p:extLst>
       <p:ext uri="{BB962C8B-B14F-4D97-AF65-F5344CB8AC3E}">
-        <p14:creationId xmlns:p14="http://schemas.microsoft.com/office/powerpoint/2010/main" val="3003191017"/>
+        <p14:creationId xmlns:p14="http://schemas.microsoft.com/office/powerpoint/2010/main" val="4243707609"/>
       </p:ext>
     </p:extLst>
   </p:cSld>
@@ -4932,21 +4975,10 @@
             </a:pPr>
             <a:r>
               <a:rPr lang="en-US" sz="2800" b="1" u="sng" dirty="0"/>
-              <a:t>- CS43L22-CNZ </a:t>
-            </a:r>
-            <a:r>
-              <a:rPr lang="en-US" sz="2800" b="1" u="sng" dirty="0" smtClean="0"/>
-              <a:t>without </a:t>
-            </a:r>
-            <a:r>
-              <a:rPr lang="en-US" sz="2800" b="1" u="sng" dirty="0"/>
-              <a:t>Analog Pins:-</a:t>
-            </a:r>
-          </a:p>
-          <a:p>
-            <a:pPr marL="0" indent="0">
-              <a:buNone/>
-            </a:pPr>
+              <a:t>- STM32F446RC (Version 2):-</a:t>
+            </a:r>
+          </a:p>
+          <a:p>
             <a:endParaRPr lang="en-US" dirty="0"/>
           </a:p>
         </p:txBody>
@@ -4973,8 +5005,8 @@
         </p:blipFill>
         <p:spPr>
           <a:xfrm>
-            <a:off x="2309812" y="2171700"/>
-            <a:ext cx="7267575" cy="4724400"/>
+            <a:off x="1143000" y="2185416"/>
+            <a:ext cx="10058400" cy="4583930"/>
           </a:xfrm>
           <a:prstGeom prst="rect">
             <a:avLst/>
@@ -4984,7 +5016,7 @@
     </p:spTree>
     <p:extLst>
       <p:ext uri="{BB962C8B-B14F-4D97-AF65-F5344CB8AC3E}">
-        <p14:creationId xmlns:p14="http://schemas.microsoft.com/office/powerpoint/2010/main" val="2161629779"/>
+        <p14:creationId xmlns:p14="http://schemas.microsoft.com/office/powerpoint/2010/main" val="2421610375"/>
       </p:ext>
     </p:extLst>
   </p:cSld>
@@ -5054,7 +5086,7 @@
         </p:nvSpPr>
         <p:spPr>
           <a:xfrm>
-            <a:off x="841248" y="3122176"/>
+            <a:off x="1143000" y="1508760"/>
             <a:ext cx="9601200" cy="585216"/>
           </a:xfrm>
         </p:spPr>
@@ -5067,7 +5099,7 @@
             </a:pPr>
             <a:r>
               <a:rPr lang="en-US" sz="2800" b="1" u="sng" dirty="0"/>
-              <a:t>- Audio Bluetooth Module (WT32I-A-AI6):-</a:t>
+              <a:t>- CS43L22-CNZ with Analog Pins:-</a:t>
             </a:r>
           </a:p>
           <a:p>
@@ -5080,7 +5112,7 @@
       </p:sp>
       <p:pic>
         <p:nvPicPr>
-          <p:cNvPr id="5" name="Picture 4"/>
+          <p:cNvPr id="4" name="Picture 3"/>
           <p:cNvPicPr>
             <a:picLocks noChangeAspect="1"/>
           </p:cNvPicPr>
@@ -5100,8 +5132,8 @@
         </p:blipFill>
         <p:spPr>
           <a:xfrm>
-            <a:off x="7861381" y="685800"/>
-            <a:ext cx="3985605" cy="6043184"/>
+            <a:off x="1862137" y="2093976"/>
+            <a:ext cx="8620125" cy="4705350"/>
           </a:xfrm>
           <a:prstGeom prst="rect">
             <a:avLst/>
@@ -5111,7 +5143,7 @@
     </p:spTree>
     <p:extLst>
       <p:ext uri="{BB962C8B-B14F-4D97-AF65-F5344CB8AC3E}">
-        <p14:creationId xmlns:p14="http://schemas.microsoft.com/office/powerpoint/2010/main" val="884722551"/>
+        <p14:creationId xmlns:p14="http://schemas.microsoft.com/office/powerpoint/2010/main" val="3003191017"/>
       </p:ext>
     </p:extLst>
   </p:cSld>
@@ -5194,7 +5226,15 @@
             </a:pPr>
             <a:r>
               <a:rPr lang="en-US" sz="2800" b="1" u="sng" dirty="0"/>
-              <a:t>- STM32F413CG (Version 1) with Audio Codec:-</a:t>
+              <a:t>- CS43L22-CNZ </a:t>
+            </a:r>
+            <a:r>
+              <a:rPr lang="en-US" sz="2800" b="1" u="sng" dirty="0" smtClean="0"/>
+              <a:t>without </a:t>
+            </a:r>
+            <a:r>
+              <a:rPr lang="en-US" sz="2800" b="1" u="sng" dirty="0"/>
+              <a:t>Analog Pins:-</a:t>
             </a:r>
           </a:p>
           <a:p>
@@ -5207,7 +5247,7 @@
       </p:sp>
       <p:pic>
         <p:nvPicPr>
-          <p:cNvPr id="4" name="Picture 3"/>
+          <p:cNvPr id="5" name="Picture 4"/>
           <p:cNvPicPr>
             <a:picLocks noChangeAspect="1"/>
           </p:cNvPicPr>
@@ -5227,8 +5267,8 @@
         </p:blipFill>
         <p:spPr>
           <a:xfrm>
-            <a:off x="1323975" y="2289619"/>
-            <a:ext cx="9696450" cy="4162425"/>
+            <a:off x="2309812" y="2171700"/>
+            <a:ext cx="7267575" cy="4724400"/>
           </a:xfrm>
           <a:prstGeom prst="rect">
             <a:avLst/>
@@ -5238,7 +5278,7 @@
     </p:spTree>
     <p:extLst>
       <p:ext uri="{BB962C8B-B14F-4D97-AF65-F5344CB8AC3E}">
-        <p14:creationId xmlns:p14="http://schemas.microsoft.com/office/powerpoint/2010/main" val="1688375218"/>
+        <p14:creationId xmlns:p14="http://schemas.microsoft.com/office/powerpoint/2010/main" val="2161629779"/>
       </p:ext>
     </p:extLst>
   </p:cSld>
@@ -5287,50 +5327,44 @@
           <a:bodyPr/>
           <a:lstStyle/>
           <a:p>
-            <a:pPr algn="ctr"/>
-            <a:r>
-              <a:rPr lang="en-US" b="1" u="sng" dirty="0" smtClean="0"/>
-              <a:t>Project Description</a:t>
-            </a:r>
-            <a:endParaRPr lang="en-US" b="1" u="sng" dirty="0"/>
-          </a:p>
-        </p:txBody>
-      </p:sp>
-      <p:pic>
-        <p:nvPicPr>
-          <p:cNvPr id="4" name="Content Placeholder 3"/>
-          <p:cNvPicPr>
-            <a:picLocks noGrp="1"/>
-          </p:cNvPicPr>
+            <a:r>
+              <a:rPr lang="en-US" dirty="0" smtClean="0"/>
+              <a:t>Why digital hearing aid?</a:t>
+            </a:r>
+            <a:endParaRPr lang="en-US" dirty="0"/>
+          </a:p>
+        </p:txBody>
+      </p:sp>
+      <p:sp>
+        <p:nvSpPr>
+          <p:cNvPr id="3" name="Content Placeholder 2"/>
+          <p:cNvSpPr>
+            <a:spLocks noGrp="1"/>
+          </p:cNvSpPr>
           <p:nvPr>
             <p:ph idx="1"/>
           </p:nvPr>
-        </p:nvPicPr>
-        <p:blipFill rotWithShape="1">
-          <a:blip r:embed="rId2">
-            <a:extLst>
-              <a:ext uri="{28A0092B-C50C-407E-A947-70E740481C1C}">
-                <a14:useLocalDpi xmlns:a14="http://schemas.microsoft.com/office/drawing/2010/main" val="0"/>
-              </a:ext>
-            </a:extLst>
-          </a:blip>
-          <a:srcRect t="8767"/>
-          <a:stretch/>
-        </p:blipFill>
-        <p:spPr>
-          <a:xfrm>
-            <a:off x="2443162" y="2171700"/>
-            <a:ext cx="7458075" cy="2424493"/>
-          </a:xfrm>
-          <a:prstGeom prst="rect">
-            <a:avLst/>
-          </a:prstGeom>
-        </p:spPr>
-      </p:pic>
+        </p:nvSpPr>
+        <p:spPr/>
+        <p:txBody>
+          <a:bodyPr/>
+          <a:lstStyle/>
+          <a:p>
+            <a:pPr marL="0" indent="0">
+              <a:buNone/>
+            </a:pPr>
+            <a:r>
+              <a:rPr lang="en-US" dirty="0" smtClean="0"/>
+              <a:t>- Analog vs digital</a:t>
+            </a:r>
+            <a:endParaRPr lang="en-US" dirty="0"/>
+          </a:p>
+        </p:txBody>
+      </p:sp>
     </p:spTree>
     <p:extLst>
       <p:ext uri="{BB962C8B-B14F-4D97-AF65-F5344CB8AC3E}">
-        <p14:creationId xmlns:p14="http://schemas.microsoft.com/office/powerpoint/2010/main" val="3873815317"/>
+        <p14:creationId xmlns:p14="http://schemas.microsoft.com/office/powerpoint/2010/main" val="1526805235"/>
       </p:ext>
     </p:extLst>
   </p:cSld>
@@ -5341,6 +5375,260 @@
 </file>
 
 <file path=ppt/slides/slide20.xml><?xml version="1.0" encoding="utf-8"?>
+<p:sld xmlns:a="http://schemas.openxmlformats.org/drawingml/2006/main" xmlns:r="http://schemas.openxmlformats.org/officeDocument/2006/relationships" xmlns:p="http://schemas.openxmlformats.org/presentationml/2006/main">
+  <p:cSld>
+    <p:spTree>
+      <p:nvGrpSpPr>
+        <p:cNvPr id="1" name=""/>
+        <p:cNvGrpSpPr/>
+        <p:nvPr/>
+      </p:nvGrpSpPr>
+      <p:grpSpPr>
+        <a:xfrm>
+          <a:off x="0" y="0"/>
+          <a:ext cx="0" cy="0"/>
+          <a:chOff x="0" y="0"/>
+          <a:chExt cx="0" cy="0"/>
+        </a:xfrm>
+      </p:grpSpPr>
+      <p:sp>
+        <p:nvSpPr>
+          <p:cNvPr id="2" name="Title 1"/>
+          <p:cNvSpPr>
+            <a:spLocks noGrp="1"/>
+          </p:cNvSpPr>
+          <p:nvPr>
+            <p:ph type="title"/>
+          </p:nvPr>
+        </p:nvSpPr>
+        <p:spPr/>
+        <p:txBody>
+          <a:bodyPr/>
+          <a:lstStyle/>
+          <a:p>
+            <a:pPr algn="ctr"/>
+            <a:r>
+              <a:rPr lang="en-US" b="1" u="sng" dirty="0" smtClean="0"/>
+              <a:t>PCB Designs</a:t>
+            </a:r>
+            <a:endParaRPr lang="en-US" b="1" u="sng" dirty="0"/>
+          </a:p>
+        </p:txBody>
+      </p:sp>
+      <p:sp>
+        <p:nvSpPr>
+          <p:cNvPr id="3" name="Content Placeholder 2"/>
+          <p:cNvSpPr>
+            <a:spLocks noGrp="1"/>
+          </p:cNvSpPr>
+          <p:nvPr>
+            <p:ph idx="1"/>
+          </p:nvPr>
+        </p:nvSpPr>
+        <p:spPr>
+          <a:xfrm>
+            <a:off x="841248" y="3122176"/>
+            <a:ext cx="9601200" cy="585216"/>
+          </a:xfrm>
+        </p:spPr>
+        <p:txBody>
+          <a:bodyPr/>
+          <a:lstStyle/>
+          <a:p>
+            <a:pPr marL="0" indent="0">
+              <a:buNone/>
+            </a:pPr>
+            <a:r>
+              <a:rPr lang="en-US" sz="2800" b="1" u="sng" dirty="0"/>
+              <a:t>- Audio Bluetooth Module (WT32I-A-AI6):-</a:t>
+            </a:r>
+          </a:p>
+          <a:p>
+            <a:pPr marL="0" indent="0">
+              <a:buNone/>
+            </a:pPr>
+            <a:endParaRPr lang="en-US" dirty="0"/>
+          </a:p>
+        </p:txBody>
+      </p:sp>
+      <p:pic>
+        <p:nvPicPr>
+          <p:cNvPr id="5" name="Picture 4"/>
+          <p:cNvPicPr>
+            <a:picLocks noChangeAspect="1"/>
+          </p:cNvPicPr>
+          <p:nvPr/>
+        </p:nvPicPr>
+        <p:blipFill>
+          <a:blip r:embed="rId2">
+            <a:extLst>
+              <a:ext uri="{28A0092B-C50C-407E-A947-70E740481C1C}">
+                <a14:useLocalDpi xmlns:a14="http://schemas.microsoft.com/office/drawing/2010/main" val="0"/>
+              </a:ext>
+            </a:extLst>
+          </a:blip>
+          <a:stretch>
+            <a:fillRect/>
+          </a:stretch>
+        </p:blipFill>
+        <p:spPr>
+          <a:xfrm>
+            <a:off x="7861381" y="685800"/>
+            <a:ext cx="3985605" cy="6043184"/>
+          </a:xfrm>
+          <a:prstGeom prst="rect">
+            <a:avLst/>
+          </a:prstGeom>
+        </p:spPr>
+      </p:pic>
+    </p:spTree>
+    <p:extLst>
+      <p:ext uri="{BB962C8B-B14F-4D97-AF65-F5344CB8AC3E}">
+        <p14:creationId xmlns:p14="http://schemas.microsoft.com/office/powerpoint/2010/main" val="884722551"/>
+      </p:ext>
+    </p:extLst>
+  </p:cSld>
+  <p:clrMapOvr>
+    <a:masterClrMapping/>
+  </p:clrMapOvr>
+  <p:timing>
+    <p:tnLst>
+      <p:par>
+        <p:cTn id="1" dur="indefinite" restart="never" nodeType="tmRoot"/>
+      </p:par>
+    </p:tnLst>
+  </p:timing>
+</p:sld>
+</file>
+
+<file path=ppt/slides/slide21.xml><?xml version="1.0" encoding="utf-8"?>
+<p:sld xmlns:a="http://schemas.openxmlformats.org/drawingml/2006/main" xmlns:r="http://schemas.openxmlformats.org/officeDocument/2006/relationships" xmlns:p="http://schemas.openxmlformats.org/presentationml/2006/main">
+  <p:cSld>
+    <p:spTree>
+      <p:nvGrpSpPr>
+        <p:cNvPr id="1" name=""/>
+        <p:cNvGrpSpPr/>
+        <p:nvPr/>
+      </p:nvGrpSpPr>
+      <p:grpSpPr>
+        <a:xfrm>
+          <a:off x="0" y="0"/>
+          <a:ext cx="0" cy="0"/>
+          <a:chOff x="0" y="0"/>
+          <a:chExt cx="0" cy="0"/>
+        </a:xfrm>
+      </p:grpSpPr>
+      <p:sp>
+        <p:nvSpPr>
+          <p:cNvPr id="2" name="Title 1"/>
+          <p:cNvSpPr>
+            <a:spLocks noGrp="1"/>
+          </p:cNvSpPr>
+          <p:nvPr>
+            <p:ph type="title"/>
+          </p:nvPr>
+        </p:nvSpPr>
+        <p:spPr/>
+        <p:txBody>
+          <a:bodyPr/>
+          <a:lstStyle/>
+          <a:p>
+            <a:pPr algn="ctr"/>
+            <a:r>
+              <a:rPr lang="en-US" b="1" u="sng" dirty="0" smtClean="0"/>
+              <a:t>PCB Designs</a:t>
+            </a:r>
+            <a:endParaRPr lang="en-US" b="1" u="sng" dirty="0"/>
+          </a:p>
+        </p:txBody>
+      </p:sp>
+      <p:sp>
+        <p:nvSpPr>
+          <p:cNvPr id="3" name="Content Placeholder 2"/>
+          <p:cNvSpPr>
+            <a:spLocks noGrp="1"/>
+          </p:cNvSpPr>
+          <p:nvPr>
+            <p:ph idx="1"/>
+          </p:nvPr>
+        </p:nvSpPr>
+        <p:spPr>
+          <a:xfrm>
+            <a:off x="1143000" y="1508760"/>
+            <a:ext cx="9601200" cy="585216"/>
+          </a:xfrm>
+        </p:spPr>
+        <p:txBody>
+          <a:bodyPr/>
+          <a:lstStyle/>
+          <a:p>
+            <a:pPr marL="0" indent="0">
+              <a:buNone/>
+            </a:pPr>
+            <a:r>
+              <a:rPr lang="en-US" sz="2800" b="1" u="sng" dirty="0"/>
+              <a:t>- STM32F413CG (Version 1) with Audio Codec:-</a:t>
+            </a:r>
+          </a:p>
+          <a:p>
+            <a:pPr marL="0" indent="0">
+              <a:buNone/>
+            </a:pPr>
+            <a:endParaRPr lang="en-US" dirty="0"/>
+          </a:p>
+        </p:txBody>
+      </p:sp>
+      <p:pic>
+        <p:nvPicPr>
+          <p:cNvPr id="4" name="Picture 3"/>
+          <p:cNvPicPr>
+            <a:picLocks noChangeAspect="1"/>
+          </p:cNvPicPr>
+          <p:nvPr/>
+        </p:nvPicPr>
+        <p:blipFill>
+          <a:blip r:embed="rId2">
+            <a:extLst>
+              <a:ext uri="{28A0092B-C50C-407E-A947-70E740481C1C}">
+                <a14:useLocalDpi xmlns:a14="http://schemas.microsoft.com/office/drawing/2010/main" val="0"/>
+              </a:ext>
+            </a:extLst>
+          </a:blip>
+          <a:stretch>
+            <a:fillRect/>
+          </a:stretch>
+        </p:blipFill>
+        <p:spPr>
+          <a:xfrm>
+            <a:off x="1323975" y="2289619"/>
+            <a:ext cx="9696450" cy="4162425"/>
+          </a:xfrm>
+          <a:prstGeom prst="rect">
+            <a:avLst/>
+          </a:prstGeom>
+        </p:spPr>
+      </p:pic>
+    </p:spTree>
+    <p:extLst>
+      <p:ext uri="{BB962C8B-B14F-4D97-AF65-F5344CB8AC3E}">
+        <p14:creationId xmlns:p14="http://schemas.microsoft.com/office/powerpoint/2010/main" val="1688375218"/>
+      </p:ext>
+    </p:extLst>
+  </p:cSld>
+  <p:clrMapOvr>
+    <a:masterClrMapping/>
+  </p:clrMapOvr>
+  <p:timing>
+    <p:tnLst>
+      <p:par>
+        <p:cTn id="1" dur="indefinite" restart="never" nodeType="tmRoot"/>
+      </p:par>
+    </p:tnLst>
+  </p:timing>
+</p:sld>
+</file>
+
+<file path=ppt/slides/slide22.xml><?xml version="1.0" encoding="utf-8"?>
 <p:sld xmlns:a="http://schemas.openxmlformats.org/drawingml/2006/main" xmlns:r="http://schemas.openxmlformats.org/officeDocument/2006/relationships" xmlns:p="http://schemas.openxmlformats.org/presentationml/2006/main">
   <p:cSld>
     <p:spTree>
@@ -5458,12 +5746,11 @@
           <a:bodyPr/>
           <a:lstStyle/>
           <a:p>
-            <a:pPr algn="ctr"/>
-            <a:r>
-              <a:rPr lang="en-US" b="1" u="sng" dirty="0" smtClean="0"/>
-              <a:t>Early Prototype</a:t>
-            </a:r>
-            <a:endParaRPr lang="en-US" b="1" u="sng" dirty="0"/>
+            <a:r>
+              <a:rPr lang="en-US" dirty="0" smtClean="0"/>
+              <a:t>Product Idea</a:t>
+            </a:r>
+            <a:endParaRPr lang="en-US" dirty="0"/>
           </a:p>
         </p:txBody>
       </p:sp>
@@ -5482,14 +5769,32 @@
           <a:bodyPr/>
           <a:lstStyle/>
           <a:p>
-            <a:endParaRPr lang="en-US"/>
+            <a:pPr>
+              <a:buFontTx/>
+              <a:buChar char="-"/>
+            </a:pPr>
+            <a:r>
+              <a:rPr lang="en-US" dirty="0" smtClean="0"/>
+              <a:t>Appearance</a:t>
+            </a:r>
+          </a:p>
+          <a:p>
+            <a:pPr>
+              <a:buFontTx/>
+              <a:buChar char="-"/>
+            </a:pPr>
+            <a:r>
+              <a:rPr lang="en-US" dirty="0" smtClean="0"/>
+              <a:t>Cost</a:t>
+            </a:r>
+            <a:endParaRPr lang="en-US" dirty="0"/>
           </a:p>
         </p:txBody>
       </p:sp>
     </p:spTree>
     <p:extLst>
       <p:ext uri="{BB962C8B-B14F-4D97-AF65-F5344CB8AC3E}">
-        <p14:creationId xmlns:p14="http://schemas.microsoft.com/office/powerpoint/2010/main" val="3908622420"/>
+        <p14:creationId xmlns:p14="http://schemas.microsoft.com/office/powerpoint/2010/main" val="3850256044"/>
       </p:ext>
     </p:extLst>
   </p:cSld>
@@ -5534,7 +5839,7 @@
             <a:pPr algn="ctr"/>
             <a:r>
               <a:rPr lang="en-US" b="1" u="sng" dirty="0" smtClean="0"/>
-              <a:t>Block Diagram</a:t>
+              <a:t>Project Description</a:t>
             </a:r>
             <a:endParaRPr lang="en-US" b="1" u="sng" dirty="0"/>
           </a:p>
@@ -5551,14 +5856,20 @@
           </p:nvPr>
         </p:nvPicPr>
         <p:blipFill rotWithShape="1">
-          <a:blip r:embed="rId2"/>
-          <a:srcRect t="4851"/>
+          <a:blip r:embed="rId2">
+            <a:extLst>
+              <a:ext uri="{28A0092B-C50C-407E-A947-70E740481C1C}">
+                <a14:useLocalDpi xmlns:a14="http://schemas.microsoft.com/office/drawing/2010/main" val="0"/>
+              </a:ext>
+            </a:extLst>
+          </a:blip>
+          <a:srcRect t="8767"/>
           <a:stretch/>
         </p:blipFill>
         <p:spPr>
           <a:xfrm>
-            <a:off x="3198652" y="2171700"/>
-            <a:ext cx="5947095" cy="3407664"/>
+            <a:off x="2443162" y="2171700"/>
+            <a:ext cx="7458075" cy="2424493"/>
           </a:xfrm>
           <a:prstGeom prst="rect">
             <a:avLst/>
@@ -5568,20 +5879,13 @@
     </p:spTree>
     <p:extLst>
       <p:ext uri="{BB962C8B-B14F-4D97-AF65-F5344CB8AC3E}">
-        <p14:creationId xmlns:p14="http://schemas.microsoft.com/office/powerpoint/2010/main" val="4241332501"/>
+        <p14:creationId xmlns:p14="http://schemas.microsoft.com/office/powerpoint/2010/main" val="3873815317"/>
       </p:ext>
     </p:extLst>
   </p:cSld>
   <p:clrMapOvr>
     <a:masterClrMapping/>
   </p:clrMapOvr>
-  <p:timing>
-    <p:tnLst>
-      <p:par>
-        <p:cTn id="1" dur="indefinite" restart="never" nodeType="tmRoot"/>
-      </p:par>
-    </p:tnLst>
-  </p:timing>
 </p:sld>
 </file>
 
@@ -5604,1406 +5908,57 @@
       </p:grpSpPr>
       <p:sp>
         <p:nvSpPr>
-          <p:cNvPr id="12" name="Rounded Rectangle 11"/>
-          <p:cNvSpPr/>
-          <p:nvPr/>
-        </p:nvSpPr>
-        <p:spPr>
-          <a:xfrm>
-            <a:off x="3008376" y="1458468"/>
-            <a:ext cx="4718304" cy="5312664"/>
-          </a:xfrm>
-          <a:prstGeom prst="roundRect">
-            <a:avLst/>
-          </a:prstGeom>
-        </p:spPr>
-        <p:style>
-          <a:lnRef idx="2">
-            <a:schemeClr val="accent1">
-              <a:shade val="50000"/>
-            </a:schemeClr>
-          </a:lnRef>
-          <a:fillRef idx="1">
-            <a:schemeClr val="accent1"/>
-          </a:fillRef>
-          <a:effectRef idx="0">
-            <a:schemeClr val="accent1"/>
-          </a:effectRef>
-          <a:fontRef idx="minor">
-            <a:schemeClr val="lt1"/>
-          </a:fontRef>
-        </p:style>
-        <p:txBody>
-          <a:bodyPr rtlCol="0" anchor="ctr"/>
+          <p:cNvPr id="2" name="Title 1"/>
+          <p:cNvSpPr>
+            <a:spLocks noGrp="1"/>
+          </p:cNvSpPr>
+          <p:nvPr>
+            <p:ph type="title"/>
+          </p:nvPr>
+        </p:nvSpPr>
+        <p:spPr/>
+        <p:txBody>
+          <a:bodyPr/>
           <a:lstStyle/>
           <a:p>
             <a:pPr algn="ctr"/>
+            <a:r>
+              <a:rPr lang="en-US" b="1" u="sng" dirty="0" smtClean="0"/>
+              <a:t>Early Prototype</a:t>
+            </a:r>
+            <a:endParaRPr lang="en-US" b="1" u="sng" dirty="0"/>
+          </a:p>
+        </p:txBody>
+      </p:sp>
+      <p:sp>
+        <p:nvSpPr>
+          <p:cNvPr id="3" name="Content Placeholder 2"/>
+          <p:cNvSpPr>
+            <a:spLocks noGrp="1"/>
+          </p:cNvSpPr>
+          <p:nvPr>
+            <p:ph idx="1"/>
+          </p:nvPr>
+        </p:nvSpPr>
+        <p:spPr/>
+        <p:txBody>
+          <a:bodyPr/>
+          <a:lstStyle/>
+          <a:p>
             <a:endParaRPr lang="en-US"/>
-          </a:p>
-        </p:txBody>
-      </p:sp>
-      <p:sp>
-        <p:nvSpPr>
-          <p:cNvPr id="2" name="Title 1"/>
-          <p:cNvSpPr>
-            <a:spLocks noGrp="1"/>
-          </p:cNvSpPr>
-          <p:nvPr>
-            <p:ph type="title"/>
-          </p:nvPr>
-        </p:nvSpPr>
-        <p:spPr>
-          <a:xfrm>
-            <a:off x="1371600" y="685800"/>
-            <a:ext cx="9601200" cy="816102"/>
-          </a:xfrm>
-        </p:spPr>
-        <p:txBody>
-          <a:bodyPr/>
-          <a:lstStyle/>
-          <a:p>
-            <a:pPr algn="ctr"/>
-            <a:r>
-              <a:rPr lang="en-US" b="1" u="sng" dirty="0" smtClean="0"/>
-              <a:t>Block Diagram</a:t>
-            </a:r>
-            <a:endParaRPr lang="en-US" b="1" u="sng" dirty="0"/>
-          </a:p>
-        </p:txBody>
-      </p:sp>
-      <p:sp>
-        <p:nvSpPr>
-          <p:cNvPr id="5" name="Rounded Rectangle 4"/>
-          <p:cNvSpPr/>
-          <p:nvPr/>
-        </p:nvSpPr>
-        <p:spPr>
-          <a:xfrm>
-            <a:off x="749046" y="2293429"/>
-            <a:ext cx="1577340" cy="753237"/>
-          </a:xfrm>
-          <a:prstGeom prst="roundRect">
-            <a:avLst/>
-          </a:prstGeom>
-        </p:spPr>
-        <p:style>
-          <a:lnRef idx="0">
-            <a:schemeClr val="accent2"/>
-          </a:lnRef>
-          <a:fillRef idx="3">
-            <a:schemeClr val="accent2"/>
-          </a:fillRef>
-          <a:effectRef idx="3">
-            <a:schemeClr val="accent2"/>
-          </a:effectRef>
-          <a:fontRef idx="minor">
-            <a:schemeClr val="lt1"/>
-          </a:fontRef>
-        </p:style>
-        <p:txBody>
-          <a:bodyPr rtlCol="0" anchor="ctr"/>
-          <a:lstStyle/>
-          <a:p>
-            <a:pPr algn="ctr"/>
-            <a:r>
-              <a:rPr lang="en-US" dirty="0" smtClean="0"/>
-              <a:t>MEMS Microphone</a:t>
-            </a:r>
-            <a:endParaRPr lang="en-US" dirty="0"/>
-          </a:p>
-        </p:txBody>
-      </p:sp>
-      <p:sp>
-        <p:nvSpPr>
-          <p:cNvPr id="6" name="Rounded Rectangle 5"/>
-          <p:cNvSpPr/>
-          <p:nvPr/>
-        </p:nvSpPr>
-        <p:spPr>
-          <a:xfrm>
-            <a:off x="3185160" y="2367152"/>
-            <a:ext cx="1892808" cy="605790"/>
-          </a:xfrm>
-          <a:prstGeom prst="roundRect">
-            <a:avLst/>
-          </a:prstGeom>
-        </p:spPr>
-        <p:style>
-          <a:lnRef idx="0">
-            <a:schemeClr val="accent5"/>
-          </a:lnRef>
-          <a:fillRef idx="3">
-            <a:schemeClr val="accent5"/>
-          </a:fillRef>
-          <a:effectRef idx="3">
-            <a:schemeClr val="accent5"/>
-          </a:effectRef>
-          <a:fontRef idx="minor">
-            <a:schemeClr val="lt1"/>
-          </a:fontRef>
-        </p:style>
-        <p:txBody>
-          <a:bodyPr rtlCol="0" anchor="ctr"/>
-          <a:lstStyle/>
-          <a:p>
-            <a:pPr algn="ctr"/>
-            <a:r>
-              <a:rPr lang="en-US" dirty="0" smtClean="0"/>
-              <a:t>I2S Peripheral</a:t>
-            </a:r>
-            <a:endParaRPr lang="en-US" dirty="0"/>
-          </a:p>
-        </p:txBody>
-      </p:sp>
-      <p:sp>
-        <p:nvSpPr>
-          <p:cNvPr id="7" name="Rounded Rectangle 6"/>
-          <p:cNvSpPr/>
-          <p:nvPr/>
-        </p:nvSpPr>
-        <p:spPr>
-          <a:xfrm>
-            <a:off x="6310884" y="2366580"/>
-            <a:ext cx="807720" cy="585216"/>
-          </a:xfrm>
-          <a:prstGeom prst="roundRect">
-            <a:avLst/>
-          </a:prstGeom>
-        </p:spPr>
-        <p:style>
-          <a:lnRef idx="0">
-            <a:schemeClr val="accent5"/>
-          </a:lnRef>
-          <a:fillRef idx="3">
-            <a:schemeClr val="accent5"/>
-          </a:fillRef>
-          <a:effectRef idx="3">
-            <a:schemeClr val="accent5"/>
-          </a:effectRef>
-          <a:fontRef idx="minor">
-            <a:schemeClr val="lt1"/>
-          </a:fontRef>
-        </p:style>
-        <p:txBody>
-          <a:bodyPr rtlCol="0" anchor="ctr"/>
-          <a:lstStyle/>
-          <a:p>
-            <a:pPr algn="ctr"/>
-            <a:r>
-              <a:rPr lang="en-US" dirty="0" smtClean="0"/>
-              <a:t>DMA</a:t>
-            </a:r>
-            <a:endParaRPr lang="en-US" dirty="0"/>
-          </a:p>
-        </p:txBody>
-      </p:sp>
-      <p:sp>
-        <p:nvSpPr>
-          <p:cNvPr id="8" name="Rounded Rectangle 7"/>
-          <p:cNvSpPr/>
-          <p:nvPr/>
-        </p:nvSpPr>
-        <p:spPr>
-          <a:xfrm>
-            <a:off x="6310884" y="3502152"/>
-            <a:ext cx="807720" cy="612648"/>
-          </a:xfrm>
-          <a:prstGeom prst="roundRect">
-            <a:avLst/>
-          </a:prstGeom>
-        </p:spPr>
-        <p:style>
-          <a:lnRef idx="0">
-            <a:schemeClr val="accent5"/>
-          </a:lnRef>
-          <a:fillRef idx="3">
-            <a:schemeClr val="accent5"/>
-          </a:fillRef>
-          <a:effectRef idx="3">
-            <a:schemeClr val="accent5"/>
-          </a:effectRef>
-          <a:fontRef idx="minor">
-            <a:schemeClr val="lt1"/>
-          </a:fontRef>
-        </p:style>
-        <p:txBody>
-          <a:bodyPr rtlCol="0" anchor="ctr"/>
-          <a:lstStyle/>
-          <a:p>
-            <a:pPr algn="ctr"/>
-            <a:r>
-              <a:rPr lang="en-US" dirty="0" smtClean="0"/>
-              <a:t>RAM</a:t>
-            </a:r>
-            <a:endParaRPr lang="en-US" dirty="0"/>
-          </a:p>
-        </p:txBody>
-      </p:sp>
-      <p:sp>
-        <p:nvSpPr>
-          <p:cNvPr id="9" name="Rounded Rectangle 8"/>
-          <p:cNvSpPr/>
-          <p:nvPr/>
-        </p:nvSpPr>
-        <p:spPr>
-          <a:xfrm>
-            <a:off x="3710940" y="3502152"/>
-            <a:ext cx="751332" cy="612648"/>
-          </a:xfrm>
-          <a:prstGeom prst="roundRect">
-            <a:avLst/>
-          </a:prstGeom>
-        </p:spPr>
-        <p:style>
-          <a:lnRef idx="0">
-            <a:schemeClr val="accent5"/>
-          </a:lnRef>
-          <a:fillRef idx="3">
-            <a:schemeClr val="accent5"/>
-          </a:fillRef>
-          <a:effectRef idx="3">
-            <a:schemeClr val="accent5"/>
-          </a:effectRef>
-          <a:fontRef idx="minor">
-            <a:schemeClr val="lt1"/>
-          </a:fontRef>
-        </p:style>
-        <p:txBody>
-          <a:bodyPr rtlCol="0" anchor="ctr"/>
-          <a:lstStyle/>
-          <a:p>
-            <a:pPr algn="ctr"/>
-            <a:r>
-              <a:rPr lang="en-US" dirty="0" smtClean="0"/>
-              <a:t>CPU</a:t>
-            </a:r>
-            <a:endParaRPr lang="en-US" dirty="0"/>
-          </a:p>
-        </p:txBody>
-      </p:sp>
-      <p:sp>
-        <p:nvSpPr>
-          <p:cNvPr id="10" name="Rounded Rectangle 9"/>
-          <p:cNvSpPr/>
-          <p:nvPr/>
-        </p:nvSpPr>
-        <p:spPr>
-          <a:xfrm>
-            <a:off x="3206115" y="5637276"/>
-            <a:ext cx="751332" cy="557784"/>
-          </a:xfrm>
-          <a:prstGeom prst="roundRect">
-            <a:avLst/>
-          </a:prstGeom>
-        </p:spPr>
-        <p:style>
-          <a:lnRef idx="0">
-            <a:schemeClr val="accent5"/>
-          </a:lnRef>
-          <a:fillRef idx="3">
-            <a:schemeClr val="accent5"/>
-          </a:fillRef>
-          <a:effectRef idx="3">
-            <a:schemeClr val="accent5"/>
-          </a:effectRef>
-          <a:fontRef idx="minor">
-            <a:schemeClr val="lt1"/>
-          </a:fontRef>
-        </p:style>
-        <p:txBody>
-          <a:bodyPr rtlCol="0" anchor="ctr"/>
-          <a:lstStyle/>
-          <a:p>
-            <a:pPr algn="ctr"/>
-            <a:r>
-              <a:rPr lang="en-US" dirty="0" smtClean="0"/>
-              <a:t>DMA</a:t>
-            </a:r>
-            <a:endParaRPr lang="en-US" dirty="0"/>
-          </a:p>
-        </p:txBody>
-      </p:sp>
-      <p:sp>
-        <p:nvSpPr>
-          <p:cNvPr id="11" name="Rounded Rectangle 10"/>
-          <p:cNvSpPr/>
-          <p:nvPr/>
-        </p:nvSpPr>
-        <p:spPr>
-          <a:xfrm>
-            <a:off x="5364480" y="5642991"/>
-            <a:ext cx="1892808" cy="552069"/>
-          </a:xfrm>
-          <a:prstGeom prst="roundRect">
-            <a:avLst/>
-          </a:prstGeom>
-        </p:spPr>
-        <p:style>
-          <a:lnRef idx="0">
-            <a:schemeClr val="accent5"/>
-          </a:lnRef>
-          <a:fillRef idx="3">
-            <a:schemeClr val="accent5"/>
-          </a:fillRef>
-          <a:effectRef idx="3">
-            <a:schemeClr val="accent5"/>
-          </a:effectRef>
-          <a:fontRef idx="minor">
-            <a:schemeClr val="lt1"/>
-          </a:fontRef>
-        </p:style>
-        <p:txBody>
-          <a:bodyPr rtlCol="0" anchor="ctr"/>
-          <a:lstStyle/>
-          <a:p>
-            <a:pPr algn="ctr"/>
-            <a:r>
-              <a:rPr lang="en-US" dirty="0"/>
-              <a:t>I2S </a:t>
-            </a:r>
-            <a:r>
-              <a:rPr lang="en-US" dirty="0" smtClean="0"/>
-              <a:t>Peripheral</a:t>
-            </a:r>
-            <a:endParaRPr lang="en-US" dirty="0"/>
-          </a:p>
-        </p:txBody>
-      </p:sp>
-      <p:sp>
-        <p:nvSpPr>
-          <p:cNvPr id="18" name="Rounded Rectangle 17"/>
-          <p:cNvSpPr/>
-          <p:nvPr/>
-        </p:nvSpPr>
-        <p:spPr>
-          <a:xfrm>
-            <a:off x="8199120" y="1412177"/>
-            <a:ext cx="2670048" cy="2542032"/>
-          </a:xfrm>
-          <a:prstGeom prst="roundRect">
-            <a:avLst/>
-          </a:prstGeom>
-        </p:spPr>
-        <p:style>
-          <a:lnRef idx="2">
-            <a:schemeClr val="accent1">
-              <a:shade val="50000"/>
-            </a:schemeClr>
-          </a:lnRef>
-          <a:fillRef idx="1">
-            <a:schemeClr val="accent1"/>
-          </a:fillRef>
-          <a:effectRef idx="0">
-            <a:schemeClr val="accent1"/>
-          </a:effectRef>
-          <a:fontRef idx="minor">
-            <a:schemeClr val="lt1"/>
-          </a:fontRef>
-        </p:style>
-        <p:txBody>
-          <a:bodyPr rtlCol="0" anchor="ctr"/>
-          <a:lstStyle/>
-          <a:p>
-            <a:pPr algn="ctr"/>
-            <a:endParaRPr lang="en-US"/>
-          </a:p>
-        </p:txBody>
-      </p:sp>
-      <p:sp>
-        <p:nvSpPr>
-          <p:cNvPr id="19" name="Rounded Rectangle 18"/>
-          <p:cNvSpPr/>
-          <p:nvPr/>
-        </p:nvSpPr>
-        <p:spPr>
-          <a:xfrm>
-            <a:off x="8199120" y="4245102"/>
-            <a:ext cx="2682240" cy="2526030"/>
-          </a:xfrm>
-          <a:prstGeom prst="roundRect">
-            <a:avLst/>
-          </a:prstGeom>
-        </p:spPr>
-        <p:style>
-          <a:lnRef idx="2">
-            <a:schemeClr val="accent1">
-              <a:shade val="50000"/>
-            </a:schemeClr>
-          </a:lnRef>
-          <a:fillRef idx="1">
-            <a:schemeClr val="accent1"/>
-          </a:fillRef>
-          <a:effectRef idx="0">
-            <a:schemeClr val="accent1"/>
-          </a:effectRef>
-          <a:fontRef idx="minor">
-            <a:schemeClr val="lt1"/>
-          </a:fontRef>
-        </p:style>
-        <p:txBody>
-          <a:bodyPr rtlCol="0" anchor="ctr"/>
-          <a:lstStyle/>
-          <a:p>
-            <a:pPr algn="ctr"/>
-            <a:endParaRPr lang="en-US"/>
-          </a:p>
-        </p:txBody>
-      </p:sp>
-      <p:sp>
-        <p:nvSpPr>
-          <p:cNvPr id="20" name="Rounded Rectangle 19"/>
-          <p:cNvSpPr/>
-          <p:nvPr/>
-        </p:nvSpPr>
-        <p:spPr>
-          <a:xfrm>
-            <a:off x="8587740" y="2215991"/>
-            <a:ext cx="1892808" cy="637794"/>
-          </a:xfrm>
-          <a:prstGeom prst="roundRect">
-            <a:avLst/>
-          </a:prstGeom>
-        </p:spPr>
-        <p:style>
-          <a:lnRef idx="0">
-            <a:schemeClr val="accent5"/>
-          </a:lnRef>
-          <a:fillRef idx="3">
-            <a:schemeClr val="accent5"/>
-          </a:fillRef>
-          <a:effectRef idx="3">
-            <a:schemeClr val="accent5"/>
-          </a:effectRef>
-          <a:fontRef idx="minor">
-            <a:schemeClr val="lt1"/>
-          </a:fontRef>
-        </p:style>
-        <p:txBody>
-          <a:bodyPr rtlCol="0" anchor="ctr"/>
-          <a:lstStyle/>
-          <a:p>
-            <a:pPr algn="ctr"/>
-            <a:r>
-              <a:rPr lang="en-US" dirty="0" smtClean="0"/>
-              <a:t>I2S Peripheral</a:t>
-            </a:r>
-            <a:endParaRPr lang="en-US" dirty="0"/>
-          </a:p>
-        </p:txBody>
-      </p:sp>
-      <p:sp>
-        <p:nvSpPr>
-          <p:cNvPr id="21" name="Rounded Rectangle 20"/>
-          <p:cNvSpPr/>
-          <p:nvPr/>
-        </p:nvSpPr>
-        <p:spPr>
-          <a:xfrm>
-            <a:off x="8593836" y="5067491"/>
-            <a:ext cx="1892808" cy="573786"/>
-          </a:xfrm>
-          <a:prstGeom prst="roundRect">
-            <a:avLst/>
-          </a:prstGeom>
-        </p:spPr>
-        <p:style>
-          <a:lnRef idx="0">
-            <a:schemeClr val="accent5"/>
-          </a:lnRef>
-          <a:fillRef idx="3">
-            <a:schemeClr val="accent5"/>
-          </a:fillRef>
-          <a:effectRef idx="3">
-            <a:schemeClr val="accent5"/>
-          </a:effectRef>
-          <a:fontRef idx="minor">
-            <a:schemeClr val="lt1"/>
-          </a:fontRef>
-        </p:style>
-        <p:txBody>
-          <a:bodyPr rtlCol="0" anchor="ctr"/>
-          <a:lstStyle/>
-          <a:p>
-            <a:pPr algn="ctr"/>
-            <a:r>
-              <a:rPr lang="en-US" dirty="0" smtClean="0"/>
-              <a:t>I2S Peripheral</a:t>
-            </a:r>
-            <a:endParaRPr lang="en-US" dirty="0"/>
-          </a:p>
-        </p:txBody>
-      </p:sp>
-      <p:sp>
-        <p:nvSpPr>
-          <p:cNvPr id="22" name="Rounded Rectangle 21"/>
-          <p:cNvSpPr/>
-          <p:nvPr/>
-        </p:nvSpPr>
-        <p:spPr>
-          <a:xfrm>
-            <a:off x="8593836" y="6055043"/>
-            <a:ext cx="1892808" cy="603504"/>
-          </a:xfrm>
-          <a:prstGeom prst="roundRect">
-            <a:avLst/>
-          </a:prstGeom>
-        </p:spPr>
-        <p:style>
-          <a:lnRef idx="0">
-            <a:schemeClr val="accent5"/>
-          </a:lnRef>
-          <a:fillRef idx="3">
-            <a:schemeClr val="accent5"/>
-          </a:fillRef>
-          <a:effectRef idx="3">
-            <a:schemeClr val="accent5"/>
-          </a:effectRef>
-          <a:fontRef idx="minor">
-            <a:schemeClr val="lt1"/>
-          </a:fontRef>
-        </p:style>
-        <p:txBody>
-          <a:bodyPr rtlCol="0" anchor="ctr"/>
-          <a:lstStyle/>
-          <a:p>
-            <a:pPr algn="ctr"/>
-            <a:r>
-              <a:rPr lang="en-US" dirty="0" smtClean="0"/>
-              <a:t>A2DP Peripheral</a:t>
-            </a:r>
-            <a:endParaRPr lang="en-US" dirty="0"/>
-          </a:p>
-        </p:txBody>
-      </p:sp>
-      <p:sp>
-        <p:nvSpPr>
-          <p:cNvPr id="23" name="Rounded Rectangle 22"/>
-          <p:cNvSpPr/>
-          <p:nvPr/>
-        </p:nvSpPr>
-        <p:spPr>
-          <a:xfrm>
-            <a:off x="8587740" y="3163539"/>
-            <a:ext cx="1892808" cy="637794"/>
-          </a:xfrm>
-          <a:prstGeom prst="roundRect">
-            <a:avLst/>
-          </a:prstGeom>
-        </p:spPr>
-        <p:style>
-          <a:lnRef idx="0">
-            <a:schemeClr val="accent5"/>
-          </a:lnRef>
-          <a:fillRef idx="3">
-            <a:schemeClr val="accent5"/>
-          </a:fillRef>
-          <a:effectRef idx="3">
-            <a:schemeClr val="accent5"/>
-          </a:effectRef>
-          <a:fontRef idx="minor">
-            <a:schemeClr val="lt1"/>
-          </a:fontRef>
-        </p:style>
-        <p:txBody>
-          <a:bodyPr rtlCol="0" anchor="ctr"/>
-          <a:lstStyle/>
-          <a:p>
-            <a:pPr algn="ctr"/>
-            <a:r>
-              <a:rPr lang="en-US" dirty="0" smtClean="0"/>
-              <a:t>DAC</a:t>
-            </a:r>
-            <a:endParaRPr lang="en-US" dirty="0"/>
-          </a:p>
-        </p:txBody>
-      </p:sp>
-      <p:sp>
-        <p:nvSpPr>
-          <p:cNvPr id="24" name="Rounded Rectangle 23"/>
-          <p:cNvSpPr/>
-          <p:nvPr/>
-        </p:nvSpPr>
-        <p:spPr>
-          <a:xfrm rot="5400000">
-            <a:off x="10739628" y="2972513"/>
-            <a:ext cx="1892808" cy="637794"/>
-          </a:xfrm>
-          <a:prstGeom prst="roundRect">
-            <a:avLst/>
-          </a:prstGeom>
-        </p:spPr>
-        <p:style>
-          <a:lnRef idx="0">
-            <a:schemeClr val="accent2"/>
-          </a:lnRef>
-          <a:fillRef idx="3">
-            <a:schemeClr val="accent2"/>
-          </a:fillRef>
-          <a:effectRef idx="3">
-            <a:schemeClr val="accent2"/>
-          </a:effectRef>
-          <a:fontRef idx="minor">
-            <a:schemeClr val="lt1"/>
-          </a:fontRef>
-        </p:style>
-        <p:txBody>
-          <a:bodyPr rtlCol="0" anchor="ctr"/>
-          <a:lstStyle/>
-          <a:p>
-            <a:pPr algn="ctr"/>
-            <a:r>
-              <a:rPr lang="en-US" dirty="0" smtClean="0"/>
-              <a:t>Headphones</a:t>
-            </a:r>
-            <a:endParaRPr lang="en-US" dirty="0"/>
-          </a:p>
-        </p:txBody>
-      </p:sp>
-      <p:sp>
-        <p:nvSpPr>
-          <p:cNvPr id="25" name="Rounded Rectangle 24"/>
-          <p:cNvSpPr/>
-          <p:nvPr/>
-        </p:nvSpPr>
-        <p:spPr>
-          <a:xfrm rot="5400000">
-            <a:off x="10841734" y="5443822"/>
-            <a:ext cx="1892808" cy="637794"/>
-          </a:xfrm>
-          <a:prstGeom prst="roundRect">
-            <a:avLst/>
-          </a:prstGeom>
-        </p:spPr>
-        <p:style>
-          <a:lnRef idx="0">
-            <a:schemeClr val="accent2"/>
-          </a:lnRef>
-          <a:fillRef idx="3">
-            <a:schemeClr val="accent2"/>
-          </a:fillRef>
-          <a:effectRef idx="3">
-            <a:schemeClr val="accent2"/>
-          </a:effectRef>
-          <a:fontRef idx="minor">
-            <a:schemeClr val="lt1"/>
-          </a:fontRef>
-        </p:style>
-        <p:txBody>
-          <a:bodyPr rtlCol="0" anchor="ctr"/>
-          <a:lstStyle/>
-          <a:p>
-            <a:pPr algn="ctr"/>
-            <a:r>
-              <a:rPr lang="en-US" dirty="0" smtClean="0"/>
-              <a:t>Bluetooth Earphone</a:t>
-            </a:r>
-            <a:endParaRPr lang="en-US" dirty="0"/>
-          </a:p>
-        </p:txBody>
-      </p:sp>
-      <p:sp>
-        <p:nvSpPr>
-          <p:cNvPr id="26" name="Rounded Rectangle 25"/>
-          <p:cNvSpPr/>
-          <p:nvPr/>
-        </p:nvSpPr>
-        <p:spPr>
-          <a:xfrm>
-            <a:off x="3458718" y="1583055"/>
-            <a:ext cx="997458" cy="612648"/>
-          </a:xfrm>
-          <a:prstGeom prst="roundRect">
-            <a:avLst/>
-          </a:prstGeom>
-        </p:spPr>
-        <p:style>
-          <a:lnRef idx="0">
-            <a:schemeClr val="accent2"/>
-          </a:lnRef>
-          <a:fillRef idx="3">
-            <a:schemeClr val="accent2"/>
-          </a:fillRef>
-          <a:effectRef idx="3">
-            <a:schemeClr val="accent2"/>
-          </a:effectRef>
-          <a:fontRef idx="minor">
-            <a:schemeClr val="lt1"/>
-          </a:fontRef>
-        </p:style>
-        <p:txBody>
-          <a:bodyPr rtlCol="0" anchor="ctr"/>
-          <a:lstStyle/>
-          <a:p>
-            <a:pPr algn="ctr"/>
-            <a:r>
-              <a:rPr lang="en-US" dirty="0" smtClean="0"/>
-              <a:t>STM32</a:t>
-            </a:r>
-            <a:endParaRPr lang="en-US" dirty="0"/>
-          </a:p>
-        </p:txBody>
-      </p:sp>
-      <p:sp>
-        <p:nvSpPr>
-          <p:cNvPr id="27" name="Rounded Rectangle 26"/>
-          <p:cNvSpPr/>
-          <p:nvPr/>
-        </p:nvSpPr>
-        <p:spPr>
-          <a:xfrm>
-            <a:off x="8426673" y="4306253"/>
-            <a:ext cx="1813941" cy="612648"/>
-          </a:xfrm>
-          <a:prstGeom prst="roundRect">
-            <a:avLst/>
-          </a:prstGeom>
-        </p:spPr>
-        <p:style>
-          <a:lnRef idx="0">
-            <a:schemeClr val="accent2"/>
-          </a:lnRef>
-          <a:fillRef idx="3">
-            <a:schemeClr val="accent2"/>
-          </a:fillRef>
-          <a:effectRef idx="3">
-            <a:schemeClr val="accent2"/>
-          </a:effectRef>
-          <a:fontRef idx="minor">
-            <a:schemeClr val="lt1"/>
-          </a:fontRef>
-        </p:style>
-        <p:txBody>
-          <a:bodyPr rtlCol="0" anchor="ctr"/>
-          <a:lstStyle/>
-          <a:p>
-            <a:pPr algn="ctr"/>
-            <a:r>
-              <a:rPr lang="en-US" dirty="0" smtClean="0"/>
-              <a:t>Audio Bluetooth</a:t>
-            </a:r>
-            <a:endParaRPr lang="en-US" dirty="0"/>
-          </a:p>
-        </p:txBody>
-      </p:sp>
-      <p:sp>
-        <p:nvSpPr>
-          <p:cNvPr id="28" name="Rounded Rectangle 27"/>
-          <p:cNvSpPr/>
-          <p:nvPr/>
-        </p:nvSpPr>
-        <p:spPr>
-          <a:xfrm>
-            <a:off x="8396478" y="1479614"/>
-            <a:ext cx="1455420" cy="612648"/>
-          </a:xfrm>
-          <a:prstGeom prst="roundRect">
-            <a:avLst/>
-          </a:prstGeom>
-        </p:spPr>
-        <p:style>
-          <a:lnRef idx="0">
-            <a:schemeClr val="accent2"/>
-          </a:lnRef>
-          <a:fillRef idx="3">
-            <a:schemeClr val="accent2"/>
-          </a:fillRef>
-          <a:effectRef idx="3">
-            <a:schemeClr val="accent2"/>
-          </a:effectRef>
-          <a:fontRef idx="minor">
-            <a:schemeClr val="lt1"/>
-          </a:fontRef>
-        </p:style>
-        <p:txBody>
-          <a:bodyPr rtlCol="0" anchor="ctr"/>
-          <a:lstStyle/>
-          <a:p>
-            <a:pPr algn="ctr"/>
-            <a:r>
-              <a:rPr lang="en-US" dirty="0" smtClean="0"/>
-              <a:t>Audio Codec</a:t>
-            </a:r>
-            <a:endParaRPr lang="en-US" dirty="0"/>
-          </a:p>
-        </p:txBody>
-      </p:sp>
-      <p:sp>
-        <p:nvSpPr>
-          <p:cNvPr id="29" name="Rounded Rectangle 28"/>
-          <p:cNvSpPr/>
-          <p:nvPr/>
-        </p:nvSpPr>
-        <p:spPr>
-          <a:xfrm>
-            <a:off x="4664202" y="4437126"/>
-            <a:ext cx="1406652" cy="612648"/>
-          </a:xfrm>
-          <a:prstGeom prst="roundRect">
-            <a:avLst/>
-          </a:prstGeom>
-        </p:spPr>
-        <p:style>
-          <a:lnRef idx="0">
-            <a:schemeClr val="accent5"/>
-          </a:lnRef>
-          <a:fillRef idx="3">
-            <a:schemeClr val="accent5"/>
-          </a:fillRef>
-          <a:effectRef idx="3">
-            <a:schemeClr val="accent5"/>
-          </a:effectRef>
-          <a:fontRef idx="minor">
-            <a:schemeClr val="lt1"/>
-          </a:fontRef>
-        </p:style>
-        <p:txBody>
-          <a:bodyPr rtlCol="0" anchor="ctr"/>
-          <a:lstStyle/>
-          <a:p>
-            <a:pPr algn="ctr"/>
-            <a:r>
-              <a:rPr lang="en-US" dirty="0" smtClean="0"/>
-              <a:t>DSP Filters</a:t>
-            </a:r>
-            <a:endParaRPr lang="en-US" dirty="0"/>
-          </a:p>
-        </p:txBody>
-      </p:sp>
-      <p:sp>
-        <p:nvSpPr>
-          <p:cNvPr id="30" name="Right Arrow 29"/>
-          <p:cNvSpPr/>
-          <p:nvPr/>
-        </p:nvSpPr>
-        <p:spPr>
-          <a:xfrm>
-            <a:off x="2130552" y="2293429"/>
-            <a:ext cx="1162812" cy="400765"/>
-          </a:xfrm>
-          <a:prstGeom prst="rightArrow">
-            <a:avLst/>
-          </a:prstGeom>
-        </p:spPr>
-        <p:style>
-          <a:lnRef idx="0">
-            <a:schemeClr val="accent4"/>
-          </a:lnRef>
-          <a:fillRef idx="3">
-            <a:schemeClr val="accent4"/>
-          </a:fillRef>
-          <a:effectRef idx="3">
-            <a:schemeClr val="accent4"/>
-          </a:effectRef>
-          <a:fontRef idx="minor">
-            <a:schemeClr val="lt1"/>
-          </a:fontRef>
-        </p:style>
-        <p:txBody>
-          <a:bodyPr rtlCol="0" anchor="ctr"/>
-          <a:lstStyle/>
-          <a:p>
-            <a:pPr algn="ctr"/>
-            <a:r>
-              <a:rPr lang="en-US" sz="1200" dirty="0" smtClean="0"/>
-              <a:t>PDM Data</a:t>
-            </a:r>
-            <a:endParaRPr lang="en-US" sz="1200" dirty="0"/>
-          </a:p>
-        </p:txBody>
-      </p:sp>
-      <p:sp>
-        <p:nvSpPr>
-          <p:cNvPr id="31" name="Left Arrow 30"/>
-          <p:cNvSpPr/>
-          <p:nvPr/>
-        </p:nvSpPr>
-        <p:spPr>
-          <a:xfrm>
-            <a:off x="2132076" y="2694194"/>
-            <a:ext cx="1161288" cy="352472"/>
-          </a:xfrm>
-          <a:prstGeom prst="leftArrow">
-            <a:avLst/>
-          </a:prstGeom>
-        </p:spPr>
-        <p:style>
-          <a:lnRef idx="0">
-            <a:schemeClr val="accent4"/>
-          </a:lnRef>
-          <a:fillRef idx="3">
-            <a:schemeClr val="accent4"/>
-          </a:fillRef>
-          <a:effectRef idx="3">
-            <a:schemeClr val="accent4"/>
-          </a:effectRef>
-          <a:fontRef idx="minor">
-            <a:schemeClr val="lt1"/>
-          </a:fontRef>
-        </p:style>
-        <p:txBody>
-          <a:bodyPr rtlCol="0" anchor="ctr"/>
-          <a:lstStyle/>
-          <a:p>
-            <a:pPr algn="ctr"/>
-            <a:r>
-              <a:rPr lang="en-US" sz="1200" dirty="0" smtClean="0"/>
-              <a:t>Clock Signal</a:t>
-            </a:r>
-            <a:endParaRPr lang="en-US" sz="1200" dirty="0"/>
-          </a:p>
-        </p:txBody>
-      </p:sp>
-      <p:sp>
-        <p:nvSpPr>
-          <p:cNvPr id="32" name="Right Arrow 31"/>
-          <p:cNvSpPr/>
-          <p:nvPr/>
-        </p:nvSpPr>
-        <p:spPr>
-          <a:xfrm>
-            <a:off x="5000435" y="2518939"/>
-            <a:ext cx="1387983" cy="302216"/>
-          </a:xfrm>
-          <a:prstGeom prst="rightArrow">
-            <a:avLst/>
-          </a:prstGeom>
-        </p:spPr>
-        <p:style>
-          <a:lnRef idx="0">
-            <a:schemeClr val="accent4"/>
-          </a:lnRef>
-          <a:fillRef idx="3">
-            <a:schemeClr val="accent4"/>
-          </a:fillRef>
-          <a:effectRef idx="3">
-            <a:schemeClr val="accent4"/>
-          </a:effectRef>
-          <a:fontRef idx="minor">
-            <a:schemeClr val="lt1"/>
-          </a:fontRef>
-        </p:style>
-        <p:txBody>
-          <a:bodyPr rtlCol="0" anchor="ctr"/>
-          <a:lstStyle/>
-          <a:p>
-            <a:pPr algn="ctr"/>
-            <a:endParaRPr lang="en-US" sz="1200" dirty="0"/>
-          </a:p>
-        </p:txBody>
-      </p:sp>
-      <p:sp>
-        <p:nvSpPr>
-          <p:cNvPr id="33" name="Right Arrow 32"/>
-          <p:cNvSpPr/>
-          <p:nvPr/>
-        </p:nvSpPr>
-        <p:spPr>
-          <a:xfrm rot="5400000">
-            <a:off x="6321979" y="3088223"/>
-            <a:ext cx="785529" cy="270648"/>
-          </a:xfrm>
-          <a:prstGeom prst="rightArrow">
-            <a:avLst/>
-          </a:prstGeom>
-        </p:spPr>
-        <p:style>
-          <a:lnRef idx="0">
-            <a:schemeClr val="accent4"/>
-          </a:lnRef>
-          <a:fillRef idx="3">
-            <a:schemeClr val="accent4"/>
-          </a:fillRef>
-          <a:effectRef idx="3">
-            <a:schemeClr val="accent4"/>
-          </a:effectRef>
-          <a:fontRef idx="minor">
-            <a:schemeClr val="lt1"/>
-          </a:fontRef>
-        </p:style>
-        <p:txBody>
-          <a:bodyPr rtlCol="0" anchor="ctr"/>
-          <a:lstStyle/>
-          <a:p>
-            <a:pPr algn="ctr"/>
-            <a:endParaRPr lang="en-US" sz="1200" dirty="0"/>
-          </a:p>
-        </p:txBody>
-      </p:sp>
-      <p:sp>
-        <p:nvSpPr>
-          <p:cNvPr id="34" name="Left-Right-Up Arrow 33"/>
-          <p:cNvSpPr/>
-          <p:nvPr/>
-        </p:nvSpPr>
-        <p:spPr>
-          <a:xfrm rot="10800000">
-            <a:off x="4370832" y="3566158"/>
-            <a:ext cx="2017586" cy="913827"/>
-          </a:xfrm>
-          <a:prstGeom prst="leftRightUpArrow">
-            <a:avLst/>
-          </a:prstGeom>
-        </p:spPr>
-        <p:style>
-          <a:lnRef idx="0">
-            <a:schemeClr val="accent4"/>
-          </a:lnRef>
-          <a:fillRef idx="3">
-            <a:schemeClr val="accent4"/>
-          </a:fillRef>
-          <a:effectRef idx="3">
-            <a:schemeClr val="accent4"/>
-          </a:effectRef>
-          <a:fontRef idx="minor">
-            <a:schemeClr val="lt1"/>
-          </a:fontRef>
-        </p:style>
-        <p:txBody>
-          <a:bodyPr rtlCol="0" anchor="ctr"/>
-          <a:lstStyle/>
-          <a:p>
-            <a:pPr algn="ctr"/>
-            <a:endParaRPr lang="en-US" dirty="0"/>
-          </a:p>
-        </p:txBody>
-      </p:sp>
-      <p:sp>
-        <p:nvSpPr>
-          <p:cNvPr id="36" name="Bent-Up Arrow 35"/>
-          <p:cNvSpPr/>
-          <p:nvPr/>
-        </p:nvSpPr>
-        <p:spPr>
-          <a:xfrm rot="10800000">
-            <a:off x="3336132" y="4606345"/>
-            <a:ext cx="1387602" cy="1094706"/>
-          </a:xfrm>
-          <a:prstGeom prst="bentUpArrow">
-            <a:avLst>
-              <a:gd name="adj1" fmla="val 25000"/>
-              <a:gd name="adj2" fmla="val 25000"/>
-              <a:gd name="adj3" fmla="val 22494"/>
-            </a:avLst>
-          </a:prstGeom>
-        </p:spPr>
-        <p:style>
-          <a:lnRef idx="0">
-            <a:schemeClr val="accent4"/>
-          </a:lnRef>
-          <a:fillRef idx="3">
-            <a:schemeClr val="accent4"/>
-          </a:fillRef>
-          <a:effectRef idx="3">
-            <a:schemeClr val="accent4"/>
-          </a:effectRef>
-          <a:fontRef idx="minor">
-            <a:schemeClr val="lt1"/>
-          </a:fontRef>
-        </p:style>
-        <p:txBody>
-          <a:bodyPr rtlCol="0" anchor="ctr"/>
-          <a:lstStyle/>
-          <a:p>
-            <a:pPr algn="ctr"/>
-            <a:endParaRPr lang="en-US"/>
-          </a:p>
-        </p:txBody>
-      </p:sp>
-      <p:sp>
-        <p:nvSpPr>
-          <p:cNvPr id="37" name="Right Arrow 36"/>
-          <p:cNvSpPr/>
-          <p:nvPr/>
-        </p:nvSpPr>
-        <p:spPr>
-          <a:xfrm>
-            <a:off x="3904201" y="5762719"/>
-            <a:ext cx="1554767" cy="302216"/>
-          </a:xfrm>
-          <a:prstGeom prst="rightArrow">
-            <a:avLst/>
-          </a:prstGeom>
-        </p:spPr>
-        <p:style>
-          <a:lnRef idx="0">
-            <a:schemeClr val="accent4"/>
-          </a:lnRef>
-          <a:fillRef idx="3">
-            <a:schemeClr val="accent4"/>
-          </a:fillRef>
-          <a:effectRef idx="3">
-            <a:schemeClr val="accent4"/>
-          </a:effectRef>
-          <a:fontRef idx="minor">
-            <a:schemeClr val="lt1"/>
-          </a:fontRef>
-        </p:style>
-        <p:txBody>
-          <a:bodyPr rtlCol="0" anchor="ctr"/>
-          <a:lstStyle/>
-          <a:p>
-            <a:pPr algn="ctr"/>
-            <a:endParaRPr lang="en-US" sz="1200" dirty="0"/>
-          </a:p>
-        </p:txBody>
-      </p:sp>
-      <p:sp>
-        <p:nvSpPr>
-          <p:cNvPr id="38" name="Right Arrow 37"/>
-          <p:cNvSpPr/>
-          <p:nvPr/>
-        </p:nvSpPr>
-        <p:spPr>
-          <a:xfrm>
-            <a:off x="10404659" y="3324467"/>
-            <a:ext cx="1119447" cy="302216"/>
-          </a:xfrm>
-          <a:prstGeom prst="rightArrow">
-            <a:avLst/>
-          </a:prstGeom>
-        </p:spPr>
-        <p:style>
-          <a:lnRef idx="0">
-            <a:schemeClr val="accent4"/>
-          </a:lnRef>
-          <a:fillRef idx="3">
-            <a:schemeClr val="accent4"/>
-          </a:fillRef>
-          <a:effectRef idx="3">
-            <a:schemeClr val="accent4"/>
-          </a:effectRef>
-          <a:fontRef idx="minor">
-            <a:schemeClr val="lt1"/>
-          </a:fontRef>
-        </p:style>
-        <p:txBody>
-          <a:bodyPr rtlCol="0" anchor="ctr"/>
-          <a:lstStyle/>
-          <a:p>
-            <a:pPr algn="ctr"/>
-            <a:endParaRPr lang="en-US" sz="1200" dirty="0"/>
-          </a:p>
-        </p:txBody>
-      </p:sp>
-      <p:sp>
-        <p:nvSpPr>
-          <p:cNvPr id="39" name="Right Arrow 38"/>
-          <p:cNvSpPr/>
-          <p:nvPr/>
-        </p:nvSpPr>
-        <p:spPr>
-          <a:xfrm>
-            <a:off x="10404658" y="6205687"/>
-            <a:ext cx="1119447" cy="302216"/>
-          </a:xfrm>
-          <a:prstGeom prst="rightArrow">
-            <a:avLst/>
-          </a:prstGeom>
-        </p:spPr>
-        <p:style>
-          <a:lnRef idx="0">
-            <a:schemeClr val="accent4"/>
-          </a:lnRef>
-          <a:fillRef idx="3">
-            <a:schemeClr val="accent4"/>
-          </a:fillRef>
-          <a:effectRef idx="3">
-            <a:schemeClr val="accent4"/>
-          </a:effectRef>
-          <a:fontRef idx="minor">
-            <a:schemeClr val="lt1"/>
-          </a:fontRef>
-        </p:style>
-        <p:txBody>
-          <a:bodyPr rtlCol="0" anchor="ctr"/>
-          <a:lstStyle/>
-          <a:p>
-            <a:pPr algn="ctr"/>
-            <a:endParaRPr lang="en-US" sz="1200" dirty="0"/>
-          </a:p>
-        </p:txBody>
-      </p:sp>
-      <p:sp>
-        <p:nvSpPr>
-          <p:cNvPr id="41" name="Bent-Up Arrow 40"/>
-          <p:cNvSpPr/>
-          <p:nvPr/>
-        </p:nvSpPr>
-        <p:spPr>
-          <a:xfrm rot="5400000" flipH="1">
-            <a:off x="6570697" y="3540850"/>
-            <a:ext cx="3343847" cy="849003"/>
-          </a:xfrm>
-          <a:prstGeom prst="bentUpArrow">
-            <a:avLst>
-              <a:gd name="adj1" fmla="val 25000"/>
-              <a:gd name="adj2" fmla="val 25000"/>
-              <a:gd name="adj3" fmla="val 22494"/>
-            </a:avLst>
-          </a:prstGeom>
-        </p:spPr>
-        <p:style>
-          <a:lnRef idx="0">
-            <a:schemeClr val="accent4"/>
-          </a:lnRef>
-          <a:fillRef idx="3">
-            <a:schemeClr val="accent4"/>
-          </a:fillRef>
-          <a:effectRef idx="3">
-            <a:schemeClr val="accent4"/>
-          </a:effectRef>
-          <a:fontRef idx="minor">
-            <a:schemeClr val="lt1"/>
-          </a:fontRef>
-        </p:style>
-        <p:txBody>
-          <a:bodyPr rtlCol="0" anchor="ctr"/>
-          <a:lstStyle/>
-          <a:p>
-            <a:pPr algn="ctr"/>
-            <a:r>
-              <a:rPr lang="en-US" dirty="0" smtClean="0"/>
-              <a:t>PCM Data</a:t>
-            </a:r>
-            <a:endParaRPr lang="en-US" dirty="0"/>
-          </a:p>
-        </p:txBody>
-      </p:sp>
-      <p:sp>
-        <p:nvSpPr>
-          <p:cNvPr id="40" name="Right Arrow 39"/>
-          <p:cNvSpPr/>
-          <p:nvPr/>
-        </p:nvSpPr>
-        <p:spPr>
-          <a:xfrm rot="20135001">
-            <a:off x="7095749" y="5500867"/>
-            <a:ext cx="1579545" cy="302216"/>
-          </a:xfrm>
-          <a:prstGeom prst="rightArrow">
-            <a:avLst/>
-          </a:prstGeom>
-        </p:spPr>
-        <p:style>
-          <a:lnRef idx="0">
-            <a:schemeClr val="accent4"/>
-          </a:lnRef>
-          <a:fillRef idx="3">
-            <a:schemeClr val="accent4"/>
-          </a:fillRef>
-          <a:effectRef idx="3">
-            <a:schemeClr val="accent4"/>
-          </a:effectRef>
-          <a:fontRef idx="minor">
-            <a:schemeClr val="lt1"/>
-          </a:fontRef>
-        </p:style>
-        <p:txBody>
-          <a:bodyPr rtlCol="0" anchor="ctr"/>
-          <a:lstStyle/>
-          <a:p>
-            <a:pPr algn="ctr"/>
-            <a:r>
-              <a:rPr lang="en-US" sz="1600" dirty="0" smtClean="0"/>
-              <a:t>PCM Data</a:t>
-            </a:r>
-            <a:endParaRPr lang="en-US" sz="1600" dirty="0"/>
-          </a:p>
-        </p:txBody>
-      </p:sp>
-      <p:sp>
-        <p:nvSpPr>
-          <p:cNvPr id="42" name="Right Arrow 41"/>
-          <p:cNvSpPr/>
-          <p:nvPr/>
-        </p:nvSpPr>
-        <p:spPr>
-          <a:xfrm rot="5400000">
-            <a:off x="9239055" y="2889052"/>
-            <a:ext cx="584269" cy="286566"/>
-          </a:xfrm>
-          <a:prstGeom prst="rightArrow">
-            <a:avLst/>
-          </a:prstGeom>
-        </p:spPr>
-        <p:style>
-          <a:lnRef idx="0">
-            <a:schemeClr val="accent4"/>
-          </a:lnRef>
-          <a:fillRef idx="3">
-            <a:schemeClr val="accent4"/>
-          </a:fillRef>
-          <a:effectRef idx="3">
-            <a:schemeClr val="accent4"/>
-          </a:effectRef>
-          <a:fontRef idx="minor">
-            <a:schemeClr val="lt1"/>
-          </a:fontRef>
-        </p:style>
-        <p:txBody>
-          <a:bodyPr rtlCol="0" anchor="ctr"/>
-          <a:lstStyle/>
-          <a:p>
-            <a:pPr algn="ctr"/>
-            <a:endParaRPr lang="en-US" sz="1200" dirty="0"/>
-          </a:p>
-        </p:txBody>
-      </p:sp>
-      <p:sp>
-        <p:nvSpPr>
-          <p:cNvPr id="43" name="Right Arrow 42"/>
-          <p:cNvSpPr/>
-          <p:nvPr/>
-        </p:nvSpPr>
-        <p:spPr>
-          <a:xfrm rot="5400000">
-            <a:off x="9248105" y="5697448"/>
-            <a:ext cx="584269" cy="286566"/>
-          </a:xfrm>
-          <a:prstGeom prst="rightArrow">
-            <a:avLst/>
-          </a:prstGeom>
-        </p:spPr>
-        <p:style>
-          <a:lnRef idx="0">
-            <a:schemeClr val="accent4"/>
-          </a:lnRef>
-          <a:fillRef idx="3">
-            <a:schemeClr val="accent4"/>
-          </a:fillRef>
-          <a:effectRef idx="3">
-            <a:schemeClr val="accent4"/>
-          </a:effectRef>
-          <a:fontRef idx="minor">
-            <a:schemeClr val="lt1"/>
-          </a:fontRef>
-        </p:style>
-        <p:txBody>
-          <a:bodyPr rtlCol="0" anchor="ctr"/>
-          <a:lstStyle/>
-          <a:p>
-            <a:pPr algn="ctr"/>
-            <a:endParaRPr lang="en-US" sz="1200" dirty="0"/>
           </a:p>
         </p:txBody>
       </p:sp>
     </p:spTree>
     <p:extLst>
       <p:ext uri="{BB962C8B-B14F-4D97-AF65-F5344CB8AC3E}">
-        <p14:creationId xmlns:p14="http://schemas.microsoft.com/office/powerpoint/2010/main" val="3710677287"/>
+        <p14:creationId xmlns:p14="http://schemas.microsoft.com/office/powerpoint/2010/main" val="3908622420"/>
       </p:ext>
     </p:extLst>
   </p:cSld>
   <p:clrMapOvr>
     <a:masterClrMapping/>
   </p:clrMapOvr>
-  <p:timing>
-    <p:tnLst>
-      <p:par>
-        <p:cTn id="1" dur="indefinite" restart="never" nodeType="tmRoot"/>
-      </p:par>
-    </p:tnLst>
-  </p:timing>
 </p:sld>
 </file>
 
@@ -7042,7 +5997,7 @@
             <a:pPr algn="ctr"/>
             <a:r>
               <a:rPr lang="en-US" b="1" u="sng" dirty="0" smtClean="0"/>
-              <a:t>MEMS Microphones</a:t>
+              <a:t>Block Diagram</a:t>
             </a:r>
             <a:endParaRPr lang="en-US" b="1" u="sng" dirty="0"/>
           </a:p>
@@ -7060,52 +6015,23 @@
         </p:nvPicPr>
         <p:blipFill rotWithShape="1">
           <a:blip r:embed="rId2"/>
-          <a:srcRect t="7416"/>
+          <a:srcRect t="4851"/>
           <a:stretch/>
         </p:blipFill>
         <p:spPr>
           <a:xfrm>
-            <a:off x="2443161" y="1620774"/>
-            <a:ext cx="7458075" cy="3139440"/>
+            <a:off x="3198652" y="2171700"/>
+            <a:ext cx="5947095" cy="3407664"/>
           </a:xfrm>
           <a:prstGeom prst="rect">
             <a:avLst/>
           </a:prstGeom>
         </p:spPr>
       </p:pic>
-      <p:sp>
-        <p:nvSpPr>
-          <p:cNvPr id="3" name="TextBox 2"/>
-          <p:cNvSpPr txBox="1"/>
-          <p:nvPr/>
-        </p:nvSpPr>
-        <p:spPr>
-          <a:xfrm>
-            <a:off x="827531" y="5093208"/>
-            <a:ext cx="10689336" cy="954107"/>
-          </a:xfrm>
-          <a:prstGeom prst="rect">
-            <a:avLst/>
-          </a:prstGeom>
-          <a:noFill/>
-        </p:spPr>
-        <p:txBody>
-          <a:bodyPr wrap="square" rtlCol="0">
-            <a:spAutoFit/>
-          </a:bodyPr>
-          <a:lstStyle/>
-          <a:p>
-            <a:r>
-              <a:rPr lang="en-US" sz="2800" dirty="0"/>
-              <a:t>- The digital MEMS microphone is a sensor that convert acoustic pressure waves into a digital signal. </a:t>
-            </a:r>
-          </a:p>
-        </p:txBody>
-      </p:sp>
     </p:spTree>
     <p:extLst>
       <p:ext uri="{BB962C8B-B14F-4D97-AF65-F5344CB8AC3E}">
-        <p14:creationId xmlns:p14="http://schemas.microsoft.com/office/powerpoint/2010/main" val="3694460086"/>
+        <p14:creationId xmlns:p14="http://schemas.microsoft.com/office/powerpoint/2010/main" val="4241332501"/>
       </p:ext>
     </p:extLst>
   </p:cSld>
@@ -7141,53 +6067,1401 @@
       </p:grpSpPr>
       <p:sp>
         <p:nvSpPr>
-          <p:cNvPr id="2" name="Title 1"/>
-          <p:cNvSpPr>
-            <a:spLocks noGrp="1"/>
-          </p:cNvSpPr>
-          <p:nvPr>
-            <p:ph type="title"/>
-          </p:nvPr>
-        </p:nvSpPr>
-        <p:spPr/>
-        <p:txBody>
-          <a:bodyPr/>
-          <a:lstStyle/>
-          <a:p>
-            <a:pPr algn="ctr"/>
-            <a:r>
-              <a:rPr lang="en-US" b="1" u="sng" dirty="0" smtClean="0"/>
-              <a:t>PDM Signal</a:t>
-            </a:r>
-            <a:endParaRPr lang="en-US" b="1" u="sng" dirty="0"/>
-          </a:p>
-        </p:txBody>
-      </p:sp>
-      <p:pic>
-        <p:nvPicPr>
-          <p:cNvPr id="4" name="Content Placeholder 3"/>
-          <p:cNvPicPr>
-            <a:picLocks noGrp="1"/>
-          </p:cNvPicPr>
-          <p:nvPr>
-            <p:ph idx="1"/>
-          </p:nvPr>
-        </p:nvPicPr>
-        <p:blipFill rotWithShape="1">
-          <a:blip r:embed="rId2"/>
-          <a:srcRect t="5617"/>
-          <a:stretch/>
-        </p:blipFill>
-        <p:spPr>
-          <a:xfrm>
-            <a:off x="2754374" y="1428750"/>
-            <a:ext cx="6835652" cy="3380232"/>
-          </a:xfrm>
-          <a:prstGeom prst="rect">
+          <p:cNvPr id="12" name="Rounded Rectangle 11"/>
+          <p:cNvSpPr/>
+          <p:nvPr/>
+        </p:nvSpPr>
+        <p:spPr>
+          <a:xfrm>
+            <a:off x="2854014" y="1458468"/>
+            <a:ext cx="4718304" cy="5312664"/>
+          </a:xfrm>
+          <a:prstGeom prst="roundRect">
             <a:avLst/>
           </a:prstGeom>
         </p:spPr>
-      </p:pic>
+        <p:style>
+          <a:lnRef idx="2">
+            <a:schemeClr val="accent1">
+              <a:shade val="50000"/>
+            </a:schemeClr>
+          </a:lnRef>
+          <a:fillRef idx="1">
+            <a:schemeClr val="accent1"/>
+          </a:fillRef>
+          <a:effectRef idx="0">
+            <a:schemeClr val="accent1"/>
+          </a:effectRef>
+          <a:fontRef idx="minor">
+            <a:schemeClr val="lt1"/>
+          </a:fontRef>
+        </p:style>
+        <p:txBody>
+          <a:bodyPr rtlCol="0" anchor="ctr"/>
+          <a:lstStyle/>
+          <a:p>
+            <a:pPr algn="ctr"/>
+            <a:endParaRPr lang="en-US"/>
+          </a:p>
+        </p:txBody>
+      </p:sp>
+      <p:sp>
+        <p:nvSpPr>
+          <p:cNvPr id="2" name="Title 1"/>
+          <p:cNvSpPr>
+            <a:spLocks noGrp="1"/>
+          </p:cNvSpPr>
+          <p:nvPr>
+            <p:ph type="title"/>
+          </p:nvPr>
+        </p:nvSpPr>
+        <p:spPr>
+          <a:xfrm>
+            <a:off x="1371600" y="685800"/>
+            <a:ext cx="9601200" cy="816102"/>
+          </a:xfrm>
+        </p:spPr>
+        <p:txBody>
+          <a:bodyPr/>
+          <a:lstStyle/>
+          <a:p>
+            <a:pPr algn="ctr"/>
+            <a:r>
+              <a:rPr lang="en-US" b="1" u="sng" dirty="0" smtClean="0"/>
+              <a:t>Block Diagram</a:t>
+            </a:r>
+            <a:endParaRPr lang="en-US" b="1" u="sng" dirty="0"/>
+          </a:p>
+        </p:txBody>
+      </p:sp>
+      <p:sp>
+        <p:nvSpPr>
+          <p:cNvPr id="5" name="Rounded Rectangle 4"/>
+          <p:cNvSpPr/>
+          <p:nvPr/>
+        </p:nvSpPr>
+        <p:spPr>
+          <a:xfrm>
+            <a:off x="749046" y="2293429"/>
+            <a:ext cx="1577340" cy="753237"/>
+          </a:xfrm>
+          <a:prstGeom prst="roundRect">
+            <a:avLst/>
+          </a:prstGeom>
+        </p:spPr>
+        <p:style>
+          <a:lnRef idx="0">
+            <a:schemeClr val="accent2"/>
+          </a:lnRef>
+          <a:fillRef idx="3">
+            <a:schemeClr val="accent2"/>
+          </a:fillRef>
+          <a:effectRef idx="3">
+            <a:schemeClr val="accent2"/>
+          </a:effectRef>
+          <a:fontRef idx="minor">
+            <a:schemeClr val="lt1"/>
+          </a:fontRef>
+        </p:style>
+        <p:txBody>
+          <a:bodyPr rtlCol="0" anchor="ctr"/>
+          <a:lstStyle/>
+          <a:p>
+            <a:pPr algn="ctr"/>
+            <a:r>
+              <a:rPr lang="en-US" dirty="0" smtClean="0"/>
+              <a:t>MEMS Microphone</a:t>
+            </a:r>
+            <a:endParaRPr lang="en-US" dirty="0"/>
+          </a:p>
+        </p:txBody>
+      </p:sp>
+      <p:sp>
+        <p:nvSpPr>
+          <p:cNvPr id="6" name="Rounded Rectangle 5"/>
+          <p:cNvSpPr/>
+          <p:nvPr/>
+        </p:nvSpPr>
+        <p:spPr>
+          <a:xfrm>
+            <a:off x="3185160" y="2367152"/>
+            <a:ext cx="1892808" cy="605790"/>
+          </a:xfrm>
+          <a:prstGeom prst="roundRect">
+            <a:avLst/>
+          </a:prstGeom>
+        </p:spPr>
+        <p:style>
+          <a:lnRef idx="0">
+            <a:schemeClr val="accent5"/>
+          </a:lnRef>
+          <a:fillRef idx="3">
+            <a:schemeClr val="accent5"/>
+          </a:fillRef>
+          <a:effectRef idx="3">
+            <a:schemeClr val="accent5"/>
+          </a:effectRef>
+          <a:fontRef idx="minor">
+            <a:schemeClr val="lt1"/>
+          </a:fontRef>
+        </p:style>
+        <p:txBody>
+          <a:bodyPr rtlCol="0" anchor="ctr"/>
+          <a:lstStyle/>
+          <a:p>
+            <a:pPr algn="ctr"/>
+            <a:r>
+              <a:rPr lang="en-US" dirty="0" smtClean="0"/>
+              <a:t>I2S Peripheral</a:t>
+            </a:r>
+            <a:endParaRPr lang="en-US" dirty="0"/>
+          </a:p>
+        </p:txBody>
+      </p:sp>
+      <p:sp>
+        <p:nvSpPr>
+          <p:cNvPr id="7" name="Rounded Rectangle 6"/>
+          <p:cNvSpPr/>
+          <p:nvPr/>
+        </p:nvSpPr>
+        <p:spPr>
+          <a:xfrm>
+            <a:off x="6310884" y="2366580"/>
+            <a:ext cx="807720" cy="585216"/>
+          </a:xfrm>
+          <a:prstGeom prst="roundRect">
+            <a:avLst/>
+          </a:prstGeom>
+        </p:spPr>
+        <p:style>
+          <a:lnRef idx="0">
+            <a:schemeClr val="accent5"/>
+          </a:lnRef>
+          <a:fillRef idx="3">
+            <a:schemeClr val="accent5"/>
+          </a:fillRef>
+          <a:effectRef idx="3">
+            <a:schemeClr val="accent5"/>
+          </a:effectRef>
+          <a:fontRef idx="minor">
+            <a:schemeClr val="lt1"/>
+          </a:fontRef>
+        </p:style>
+        <p:txBody>
+          <a:bodyPr rtlCol="0" anchor="ctr"/>
+          <a:lstStyle/>
+          <a:p>
+            <a:pPr algn="ctr"/>
+            <a:r>
+              <a:rPr lang="en-US" dirty="0" smtClean="0"/>
+              <a:t>DMA</a:t>
+            </a:r>
+            <a:endParaRPr lang="en-US" dirty="0"/>
+          </a:p>
+        </p:txBody>
+      </p:sp>
+      <p:sp>
+        <p:nvSpPr>
+          <p:cNvPr id="8" name="Rounded Rectangle 7"/>
+          <p:cNvSpPr/>
+          <p:nvPr/>
+        </p:nvSpPr>
+        <p:spPr>
+          <a:xfrm>
+            <a:off x="6310884" y="3502152"/>
+            <a:ext cx="807720" cy="612648"/>
+          </a:xfrm>
+          <a:prstGeom prst="roundRect">
+            <a:avLst/>
+          </a:prstGeom>
+        </p:spPr>
+        <p:style>
+          <a:lnRef idx="0">
+            <a:schemeClr val="accent5"/>
+          </a:lnRef>
+          <a:fillRef idx="3">
+            <a:schemeClr val="accent5"/>
+          </a:fillRef>
+          <a:effectRef idx="3">
+            <a:schemeClr val="accent5"/>
+          </a:effectRef>
+          <a:fontRef idx="minor">
+            <a:schemeClr val="lt1"/>
+          </a:fontRef>
+        </p:style>
+        <p:txBody>
+          <a:bodyPr rtlCol="0" anchor="ctr"/>
+          <a:lstStyle/>
+          <a:p>
+            <a:pPr algn="ctr"/>
+            <a:r>
+              <a:rPr lang="en-US" dirty="0" smtClean="0"/>
+              <a:t>RAM</a:t>
+            </a:r>
+            <a:endParaRPr lang="en-US" dirty="0"/>
+          </a:p>
+        </p:txBody>
+      </p:sp>
+      <p:sp>
+        <p:nvSpPr>
+          <p:cNvPr id="9" name="Rounded Rectangle 8"/>
+          <p:cNvSpPr/>
+          <p:nvPr/>
+        </p:nvSpPr>
+        <p:spPr>
+          <a:xfrm>
+            <a:off x="3710940" y="3502152"/>
+            <a:ext cx="751332" cy="612648"/>
+          </a:xfrm>
+          <a:prstGeom prst="roundRect">
+            <a:avLst/>
+          </a:prstGeom>
+        </p:spPr>
+        <p:style>
+          <a:lnRef idx="0">
+            <a:schemeClr val="accent5"/>
+          </a:lnRef>
+          <a:fillRef idx="3">
+            <a:schemeClr val="accent5"/>
+          </a:fillRef>
+          <a:effectRef idx="3">
+            <a:schemeClr val="accent5"/>
+          </a:effectRef>
+          <a:fontRef idx="minor">
+            <a:schemeClr val="lt1"/>
+          </a:fontRef>
+        </p:style>
+        <p:txBody>
+          <a:bodyPr rtlCol="0" anchor="ctr"/>
+          <a:lstStyle/>
+          <a:p>
+            <a:pPr algn="ctr"/>
+            <a:r>
+              <a:rPr lang="en-US" dirty="0" smtClean="0"/>
+              <a:t>CPU</a:t>
+            </a:r>
+            <a:endParaRPr lang="en-US" dirty="0"/>
+          </a:p>
+        </p:txBody>
+      </p:sp>
+      <p:sp>
+        <p:nvSpPr>
+          <p:cNvPr id="10" name="Rounded Rectangle 9"/>
+          <p:cNvSpPr/>
+          <p:nvPr/>
+        </p:nvSpPr>
+        <p:spPr>
+          <a:xfrm>
+            <a:off x="3206115" y="5637276"/>
+            <a:ext cx="751332" cy="557784"/>
+          </a:xfrm>
+          <a:prstGeom prst="roundRect">
+            <a:avLst/>
+          </a:prstGeom>
+        </p:spPr>
+        <p:style>
+          <a:lnRef idx="0">
+            <a:schemeClr val="accent5"/>
+          </a:lnRef>
+          <a:fillRef idx="3">
+            <a:schemeClr val="accent5"/>
+          </a:fillRef>
+          <a:effectRef idx="3">
+            <a:schemeClr val="accent5"/>
+          </a:effectRef>
+          <a:fontRef idx="minor">
+            <a:schemeClr val="lt1"/>
+          </a:fontRef>
+        </p:style>
+        <p:txBody>
+          <a:bodyPr rtlCol="0" anchor="ctr"/>
+          <a:lstStyle/>
+          <a:p>
+            <a:pPr algn="ctr"/>
+            <a:r>
+              <a:rPr lang="en-US" dirty="0" smtClean="0"/>
+              <a:t>DMA</a:t>
+            </a:r>
+            <a:endParaRPr lang="en-US" dirty="0"/>
+          </a:p>
+        </p:txBody>
+      </p:sp>
+      <p:sp>
+        <p:nvSpPr>
+          <p:cNvPr id="11" name="Rounded Rectangle 10"/>
+          <p:cNvSpPr/>
+          <p:nvPr/>
+        </p:nvSpPr>
+        <p:spPr>
+          <a:xfrm>
+            <a:off x="5364480" y="5642991"/>
+            <a:ext cx="1892808" cy="552069"/>
+          </a:xfrm>
+          <a:prstGeom prst="roundRect">
+            <a:avLst/>
+          </a:prstGeom>
+        </p:spPr>
+        <p:style>
+          <a:lnRef idx="0">
+            <a:schemeClr val="accent5"/>
+          </a:lnRef>
+          <a:fillRef idx="3">
+            <a:schemeClr val="accent5"/>
+          </a:fillRef>
+          <a:effectRef idx="3">
+            <a:schemeClr val="accent5"/>
+          </a:effectRef>
+          <a:fontRef idx="minor">
+            <a:schemeClr val="lt1"/>
+          </a:fontRef>
+        </p:style>
+        <p:txBody>
+          <a:bodyPr rtlCol="0" anchor="ctr"/>
+          <a:lstStyle/>
+          <a:p>
+            <a:pPr algn="ctr"/>
+            <a:r>
+              <a:rPr lang="en-US" dirty="0"/>
+              <a:t>I2S </a:t>
+            </a:r>
+            <a:r>
+              <a:rPr lang="en-US" dirty="0" smtClean="0"/>
+              <a:t>Peripheral</a:t>
+            </a:r>
+            <a:endParaRPr lang="en-US" dirty="0"/>
+          </a:p>
+        </p:txBody>
+      </p:sp>
+      <p:sp>
+        <p:nvSpPr>
+          <p:cNvPr id="18" name="Rounded Rectangle 17"/>
+          <p:cNvSpPr/>
+          <p:nvPr/>
+        </p:nvSpPr>
+        <p:spPr>
+          <a:xfrm>
+            <a:off x="8199120" y="1412177"/>
+            <a:ext cx="2670048" cy="2542032"/>
+          </a:xfrm>
+          <a:prstGeom prst="roundRect">
+            <a:avLst/>
+          </a:prstGeom>
+        </p:spPr>
+        <p:style>
+          <a:lnRef idx="2">
+            <a:schemeClr val="accent1">
+              <a:shade val="50000"/>
+            </a:schemeClr>
+          </a:lnRef>
+          <a:fillRef idx="1">
+            <a:schemeClr val="accent1"/>
+          </a:fillRef>
+          <a:effectRef idx="0">
+            <a:schemeClr val="accent1"/>
+          </a:effectRef>
+          <a:fontRef idx="minor">
+            <a:schemeClr val="lt1"/>
+          </a:fontRef>
+        </p:style>
+        <p:txBody>
+          <a:bodyPr rtlCol="0" anchor="ctr"/>
+          <a:lstStyle/>
+          <a:p>
+            <a:pPr algn="ctr"/>
+            <a:endParaRPr lang="en-US"/>
+          </a:p>
+        </p:txBody>
+      </p:sp>
+      <p:sp>
+        <p:nvSpPr>
+          <p:cNvPr id="19" name="Rounded Rectangle 18"/>
+          <p:cNvSpPr/>
+          <p:nvPr/>
+        </p:nvSpPr>
+        <p:spPr>
+          <a:xfrm>
+            <a:off x="8199120" y="4245102"/>
+            <a:ext cx="2682240" cy="2526030"/>
+          </a:xfrm>
+          <a:prstGeom prst="roundRect">
+            <a:avLst/>
+          </a:prstGeom>
+        </p:spPr>
+        <p:style>
+          <a:lnRef idx="2">
+            <a:schemeClr val="accent1">
+              <a:shade val="50000"/>
+            </a:schemeClr>
+          </a:lnRef>
+          <a:fillRef idx="1">
+            <a:schemeClr val="accent1"/>
+          </a:fillRef>
+          <a:effectRef idx="0">
+            <a:schemeClr val="accent1"/>
+          </a:effectRef>
+          <a:fontRef idx="minor">
+            <a:schemeClr val="lt1"/>
+          </a:fontRef>
+        </p:style>
+        <p:txBody>
+          <a:bodyPr rtlCol="0" anchor="ctr"/>
+          <a:lstStyle/>
+          <a:p>
+            <a:pPr algn="ctr"/>
+            <a:endParaRPr lang="en-US"/>
+          </a:p>
+        </p:txBody>
+      </p:sp>
+      <p:sp>
+        <p:nvSpPr>
+          <p:cNvPr id="20" name="Rounded Rectangle 19"/>
+          <p:cNvSpPr/>
+          <p:nvPr/>
+        </p:nvSpPr>
+        <p:spPr>
+          <a:xfrm>
+            <a:off x="8587740" y="2215991"/>
+            <a:ext cx="1892808" cy="637794"/>
+          </a:xfrm>
+          <a:prstGeom prst="roundRect">
+            <a:avLst/>
+          </a:prstGeom>
+        </p:spPr>
+        <p:style>
+          <a:lnRef idx="0">
+            <a:schemeClr val="accent5"/>
+          </a:lnRef>
+          <a:fillRef idx="3">
+            <a:schemeClr val="accent5"/>
+          </a:fillRef>
+          <a:effectRef idx="3">
+            <a:schemeClr val="accent5"/>
+          </a:effectRef>
+          <a:fontRef idx="minor">
+            <a:schemeClr val="lt1"/>
+          </a:fontRef>
+        </p:style>
+        <p:txBody>
+          <a:bodyPr rtlCol="0" anchor="ctr"/>
+          <a:lstStyle/>
+          <a:p>
+            <a:pPr algn="ctr"/>
+            <a:r>
+              <a:rPr lang="en-US" dirty="0" smtClean="0"/>
+              <a:t>I2S Peripheral</a:t>
+            </a:r>
+            <a:endParaRPr lang="en-US" dirty="0"/>
+          </a:p>
+        </p:txBody>
+      </p:sp>
+      <p:sp>
+        <p:nvSpPr>
+          <p:cNvPr id="21" name="Rounded Rectangle 20"/>
+          <p:cNvSpPr/>
+          <p:nvPr/>
+        </p:nvSpPr>
+        <p:spPr>
+          <a:xfrm>
+            <a:off x="8593836" y="5067491"/>
+            <a:ext cx="1892808" cy="573786"/>
+          </a:xfrm>
+          <a:prstGeom prst="roundRect">
+            <a:avLst/>
+          </a:prstGeom>
+        </p:spPr>
+        <p:style>
+          <a:lnRef idx="0">
+            <a:schemeClr val="accent5"/>
+          </a:lnRef>
+          <a:fillRef idx="3">
+            <a:schemeClr val="accent5"/>
+          </a:fillRef>
+          <a:effectRef idx="3">
+            <a:schemeClr val="accent5"/>
+          </a:effectRef>
+          <a:fontRef idx="minor">
+            <a:schemeClr val="lt1"/>
+          </a:fontRef>
+        </p:style>
+        <p:txBody>
+          <a:bodyPr rtlCol="0" anchor="ctr"/>
+          <a:lstStyle/>
+          <a:p>
+            <a:pPr algn="ctr"/>
+            <a:r>
+              <a:rPr lang="en-US" dirty="0" smtClean="0"/>
+              <a:t>I2S Peripheral</a:t>
+            </a:r>
+            <a:endParaRPr lang="en-US" dirty="0"/>
+          </a:p>
+        </p:txBody>
+      </p:sp>
+      <p:sp>
+        <p:nvSpPr>
+          <p:cNvPr id="22" name="Rounded Rectangle 21"/>
+          <p:cNvSpPr/>
+          <p:nvPr/>
+        </p:nvSpPr>
+        <p:spPr>
+          <a:xfrm>
+            <a:off x="8593836" y="6055043"/>
+            <a:ext cx="1892808" cy="603504"/>
+          </a:xfrm>
+          <a:prstGeom prst="roundRect">
+            <a:avLst/>
+          </a:prstGeom>
+        </p:spPr>
+        <p:style>
+          <a:lnRef idx="0">
+            <a:schemeClr val="accent5"/>
+          </a:lnRef>
+          <a:fillRef idx="3">
+            <a:schemeClr val="accent5"/>
+          </a:fillRef>
+          <a:effectRef idx="3">
+            <a:schemeClr val="accent5"/>
+          </a:effectRef>
+          <a:fontRef idx="minor">
+            <a:schemeClr val="lt1"/>
+          </a:fontRef>
+        </p:style>
+        <p:txBody>
+          <a:bodyPr rtlCol="0" anchor="ctr"/>
+          <a:lstStyle/>
+          <a:p>
+            <a:pPr algn="ctr"/>
+            <a:r>
+              <a:rPr lang="en-US" dirty="0" smtClean="0"/>
+              <a:t>A2DP Peripheral</a:t>
+            </a:r>
+            <a:endParaRPr lang="en-US" dirty="0"/>
+          </a:p>
+        </p:txBody>
+      </p:sp>
+      <p:sp>
+        <p:nvSpPr>
+          <p:cNvPr id="23" name="Rounded Rectangle 22"/>
+          <p:cNvSpPr/>
+          <p:nvPr/>
+        </p:nvSpPr>
+        <p:spPr>
+          <a:xfrm>
+            <a:off x="8587740" y="3163539"/>
+            <a:ext cx="1892808" cy="637794"/>
+          </a:xfrm>
+          <a:prstGeom prst="roundRect">
+            <a:avLst/>
+          </a:prstGeom>
+        </p:spPr>
+        <p:style>
+          <a:lnRef idx="0">
+            <a:schemeClr val="accent5"/>
+          </a:lnRef>
+          <a:fillRef idx="3">
+            <a:schemeClr val="accent5"/>
+          </a:fillRef>
+          <a:effectRef idx="3">
+            <a:schemeClr val="accent5"/>
+          </a:effectRef>
+          <a:fontRef idx="minor">
+            <a:schemeClr val="lt1"/>
+          </a:fontRef>
+        </p:style>
+        <p:txBody>
+          <a:bodyPr rtlCol="0" anchor="ctr"/>
+          <a:lstStyle/>
+          <a:p>
+            <a:pPr algn="ctr"/>
+            <a:r>
+              <a:rPr lang="en-US" dirty="0" smtClean="0"/>
+              <a:t>DAC</a:t>
+            </a:r>
+            <a:endParaRPr lang="en-US" dirty="0"/>
+          </a:p>
+        </p:txBody>
+      </p:sp>
+      <p:sp>
+        <p:nvSpPr>
+          <p:cNvPr id="24" name="Rounded Rectangle 23"/>
+          <p:cNvSpPr/>
+          <p:nvPr/>
+        </p:nvSpPr>
+        <p:spPr>
+          <a:xfrm rot="5400000">
+            <a:off x="10841734" y="2982442"/>
+            <a:ext cx="1892808" cy="637794"/>
+          </a:xfrm>
+          <a:prstGeom prst="roundRect">
+            <a:avLst/>
+          </a:prstGeom>
+        </p:spPr>
+        <p:style>
+          <a:lnRef idx="0">
+            <a:schemeClr val="accent2"/>
+          </a:lnRef>
+          <a:fillRef idx="3">
+            <a:schemeClr val="accent2"/>
+          </a:fillRef>
+          <a:effectRef idx="3">
+            <a:schemeClr val="accent2"/>
+          </a:effectRef>
+          <a:fontRef idx="minor">
+            <a:schemeClr val="lt1"/>
+          </a:fontRef>
+        </p:style>
+        <p:txBody>
+          <a:bodyPr rtlCol="0" anchor="ctr"/>
+          <a:lstStyle/>
+          <a:p>
+            <a:pPr algn="ctr"/>
+            <a:r>
+              <a:rPr lang="en-US" dirty="0" smtClean="0"/>
+              <a:t>Headphones</a:t>
+            </a:r>
+            <a:endParaRPr lang="en-US" dirty="0"/>
+          </a:p>
+        </p:txBody>
+      </p:sp>
+      <p:sp>
+        <p:nvSpPr>
+          <p:cNvPr id="25" name="Rounded Rectangle 24"/>
+          <p:cNvSpPr/>
+          <p:nvPr/>
+        </p:nvSpPr>
+        <p:spPr>
+          <a:xfrm rot="5400000">
+            <a:off x="10841734" y="5443822"/>
+            <a:ext cx="1892808" cy="637794"/>
+          </a:xfrm>
+          <a:prstGeom prst="roundRect">
+            <a:avLst/>
+          </a:prstGeom>
+        </p:spPr>
+        <p:style>
+          <a:lnRef idx="0">
+            <a:schemeClr val="accent2"/>
+          </a:lnRef>
+          <a:fillRef idx="3">
+            <a:schemeClr val="accent2"/>
+          </a:fillRef>
+          <a:effectRef idx="3">
+            <a:schemeClr val="accent2"/>
+          </a:effectRef>
+          <a:fontRef idx="minor">
+            <a:schemeClr val="lt1"/>
+          </a:fontRef>
+        </p:style>
+        <p:txBody>
+          <a:bodyPr rtlCol="0" anchor="ctr"/>
+          <a:lstStyle/>
+          <a:p>
+            <a:pPr algn="ctr"/>
+            <a:r>
+              <a:rPr lang="en-US" dirty="0" smtClean="0"/>
+              <a:t>Bluetooth Earphone</a:t>
+            </a:r>
+            <a:endParaRPr lang="en-US" dirty="0"/>
+          </a:p>
+        </p:txBody>
+      </p:sp>
+      <p:sp>
+        <p:nvSpPr>
+          <p:cNvPr id="26" name="Rounded Rectangle 25"/>
+          <p:cNvSpPr/>
+          <p:nvPr/>
+        </p:nvSpPr>
+        <p:spPr>
+          <a:xfrm>
+            <a:off x="3458718" y="1583055"/>
+            <a:ext cx="997458" cy="612648"/>
+          </a:xfrm>
+          <a:prstGeom prst="roundRect">
+            <a:avLst/>
+          </a:prstGeom>
+        </p:spPr>
+        <p:style>
+          <a:lnRef idx="0">
+            <a:schemeClr val="accent2"/>
+          </a:lnRef>
+          <a:fillRef idx="3">
+            <a:schemeClr val="accent2"/>
+          </a:fillRef>
+          <a:effectRef idx="3">
+            <a:schemeClr val="accent2"/>
+          </a:effectRef>
+          <a:fontRef idx="minor">
+            <a:schemeClr val="lt1"/>
+          </a:fontRef>
+        </p:style>
+        <p:txBody>
+          <a:bodyPr rtlCol="0" anchor="ctr"/>
+          <a:lstStyle/>
+          <a:p>
+            <a:pPr algn="ctr"/>
+            <a:r>
+              <a:rPr lang="en-US" dirty="0" smtClean="0"/>
+              <a:t>STM32</a:t>
+            </a:r>
+            <a:endParaRPr lang="en-US" dirty="0"/>
+          </a:p>
+        </p:txBody>
+      </p:sp>
+      <p:sp>
+        <p:nvSpPr>
+          <p:cNvPr id="27" name="Rounded Rectangle 26"/>
+          <p:cNvSpPr/>
+          <p:nvPr/>
+        </p:nvSpPr>
+        <p:spPr>
+          <a:xfrm>
+            <a:off x="8426673" y="4306253"/>
+            <a:ext cx="1813941" cy="612648"/>
+          </a:xfrm>
+          <a:prstGeom prst="roundRect">
+            <a:avLst/>
+          </a:prstGeom>
+        </p:spPr>
+        <p:style>
+          <a:lnRef idx="0">
+            <a:schemeClr val="accent2"/>
+          </a:lnRef>
+          <a:fillRef idx="3">
+            <a:schemeClr val="accent2"/>
+          </a:fillRef>
+          <a:effectRef idx="3">
+            <a:schemeClr val="accent2"/>
+          </a:effectRef>
+          <a:fontRef idx="minor">
+            <a:schemeClr val="lt1"/>
+          </a:fontRef>
+        </p:style>
+        <p:txBody>
+          <a:bodyPr rtlCol="0" anchor="ctr"/>
+          <a:lstStyle/>
+          <a:p>
+            <a:pPr algn="ctr"/>
+            <a:r>
+              <a:rPr lang="en-US" dirty="0" smtClean="0"/>
+              <a:t>Audio Bluetooth</a:t>
+            </a:r>
+            <a:endParaRPr lang="en-US" dirty="0"/>
+          </a:p>
+        </p:txBody>
+      </p:sp>
+      <p:sp>
+        <p:nvSpPr>
+          <p:cNvPr id="28" name="Rounded Rectangle 27"/>
+          <p:cNvSpPr/>
+          <p:nvPr/>
+        </p:nvSpPr>
+        <p:spPr>
+          <a:xfrm>
+            <a:off x="8396478" y="1479614"/>
+            <a:ext cx="1455420" cy="612648"/>
+          </a:xfrm>
+          <a:prstGeom prst="roundRect">
+            <a:avLst/>
+          </a:prstGeom>
+        </p:spPr>
+        <p:style>
+          <a:lnRef idx="0">
+            <a:schemeClr val="accent2"/>
+          </a:lnRef>
+          <a:fillRef idx="3">
+            <a:schemeClr val="accent2"/>
+          </a:fillRef>
+          <a:effectRef idx="3">
+            <a:schemeClr val="accent2"/>
+          </a:effectRef>
+          <a:fontRef idx="minor">
+            <a:schemeClr val="lt1"/>
+          </a:fontRef>
+        </p:style>
+        <p:txBody>
+          <a:bodyPr rtlCol="0" anchor="ctr"/>
+          <a:lstStyle/>
+          <a:p>
+            <a:pPr algn="ctr"/>
+            <a:r>
+              <a:rPr lang="en-US" dirty="0" smtClean="0"/>
+              <a:t>Audio Codec</a:t>
+            </a:r>
+            <a:endParaRPr lang="en-US" dirty="0"/>
+          </a:p>
+        </p:txBody>
+      </p:sp>
+      <p:sp>
+        <p:nvSpPr>
+          <p:cNvPr id="29" name="Rounded Rectangle 28"/>
+          <p:cNvSpPr/>
+          <p:nvPr/>
+        </p:nvSpPr>
+        <p:spPr>
+          <a:xfrm>
+            <a:off x="4664202" y="4437126"/>
+            <a:ext cx="1406652" cy="612648"/>
+          </a:xfrm>
+          <a:prstGeom prst="roundRect">
+            <a:avLst/>
+          </a:prstGeom>
+        </p:spPr>
+        <p:style>
+          <a:lnRef idx="0">
+            <a:schemeClr val="accent5"/>
+          </a:lnRef>
+          <a:fillRef idx="3">
+            <a:schemeClr val="accent5"/>
+          </a:fillRef>
+          <a:effectRef idx="3">
+            <a:schemeClr val="accent5"/>
+          </a:effectRef>
+          <a:fontRef idx="minor">
+            <a:schemeClr val="lt1"/>
+          </a:fontRef>
+        </p:style>
+        <p:txBody>
+          <a:bodyPr rtlCol="0" anchor="ctr"/>
+          <a:lstStyle/>
+          <a:p>
+            <a:pPr algn="ctr"/>
+            <a:r>
+              <a:rPr lang="en-US" dirty="0" smtClean="0"/>
+              <a:t>DSP Filters</a:t>
+            </a:r>
+            <a:endParaRPr lang="en-US" dirty="0"/>
+          </a:p>
+        </p:txBody>
+      </p:sp>
+      <p:sp>
+        <p:nvSpPr>
+          <p:cNvPr id="30" name="Right Arrow 29"/>
+          <p:cNvSpPr/>
+          <p:nvPr/>
+        </p:nvSpPr>
+        <p:spPr>
+          <a:xfrm>
+            <a:off x="2130552" y="2293429"/>
+            <a:ext cx="1162812" cy="400765"/>
+          </a:xfrm>
+          <a:prstGeom prst="rightArrow">
+            <a:avLst/>
+          </a:prstGeom>
+        </p:spPr>
+        <p:style>
+          <a:lnRef idx="0">
+            <a:schemeClr val="accent4"/>
+          </a:lnRef>
+          <a:fillRef idx="3">
+            <a:schemeClr val="accent4"/>
+          </a:fillRef>
+          <a:effectRef idx="3">
+            <a:schemeClr val="accent4"/>
+          </a:effectRef>
+          <a:fontRef idx="minor">
+            <a:schemeClr val="lt1"/>
+          </a:fontRef>
+        </p:style>
+        <p:txBody>
+          <a:bodyPr rtlCol="0" anchor="ctr"/>
+          <a:lstStyle/>
+          <a:p>
+            <a:pPr algn="ctr"/>
+            <a:r>
+              <a:rPr lang="en-US" sz="1200" dirty="0" smtClean="0"/>
+              <a:t>PDM Data</a:t>
+            </a:r>
+            <a:endParaRPr lang="en-US" sz="1200" dirty="0"/>
+          </a:p>
+        </p:txBody>
+      </p:sp>
+      <p:sp>
+        <p:nvSpPr>
+          <p:cNvPr id="31" name="Left Arrow 30"/>
+          <p:cNvSpPr/>
+          <p:nvPr/>
+        </p:nvSpPr>
+        <p:spPr>
+          <a:xfrm>
+            <a:off x="2132076" y="2694194"/>
+            <a:ext cx="1161288" cy="352472"/>
+          </a:xfrm>
+          <a:prstGeom prst="leftArrow">
+            <a:avLst/>
+          </a:prstGeom>
+        </p:spPr>
+        <p:style>
+          <a:lnRef idx="0">
+            <a:schemeClr val="accent4"/>
+          </a:lnRef>
+          <a:fillRef idx="3">
+            <a:schemeClr val="accent4"/>
+          </a:fillRef>
+          <a:effectRef idx="3">
+            <a:schemeClr val="accent4"/>
+          </a:effectRef>
+          <a:fontRef idx="minor">
+            <a:schemeClr val="lt1"/>
+          </a:fontRef>
+        </p:style>
+        <p:txBody>
+          <a:bodyPr rtlCol="0" anchor="ctr"/>
+          <a:lstStyle/>
+          <a:p>
+            <a:pPr algn="ctr"/>
+            <a:r>
+              <a:rPr lang="en-US" sz="1200" dirty="0" smtClean="0"/>
+              <a:t>Clock Signal</a:t>
+            </a:r>
+            <a:endParaRPr lang="en-US" sz="1200" dirty="0"/>
+          </a:p>
+        </p:txBody>
+      </p:sp>
+      <p:sp>
+        <p:nvSpPr>
+          <p:cNvPr id="32" name="Right Arrow 31"/>
+          <p:cNvSpPr/>
+          <p:nvPr/>
+        </p:nvSpPr>
+        <p:spPr>
+          <a:xfrm>
+            <a:off x="5000435" y="2518939"/>
+            <a:ext cx="1387983" cy="302216"/>
+          </a:xfrm>
+          <a:prstGeom prst="rightArrow">
+            <a:avLst/>
+          </a:prstGeom>
+        </p:spPr>
+        <p:style>
+          <a:lnRef idx="0">
+            <a:schemeClr val="accent4"/>
+          </a:lnRef>
+          <a:fillRef idx="3">
+            <a:schemeClr val="accent4"/>
+          </a:fillRef>
+          <a:effectRef idx="3">
+            <a:schemeClr val="accent4"/>
+          </a:effectRef>
+          <a:fontRef idx="minor">
+            <a:schemeClr val="lt1"/>
+          </a:fontRef>
+        </p:style>
+        <p:txBody>
+          <a:bodyPr rtlCol="0" anchor="ctr"/>
+          <a:lstStyle/>
+          <a:p>
+            <a:pPr algn="ctr"/>
+            <a:r>
+              <a:rPr lang="en-US" sz="1400" dirty="0" smtClean="0"/>
+              <a:t>PDM Data</a:t>
+            </a:r>
+            <a:endParaRPr lang="en-US" sz="1400" dirty="0"/>
+          </a:p>
+        </p:txBody>
+      </p:sp>
+      <p:sp>
+        <p:nvSpPr>
+          <p:cNvPr id="33" name="Right Arrow 32"/>
+          <p:cNvSpPr/>
+          <p:nvPr/>
+        </p:nvSpPr>
+        <p:spPr>
+          <a:xfrm rot="5400000">
+            <a:off x="6321979" y="3088223"/>
+            <a:ext cx="785529" cy="270648"/>
+          </a:xfrm>
+          <a:prstGeom prst="rightArrow">
+            <a:avLst/>
+          </a:prstGeom>
+        </p:spPr>
+        <p:style>
+          <a:lnRef idx="0">
+            <a:schemeClr val="accent4"/>
+          </a:lnRef>
+          <a:fillRef idx="3">
+            <a:schemeClr val="accent4"/>
+          </a:fillRef>
+          <a:effectRef idx="3">
+            <a:schemeClr val="accent4"/>
+          </a:effectRef>
+          <a:fontRef idx="minor">
+            <a:schemeClr val="lt1"/>
+          </a:fontRef>
+        </p:style>
+        <p:txBody>
+          <a:bodyPr rtlCol="0" anchor="ctr"/>
+          <a:lstStyle/>
+          <a:p>
+            <a:pPr algn="ctr"/>
+            <a:endParaRPr lang="en-US" sz="1200" dirty="0"/>
+          </a:p>
+        </p:txBody>
+      </p:sp>
+      <p:sp>
+        <p:nvSpPr>
+          <p:cNvPr id="34" name="Left-Right-Up Arrow 33"/>
+          <p:cNvSpPr/>
+          <p:nvPr/>
+        </p:nvSpPr>
+        <p:spPr>
+          <a:xfrm rot="10800000">
+            <a:off x="4370832" y="3566158"/>
+            <a:ext cx="2017586" cy="913827"/>
+          </a:xfrm>
+          <a:prstGeom prst="leftRightUpArrow">
+            <a:avLst/>
+          </a:prstGeom>
+        </p:spPr>
+        <p:style>
+          <a:lnRef idx="0">
+            <a:schemeClr val="accent4"/>
+          </a:lnRef>
+          <a:fillRef idx="3">
+            <a:schemeClr val="accent4"/>
+          </a:fillRef>
+          <a:effectRef idx="3">
+            <a:schemeClr val="accent4"/>
+          </a:effectRef>
+          <a:fontRef idx="minor">
+            <a:schemeClr val="lt1"/>
+          </a:fontRef>
+        </p:style>
+        <p:txBody>
+          <a:bodyPr rtlCol="0" anchor="ctr"/>
+          <a:lstStyle/>
+          <a:p>
+            <a:pPr algn="ctr"/>
+            <a:endParaRPr lang="en-US" dirty="0"/>
+          </a:p>
+        </p:txBody>
+      </p:sp>
+      <p:sp>
+        <p:nvSpPr>
+          <p:cNvPr id="36" name="Bent-Up Arrow 35"/>
+          <p:cNvSpPr/>
+          <p:nvPr/>
+        </p:nvSpPr>
+        <p:spPr>
+          <a:xfrm rot="10800000">
+            <a:off x="3336132" y="4606345"/>
+            <a:ext cx="1387602" cy="1094706"/>
+          </a:xfrm>
+          <a:prstGeom prst="bentUpArrow">
+            <a:avLst>
+              <a:gd name="adj1" fmla="val 25000"/>
+              <a:gd name="adj2" fmla="val 25000"/>
+              <a:gd name="adj3" fmla="val 22494"/>
+            </a:avLst>
+          </a:prstGeom>
+        </p:spPr>
+        <p:style>
+          <a:lnRef idx="0">
+            <a:schemeClr val="accent4"/>
+          </a:lnRef>
+          <a:fillRef idx="3">
+            <a:schemeClr val="accent4"/>
+          </a:fillRef>
+          <a:effectRef idx="3">
+            <a:schemeClr val="accent4"/>
+          </a:effectRef>
+          <a:fontRef idx="minor">
+            <a:schemeClr val="lt1"/>
+          </a:fontRef>
+        </p:style>
+        <p:txBody>
+          <a:bodyPr rtlCol="0" anchor="ctr"/>
+          <a:lstStyle/>
+          <a:p>
+            <a:pPr algn="ctr"/>
+            <a:endParaRPr lang="en-US"/>
+          </a:p>
+        </p:txBody>
+      </p:sp>
+      <p:sp>
+        <p:nvSpPr>
+          <p:cNvPr id="37" name="Right Arrow 36"/>
+          <p:cNvSpPr/>
+          <p:nvPr/>
+        </p:nvSpPr>
+        <p:spPr>
+          <a:xfrm>
+            <a:off x="3904201" y="5762719"/>
+            <a:ext cx="1554767" cy="302216"/>
+          </a:xfrm>
+          <a:prstGeom prst="rightArrow">
+            <a:avLst/>
+          </a:prstGeom>
+        </p:spPr>
+        <p:style>
+          <a:lnRef idx="0">
+            <a:schemeClr val="accent4"/>
+          </a:lnRef>
+          <a:fillRef idx="3">
+            <a:schemeClr val="accent4"/>
+          </a:fillRef>
+          <a:effectRef idx="3">
+            <a:schemeClr val="accent4"/>
+          </a:effectRef>
+          <a:fontRef idx="minor">
+            <a:schemeClr val="lt1"/>
+          </a:fontRef>
+        </p:style>
+        <p:txBody>
+          <a:bodyPr rtlCol="0" anchor="ctr"/>
+          <a:lstStyle/>
+          <a:p>
+            <a:pPr algn="ctr"/>
+            <a:endParaRPr lang="en-US" sz="1200" dirty="0"/>
+          </a:p>
+        </p:txBody>
+      </p:sp>
+      <p:sp>
+        <p:nvSpPr>
+          <p:cNvPr id="38" name="Right Arrow 37"/>
+          <p:cNvSpPr/>
+          <p:nvPr/>
+        </p:nvSpPr>
+        <p:spPr>
+          <a:xfrm>
+            <a:off x="10404659" y="3324467"/>
+            <a:ext cx="1119447" cy="302216"/>
+          </a:xfrm>
+          <a:prstGeom prst="rightArrow">
+            <a:avLst/>
+          </a:prstGeom>
+        </p:spPr>
+        <p:style>
+          <a:lnRef idx="0">
+            <a:schemeClr val="accent4"/>
+          </a:lnRef>
+          <a:fillRef idx="3">
+            <a:schemeClr val="accent4"/>
+          </a:fillRef>
+          <a:effectRef idx="3">
+            <a:schemeClr val="accent4"/>
+          </a:effectRef>
+          <a:fontRef idx="minor">
+            <a:schemeClr val="lt1"/>
+          </a:fontRef>
+        </p:style>
+        <p:txBody>
+          <a:bodyPr rtlCol="0" anchor="ctr"/>
+          <a:lstStyle/>
+          <a:p>
+            <a:pPr algn="ctr"/>
+            <a:r>
+              <a:rPr lang="en-US" sz="1600" dirty="0" smtClean="0"/>
+              <a:t>Wired</a:t>
+            </a:r>
+            <a:endParaRPr lang="en-US" sz="1200" dirty="0"/>
+          </a:p>
+        </p:txBody>
+      </p:sp>
+      <p:sp>
+        <p:nvSpPr>
+          <p:cNvPr id="39" name="Right Arrow 38"/>
+          <p:cNvSpPr/>
+          <p:nvPr/>
+        </p:nvSpPr>
+        <p:spPr>
+          <a:xfrm>
+            <a:off x="10404658" y="6205687"/>
+            <a:ext cx="1119447" cy="302216"/>
+          </a:xfrm>
+          <a:prstGeom prst="rightArrow">
+            <a:avLst/>
+          </a:prstGeom>
+        </p:spPr>
+        <p:style>
+          <a:lnRef idx="0">
+            <a:schemeClr val="accent4"/>
+          </a:lnRef>
+          <a:fillRef idx="3">
+            <a:schemeClr val="accent4"/>
+          </a:fillRef>
+          <a:effectRef idx="3">
+            <a:schemeClr val="accent4"/>
+          </a:effectRef>
+          <a:fontRef idx="minor">
+            <a:schemeClr val="lt1"/>
+          </a:fontRef>
+        </p:style>
+        <p:txBody>
+          <a:bodyPr rtlCol="0" anchor="ctr"/>
+          <a:lstStyle/>
+          <a:p>
+            <a:pPr algn="ctr"/>
+            <a:r>
+              <a:rPr lang="en-US" sz="1600" dirty="0" smtClean="0"/>
+              <a:t>Wireless</a:t>
+            </a:r>
+            <a:endParaRPr lang="en-US" sz="1200" dirty="0"/>
+          </a:p>
+        </p:txBody>
+      </p:sp>
+      <p:sp>
+        <p:nvSpPr>
+          <p:cNvPr id="41" name="Bent-Up Arrow 40"/>
+          <p:cNvSpPr/>
+          <p:nvPr/>
+        </p:nvSpPr>
+        <p:spPr>
+          <a:xfrm rot="5400000" flipH="1">
+            <a:off x="6570697" y="3540850"/>
+            <a:ext cx="3343847" cy="849003"/>
+          </a:xfrm>
+          <a:prstGeom prst="bentUpArrow">
+            <a:avLst>
+              <a:gd name="adj1" fmla="val 25000"/>
+              <a:gd name="adj2" fmla="val 25000"/>
+              <a:gd name="adj3" fmla="val 22494"/>
+            </a:avLst>
+          </a:prstGeom>
+        </p:spPr>
+        <p:style>
+          <a:lnRef idx="0">
+            <a:schemeClr val="accent4"/>
+          </a:lnRef>
+          <a:fillRef idx="3">
+            <a:schemeClr val="accent4"/>
+          </a:fillRef>
+          <a:effectRef idx="3">
+            <a:schemeClr val="accent4"/>
+          </a:effectRef>
+          <a:fontRef idx="minor">
+            <a:schemeClr val="lt1"/>
+          </a:fontRef>
+        </p:style>
+        <p:txBody>
+          <a:bodyPr rtlCol="0" anchor="ctr"/>
+          <a:lstStyle/>
+          <a:p>
+            <a:pPr algn="ctr"/>
+            <a:r>
+              <a:rPr lang="en-US" dirty="0" smtClean="0"/>
+              <a:t>PCM Data</a:t>
+            </a:r>
+            <a:endParaRPr lang="en-US" dirty="0"/>
+          </a:p>
+        </p:txBody>
+      </p:sp>
+      <p:sp>
+        <p:nvSpPr>
+          <p:cNvPr id="40" name="Right Arrow 39"/>
+          <p:cNvSpPr/>
+          <p:nvPr/>
+        </p:nvSpPr>
+        <p:spPr>
+          <a:xfrm rot="20135001">
+            <a:off x="7095749" y="5500867"/>
+            <a:ext cx="1579545" cy="302216"/>
+          </a:xfrm>
+          <a:prstGeom prst="rightArrow">
+            <a:avLst/>
+          </a:prstGeom>
+        </p:spPr>
+        <p:style>
+          <a:lnRef idx="0">
+            <a:schemeClr val="accent4"/>
+          </a:lnRef>
+          <a:fillRef idx="3">
+            <a:schemeClr val="accent4"/>
+          </a:fillRef>
+          <a:effectRef idx="3">
+            <a:schemeClr val="accent4"/>
+          </a:effectRef>
+          <a:fontRef idx="minor">
+            <a:schemeClr val="lt1"/>
+          </a:fontRef>
+        </p:style>
+        <p:txBody>
+          <a:bodyPr rtlCol="0" anchor="ctr"/>
+          <a:lstStyle/>
+          <a:p>
+            <a:pPr algn="ctr"/>
+            <a:r>
+              <a:rPr lang="en-US" sz="1600" dirty="0" smtClean="0"/>
+              <a:t>PCM Data</a:t>
+            </a:r>
+            <a:endParaRPr lang="en-US" sz="1600" dirty="0"/>
+          </a:p>
+        </p:txBody>
+      </p:sp>
+      <p:sp>
+        <p:nvSpPr>
+          <p:cNvPr id="42" name="Right Arrow 41"/>
+          <p:cNvSpPr/>
+          <p:nvPr/>
+        </p:nvSpPr>
+        <p:spPr>
+          <a:xfrm rot="5400000">
+            <a:off x="9239055" y="2889052"/>
+            <a:ext cx="584269" cy="286566"/>
+          </a:xfrm>
+          <a:prstGeom prst="rightArrow">
+            <a:avLst/>
+          </a:prstGeom>
+        </p:spPr>
+        <p:style>
+          <a:lnRef idx="0">
+            <a:schemeClr val="accent4"/>
+          </a:lnRef>
+          <a:fillRef idx="3">
+            <a:schemeClr val="accent4"/>
+          </a:fillRef>
+          <a:effectRef idx="3">
+            <a:schemeClr val="accent4"/>
+          </a:effectRef>
+          <a:fontRef idx="minor">
+            <a:schemeClr val="lt1"/>
+          </a:fontRef>
+        </p:style>
+        <p:txBody>
+          <a:bodyPr rtlCol="0" anchor="ctr"/>
+          <a:lstStyle/>
+          <a:p>
+            <a:pPr algn="ctr"/>
+            <a:endParaRPr lang="en-US" sz="1200" dirty="0"/>
+          </a:p>
+        </p:txBody>
+      </p:sp>
+      <p:sp>
+        <p:nvSpPr>
+          <p:cNvPr id="43" name="Right Arrow 42"/>
+          <p:cNvSpPr/>
+          <p:nvPr/>
+        </p:nvSpPr>
+        <p:spPr>
+          <a:xfrm rot="5400000">
+            <a:off x="9248105" y="5697448"/>
+            <a:ext cx="584269" cy="286566"/>
+          </a:xfrm>
+          <a:prstGeom prst="rightArrow">
+            <a:avLst/>
+          </a:prstGeom>
+        </p:spPr>
+        <p:style>
+          <a:lnRef idx="0">
+            <a:schemeClr val="accent4"/>
+          </a:lnRef>
+          <a:fillRef idx="3">
+            <a:schemeClr val="accent4"/>
+          </a:fillRef>
+          <a:effectRef idx="3">
+            <a:schemeClr val="accent4"/>
+          </a:effectRef>
+          <a:fontRef idx="minor">
+            <a:schemeClr val="lt1"/>
+          </a:fontRef>
+        </p:style>
+        <p:txBody>
+          <a:bodyPr rtlCol="0" anchor="ctr"/>
+          <a:lstStyle/>
+          <a:p>
+            <a:pPr algn="ctr"/>
+            <a:endParaRPr lang="en-US" sz="1200" dirty="0"/>
+          </a:p>
+        </p:txBody>
+      </p:sp>
       <p:sp>
         <p:nvSpPr>
           <p:cNvPr id="3" name="TextBox 2"/>
@@ -7196,8 +7470,8 @@
         </p:nvSpPr>
         <p:spPr>
           <a:xfrm>
-            <a:off x="802636" y="5291328"/>
-            <a:ext cx="10919972" cy="1384995"/>
+            <a:off x="4818888" y="3616312"/>
+            <a:ext cx="1223460" cy="369332"/>
           </a:xfrm>
           <a:prstGeom prst="rect">
             <a:avLst/>
@@ -7211,72 +7485,85 @@
           <a:lstStyle/>
           <a:p>
             <a:r>
-              <a:rPr lang="en-US" sz="2800" dirty="0" smtClean="0"/>
-              <a:t>- A </a:t>
-            </a:r>
-            <a:r>
-              <a:rPr lang="en-US" sz="2800" dirty="0"/>
-              <a:t>large cluster of 1s correspond to a high (positive) amplitude </a:t>
-            </a:r>
-            <a:r>
-              <a:rPr lang="en-US" sz="2800" dirty="0" smtClean="0"/>
-              <a:t>value</a:t>
-            </a:r>
-            <a:r>
-              <a:rPr lang="en-US" sz="2800" dirty="0"/>
-              <a:t>.</a:t>
-            </a:r>
-            <a:r>
-              <a:rPr lang="en-US" sz="2800" dirty="0" smtClean="0"/>
-              <a:t> </a:t>
-            </a:r>
-          </a:p>
-          <a:p>
-            <a:r>
-              <a:rPr lang="en-US" sz="2800" dirty="0" smtClean="0"/>
-              <a:t>- A </a:t>
-            </a:r>
-            <a:r>
-              <a:rPr lang="en-US" sz="2800" dirty="0"/>
-              <a:t>large cluster of </a:t>
-            </a:r>
-            <a:r>
-              <a:rPr lang="en-US" sz="2800" dirty="0" smtClean="0"/>
-              <a:t>0s </a:t>
-            </a:r>
-            <a:r>
-              <a:rPr lang="en-US" sz="2800" dirty="0"/>
-              <a:t>correspond to a low (negative) amplitude </a:t>
-            </a:r>
-            <a:r>
-              <a:rPr lang="en-US" sz="2800" dirty="0" smtClean="0"/>
-              <a:t>value.</a:t>
-            </a:r>
-          </a:p>
-          <a:p>
-            <a:r>
-              <a:rPr lang="en-US" sz="2800" dirty="0" smtClean="0"/>
-              <a:t>- Alternating </a:t>
-            </a:r>
-            <a:r>
-              <a:rPr lang="en-US" sz="2800" dirty="0"/>
-              <a:t>1s and </a:t>
-            </a:r>
-            <a:r>
-              <a:rPr lang="en-US" sz="2800" dirty="0" smtClean="0"/>
-              <a:t>0s </a:t>
-            </a:r>
-            <a:r>
-              <a:rPr lang="en-US" sz="2800" dirty="0"/>
-              <a:t>correspond to a zero amplitude value.</a:t>
-            </a:r>
+              <a:rPr lang="en-US" dirty="0" smtClean="0">
+                <a:solidFill>
+                  <a:schemeClr val="bg1"/>
+                </a:solidFill>
+              </a:rPr>
+              <a:t>PCM Data</a:t>
+            </a:r>
+            <a:endParaRPr lang="en-US" dirty="0">
+              <a:solidFill>
+                <a:schemeClr val="bg1"/>
+              </a:solidFill>
+            </a:endParaRPr>
+          </a:p>
+        </p:txBody>
+      </p:sp>
+      <p:sp>
+        <p:nvSpPr>
+          <p:cNvPr id="4" name="TextBox 3"/>
+          <p:cNvSpPr txBox="1"/>
+          <p:nvPr/>
+        </p:nvSpPr>
+        <p:spPr>
+          <a:xfrm>
+            <a:off x="7528560" y="2072984"/>
+            <a:ext cx="1200601" cy="369332"/>
+          </a:xfrm>
+          <a:prstGeom prst="rect">
+            <a:avLst/>
+          </a:prstGeom>
+          <a:noFill/>
+        </p:spPr>
+        <p:txBody>
+          <a:bodyPr wrap="square" rtlCol="0">
+            <a:spAutoFit/>
+          </a:bodyPr>
+          <a:lstStyle/>
+          <a:p>
+            <a:r>
+              <a:rPr lang="en-US" dirty="0" smtClean="0"/>
+              <a:t>Option 1</a:t>
+            </a:r>
+            <a:endParaRPr lang="en-US" dirty="0"/>
+          </a:p>
+        </p:txBody>
+      </p:sp>
+      <p:sp>
+        <p:nvSpPr>
+          <p:cNvPr id="13" name="TextBox 12"/>
+          <p:cNvSpPr txBox="1"/>
+          <p:nvPr/>
+        </p:nvSpPr>
+        <p:spPr>
+          <a:xfrm rot="20054895">
+            <a:off x="7449594" y="5689133"/>
+            <a:ext cx="1139190" cy="369332"/>
+          </a:xfrm>
+          <a:prstGeom prst="rect">
+            <a:avLst/>
+          </a:prstGeom>
+          <a:noFill/>
+        </p:spPr>
+        <p:txBody>
+          <a:bodyPr wrap="square" rtlCol="0">
+            <a:spAutoFit/>
+          </a:bodyPr>
+          <a:lstStyle/>
+          <a:p>
+            <a:r>
+              <a:rPr lang="en-US" dirty="0" smtClean="0"/>
+              <a:t>Option 2</a:t>
+            </a:r>
+            <a:endParaRPr lang="en-US" dirty="0"/>
           </a:p>
         </p:txBody>
       </p:sp>
     </p:spTree>
     <p:extLst>
       <p:ext uri="{BB962C8B-B14F-4D97-AF65-F5344CB8AC3E}">
-        <p14:creationId xmlns:p14="http://schemas.microsoft.com/office/powerpoint/2010/main" val="3261967598"/>
+        <p14:creationId xmlns:p14="http://schemas.microsoft.com/office/powerpoint/2010/main" val="3710677287"/>
       </p:ext>
     </p:extLst>
   </p:cSld>
@@ -7320,12 +7607,7 @@
             <p:ph type="title"/>
           </p:nvPr>
         </p:nvSpPr>
-        <p:spPr>
-          <a:xfrm>
-            <a:off x="1371599" y="274320"/>
-            <a:ext cx="9601200" cy="742950"/>
-          </a:xfrm>
-        </p:spPr>
+        <p:spPr/>
         <p:txBody>
           <a:bodyPr/>
           <a:lstStyle/>
@@ -7333,7 +7615,7 @@
             <a:pPr algn="ctr"/>
             <a:r>
               <a:rPr lang="en-US" b="1" u="sng" dirty="0" smtClean="0"/>
-              <a:t>PCM Signal</a:t>
+              <a:t>MEMS Microphones</a:t>
             </a:r>
             <a:endParaRPr lang="en-US" b="1" u="sng" dirty="0"/>
           </a:p>
@@ -7351,13 +7633,13 @@
         </p:nvPicPr>
         <p:blipFill rotWithShape="1">
           <a:blip r:embed="rId2"/>
-          <a:srcRect t="5362"/>
+          <a:srcRect t="7416"/>
           <a:stretch/>
         </p:blipFill>
         <p:spPr>
           <a:xfrm>
-            <a:off x="2839390" y="1017270"/>
-            <a:ext cx="6665617" cy="3389376"/>
+            <a:off x="2443161" y="1620774"/>
+            <a:ext cx="7458075" cy="3139440"/>
           </a:xfrm>
           <a:prstGeom prst="rect">
             <a:avLst/>
@@ -7372,8 +7654,8 @@
         </p:nvSpPr>
         <p:spPr>
           <a:xfrm>
-            <a:off x="752856" y="4498086"/>
-            <a:ext cx="11439144" cy="2523768"/>
+            <a:off x="827531" y="5093208"/>
+            <a:ext cx="10689336" cy="954107"/>
           </a:xfrm>
           <a:prstGeom prst="rect">
             <a:avLst/>
@@ -7387,52 +7669,16 @@
           <a:lstStyle/>
           <a:p>
             <a:r>
-              <a:rPr lang="en-US" sz="2800" dirty="0" smtClean="0"/>
-              <a:t>- </a:t>
-            </a:r>
-            <a:r>
               <a:rPr lang="en-US" sz="2800" dirty="0"/>
-              <a:t>S</a:t>
-            </a:r>
-            <a:r>
-              <a:rPr lang="en-US" sz="2800" dirty="0" smtClean="0"/>
-              <a:t>pecific </a:t>
-            </a:r>
-            <a:r>
-              <a:rPr lang="en-US" sz="2800" dirty="0"/>
-              <a:t>amplitude values are encoded into pulses</a:t>
-            </a:r>
-            <a:r>
-              <a:rPr lang="en-US" sz="2800" dirty="0" smtClean="0"/>
-              <a:t>.</a:t>
-            </a:r>
-          </a:p>
-          <a:p>
-            <a:r>
-              <a:rPr lang="en-US" sz="2800" dirty="0"/>
-              <a:t>- The sampling rate is the number of samples of a signal that are taken per second to represent it digitally.</a:t>
-            </a:r>
-          </a:p>
-          <a:p>
-            <a:r>
-              <a:rPr lang="en-US" sz="2800" dirty="0"/>
-              <a:t>- The bit depth determines the number of bits of information in each sample</a:t>
-            </a:r>
-            <a:r>
-              <a:rPr lang="en-US" sz="2800" dirty="0" smtClean="0"/>
-              <a:t>. </a:t>
-            </a:r>
-            <a:endParaRPr lang="en-US" sz="2800" dirty="0"/>
-          </a:p>
-          <a:p>
-            <a:endParaRPr lang="en-US" dirty="0"/>
+              <a:t>- The digital MEMS microphone is a sensor that convert acoustic pressure waves into a digital signal. </a:t>
+            </a:r>
           </a:p>
         </p:txBody>
       </p:sp>
     </p:spTree>
     <p:extLst>
       <p:ext uri="{BB962C8B-B14F-4D97-AF65-F5344CB8AC3E}">
-        <p14:creationId xmlns:p14="http://schemas.microsoft.com/office/powerpoint/2010/main" val="1539137432"/>
+        <p14:creationId xmlns:p14="http://schemas.microsoft.com/office/powerpoint/2010/main" val="3694460086"/>
       </p:ext>
     </p:extLst>
   </p:cSld>
@@ -7484,7 +7730,7 @@
             <a:pPr algn="ctr"/>
             <a:r>
               <a:rPr lang="en-US" b="1" u="sng" dirty="0" smtClean="0"/>
-              <a:t>I2S Protocol</a:t>
+              <a:t>PDM Signal</a:t>
             </a:r>
             <a:endParaRPr lang="en-US" b="1" u="sng" dirty="0"/>
           </a:p>
@@ -7502,13 +7748,13 @@
         </p:nvPicPr>
         <p:blipFill rotWithShape="1">
           <a:blip r:embed="rId2"/>
-          <a:srcRect t="4596" b="46893"/>
+          <a:srcRect t="5617"/>
           <a:stretch/>
         </p:blipFill>
         <p:spPr>
           <a:xfrm>
-            <a:off x="3043701" y="1428750"/>
-            <a:ext cx="6256998" cy="1737360"/>
+            <a:off x="2754374" y="1428750"/>
+            <a:ext cx="6835652" cy="3380232"/>
           </a:xfrm>
           <a:prstGeom prst="rect">
             <a:avLst/>
@@ -7523,8 +7769,8 @@
         </p:nvSpPr>
         <p:spPr>
           <a:xfrm>
-            <a:off x="877824" y="3739896"/>
-            <a:ext cx="11201400" cy="1661993"/>
+            <a:off x="802636" y="5291328"/>
+            <a:ext cx="10919972" cy="1384995"/>
           </a:xfrm>
           <a:prstGeom prst="rect">
             <a:avLst/>
@@ -7539,36 +7785,71 @@
           <a:p>
             <a:r>
               <a:rPr lang="en-US" sz="2800" dirty="0" smtClean="0"/>
-              <a:t>- The </a:t>
+              <a:t>- A </a:t>
             </a:r>
             <a:r>
               <a:rPr lang="en-US" sz="2800" dirty="0"/>
-              <a:t>I2S protocol is widely used to transfer audio data from a microcontroller/DSP (Digital Signal Processor) to an audio </a:t>
+              <a:t>large cluster of 1s correspond to a high (positive) amplitude </a:t>
             </a:r>
             <a:r>
               <a:rPr lang="en-US" sz="2800" dirty="0" smtClean="0"/>
-              <a:t>codec.</a:t>
-            </a:r>
-          </a:p>
-          <a:p>
+              <a:t>value</a:t>
+            </a:r>
+            <a:r>
+              <a:rPr lang="en-US" sz="2800" dirty="0"/>
+              <a:t>.</a:t>
+            </a:r>
             <a:r>
               <a:rPr lang="en-US" sz="2800" dirty="0" smtClean="0"/>
-              <a:t>- In </a:t>
+              <a:t> </a:t>
+            </a:r>
+          </a:p>
+          <a:p>
+            <a:r>
+              <a:rPr lang="en-US" sz="2800" dirty="0" smtClean="0"/>
+              <a:t>- A </a:t>
             </a:r>
             <a:r>
               <a:rPr lang="en-US" sz="2800" dirty="0"/>
-              <a:t>order to play melodies or to capture sound from a microphone.</a:t>
-            </a:r>
-          </a:p>
-          <a:p>
-            <a:endParaRPr lang="en-US" dirty="0"/>
+              <a:t>large cluster of </a:t>
+            </a:r>
+            <a:r>
+              <a:rPr lang="en-US" sz="2800" dirty="0" smtClean="0"/>
+              <a:t>0s </a:t>
+            </a:r>
+            <a:r>
+              <a:rPr lang="en-US" sz="2800" dirty="0"/>
+              <a:t>correspond to a low (negative) amplitude </a:t>
+            </a:r>
+            <a:r>
+              <a:rPr lang="en-US" sz="2800" dirty="0" smtClean="0"/>
+              <a:t>value.</a:t>
+            </a:r>
+          </a:p>
+          <a:p>
+            <a:r>
+              <a:rPr lang="en-US" sz="2800" dirty="0" smtClean="0"/>
+              <a:t>- Alternating </a:t>
+            </a:r>
+            <a:r>
+              <a:rPr lang="en-US" sz="2800" dirty="0"/>
+              <a:t>1s and </a:t>
+            </a:r>
+            <a:r>
+              <a:rPr lang="en-US" sz="2800" dirty="0" smtClean="0"/>
+              <a:t>0s </a:t>
+            </a:r>
+            <a:r>
+              <a:rPr lang="en-US" sz="2800" dirty="0"/>
+              <a:t>correspond to a zero amplitude value.</a:t>
+            </a:r>
           </a:p>
         </p:txBody>
       </p:sp>
     </p:spTree>
     <p:extLst>
       <p:ext uri="{BB962C8B-B14F-4D97-AF65-F5344CB8AC3E}">
-        <p14:creationId xmlns:p14="http://schemas.microsoft.com/office/powerpoint/2010/main" val="2247753315"/>
+        <p14:creationId xmlns:p14="http://schemas.microsoft.com/office/powerpoint/2010/main" val="3261967598"/>
       </p:ext>
     </p:extLst>
   </p:cSld>

</xml_diff>